<commit_message>
doc/GSvar/*: updated docu for RNA and cfDNA pipelines
</commit_message>
<xml_diff>
--- a/doc/GSvar/pipelines.pptx
+++ b/doc/GSvar/pipelines.pptx
@@ -5,11 +5,13 @@
     <p:sldMasterId id="2147483651" r:id="rId1"/>
   </p:sldMasterIdLst>
   <p:notesMasterIdLst>
-    <p:notesMasterId r:id="rId4"/>
+    <p:notesMasterId r:id="rId6"/>
   </p:notesMasterIdLst>
   <p:sldIdLst>
     <p:sldId id="265" r:id="rId2"/>
     <p:sldId id="266" r:id="rId3"/>
+    <p:sldId id="267" r:id="rId4"/>
+    <p:sldId id="268" r:id="rId5"/>
   </p:sldIdLst>
   <p:sldSz cx="9144000" cy="6858000" type="screen4x3"/>
   <p:notesSz cx="6858000" cy="9144000"/>
@@ -4476,7 +4478,7 @@
         </p:nvSpPr>
         <p:spPr>
           <a:xfrm>
-            <a:off x="107950" y="0"/>
+            <a:off x="107950" y="31004"/>
             <a:ext cx="9036050" cy="836613"/>
           </a:xfrm>
         </p:spPr>
@@ -6561,6 +6563,1869 @@
     <p:extLst>
       <p:ext uri="{BB962C8B-B14F-4D97-AF65-F5344CB8AC3E}">
         <p14:creationId xmlns:p14="http://schemas.microsoft.com/office/powerpoint/2010/main" val="1951956571"/>
+      </p:ext>
+    </p:extLst>
+  </p:cSld>
+  <p:clrMapOvr>
+    <a:masterClrMapping/>
+  </p:clrMapOvr>
+</p:sld>
+</file>
+
+<file path=ppt/slides/slide3.xml><?xml version="1.0" encoding="utf-8"?>
+<p:sld xmlns:a="http://schemas.openxmlformats.org/drawingml/2006/main" xmlns:r="http://schemas.openxmlformats.org/officeDocument/2006/relationships" xmlns:p="http://schemas.openxmlformats.org/presentationml/2006/main">
+  <p:cSld>
+    <p:spTree>
+      <p:nvGrpSpPr>
+        <p:cNvPr id="1" name=""/>
+        <p:cNvGrpSpPr/>
+        <p:nvPr/>
+      </p:nvGrpSpPr>
+      <p:grpSpPr>
+        <a:xfrm>
+          <a:off x="0" y="0"/>
+          <a:ext cx="0" cy="0"/>
+          <a:chOff x="0" y="0"/>
+          <a:chExt cx="0" cy="0"/>
+        </a:xfrm>
+      </p:grpSpPr>
+      <p:sp>
+        <p:nvSpPr>
+          <p:cNvPr id="2" name="Titel 1">
+            <a:extLst>
+              <a:ext uri="{FF2B5EF4-FFF2-40B4-BE49-F238E27FC236}">
+                <a16:creationId xmlns:a16="http://schemas.microsoft.com/office/drawing/2014/main" id="{8344E5B7-D8D4-479D-B51D-20194B7269E7}"/>
+              </a:ext>
+            </a:extLst>
+          </p:cNvPr>
+          <p:cNvSpPr>
+            <a:spLocks noGrp="1"/>
+          </p:cNvSpPr>
+          <p:nvPr>
+            <p:ph type="title"/>
+          </p:nvPr>
+        </p:nvSpPr>
+        <p:spPr/>
+        <p:txBody>
+          <a:bodyPr/>
+          <a:lstStyle/>
+          <a:p>
+            <a:r>
+              <a:rPr lang="de-DE" dirty="0" err="1"/>
+              <a:t>cfDNA</a:t>
+            </a:r>
+            <a:r>
+              <a:rPr lang="de-DE" dirty="0"/>
+              <a:t> </a:t>
+            </a:r>
+            <a:r>
+              <a:rPr lang="de-DE" dirty="0" err="1"/>
+              <a:t>analysis</a:t>
+            </a:r>
+            <a:r>
+              <a:rPr lang="de-DE" dirty="0"/>
+              <a:t> </a:t>
+            </a:r>
+            <a:r>
+              <a:rPr lang="de-DE" dirty="0" err="1"/>
+              <a:t>pipeline</a:t>
+            </a:r>
+            <a:endParaRPr lang="de-DE" dirty="0"/>
+          </a:p>
+        </p:txBody>
+      </p:sp>
+      <p:sp>
+        <p:nvSpPr>
+          <p:cNvPr id="4" name="Flussdiagramm: Dokument 3">
+            <a:extLst>
+              <a:ext uri="{FF2B5EF4-FFF2-40B4-BE49-F238E27FC236}">
+                <a16:creationId xmlns:a16="http://schemas.microsoft.com/office/drawing/2014/main" id="{9716BD6E-1C21-465E-93A7-6E549EB35A3A}"/>
+              </a:ext>
+            </a:extLst>
+          </p:cNvPr>
+          <p:cNvSpPr/>
+          <p:nvPr/>
+        </p:nvSpPr>
+        <p:spPr>
+          <a:xfrm>
+            <a:off x="686583" y="2636837"/>
+            <a:ext cx="1223962" cy="792163"/>
+          </a:xfrm>
+          <a:prstGeom prst="flowChartDocument">
+            <a:avLst/>
+          </a:prstGeom>
+        </p:spPr>
+        <p:style>
+          <a:lnRef idx="1">
+            <a:schemeClr val="accent6"/>
+          </a:lnRef>
+          <a:fillRef idx="2">
+            <a:schemeClr val="accent6"/>
+          </a:fillRef>
+          <a:effectRef idx="1">
+            <a:schemeClr val="accent6"/>
+          </a:effectRef>
+          <a:fontRef idx="minor">
+            <a:schemeClr val="dk1"/>
+          </a:fontRef>
+        </p:style>
+        <p:txBody>
+          <a:bodyPr anchor="ctr"/>
+          <a:lstStyle/>
+          <a:p>
+            <a:pPr algn="ctr" eaLnBrk="0" fontAlgn="auto" hangingPunct="0">
+              <a:spcBef>
+                <a:spcPts val="0"/>
+              </a:spcBef>
+              <a:spcAft>
+                <a:spcPts val="0"/>
+              </a:spcAft>
+              <a:defRPr/>
+            </a:pPr>
+            <a:r>
+              <a:rPr lang="en-US" sz="1600" dirty="0">
+                <a:cs typeface="Arial" panose="020B0604020202020204" pitchFamily="34" charset="0"/>
+              </a:rPr>
+              <a:t>FASTQ</a:t>
+            </a:r>
+            <a:br>
+              <a:rPr lang="en-US" sz="1600" dirty="0">
+                <a:cs typeface="Arial" panose="020B0604020202020204" pitchFamily="34" charset="0"/>
+              </a:rPr>
+            </a:br>
+            <a:r>
+              <a:rPr lang="en-US" sz="1100" dirty="0">
+                <a:cs typeface="Arial" panose="020B0604020202020204" pitchFamily="34" charset="0"/>
+              </a:rPr>
+              <a:t>with UMIs</a:t>
+            </a:r>
+          </a:p>
+        </p:txBody>
+      </p:sp>
+      <p:sp>
+        <p:nvSpPr>
+          <p:cNvPr id="5" name="Flussdiagramm: Prozess 4">
+            <a:extLst>
+              <a:ext uri="{FF2B5EF4-FFF2-40B4-BE49-F238E27FC236}">
+                <a16:creationId xmlns:a16="http://schemas.microsoft.com/office/drawing/2014/main" id="{ABF2DA4A-060C-4A10-9493-2683E1F90866}"/>
+              </a:ext>
+            </a:extLst>
+          </p:cNvPr>
+          <p:cNvSpPr/>
+          <p:nvPr/>
+        </p:nvSpPr>
+        <p:spPr>
+          <a:xfrm>
+            <a:off x="2341340" y="2636837"/>
+            <a:ext cx="1223962" cy="792163"/>
+          </a:xfrm>
+          <a:prstGeom prst="flowChartProcess">
+            <a:avLst/>
+          </a:prstGeom>
+          <a:ln/>
+        </p:spPr>
+        <p:style>
+          <a:lnRef idx="1">
+            <a:schemeClr val="accent1"/>
+          </a:lnRef>
+          <a:fillRef idx="2">
+            <a:schemeClr val="accent1"/>
+          </a:fillRef>
+          <a:effectRef idx="1">
+            <a:schemeClr val="accent1"/>
+          </a:effectRef>
+          <a:fontRef idx="minor">
+            <a:schemeClr val="dk1"/>
+          </a:fontRef>
+        </p:style>
+        <p:txBody>
+          <a:bodyPr anchor="ctr"/>
+          <a:lstStyle/>
+          <a:p>
+            <a:pPr algn="ctr" eaLnBrk="0" fontAlgn="auto" hangingPunct="0">
+              <a:spcBef>
+                <a:spcPts val="0"/>
+              </a:spcBef>
+              <a:spcAft>
+                <a:spcPts val="0"/>
+              </a:spcAft>
+              <a:defRPr/>
+            </a:pPr>
+            <a:r>
+              <a:rPr lang="en-US" sz="1400" dirty="0">
+                <a:cs typeface="Arial" panose="020B0604020202020204" pitchFamily="34" charset="0"/>
+              </a:rPr>
+              <a:t>mapping</a:t>
+            </a:r>
+            <a:br>
+              <a:rPr lang="en-US" sz="1400" dirty="0">
+                <a:cs typeface="Arial" panose="020B0604020202020204" pitchFamily="34" charset="0"/>
+              </a:rPr>
+            </a:br>
+            <a:r>
+              <a:rPr lang="en-US" sz="1100" dirty="0">
+                <a:cs typeface="Arial" panose="020B0604020202020204" pitchFamily="34" charset="0"/>
+              </a:rPr>
+              <a:t>+ deduplication</a:t>
+            </a:r>
+          </a:p>
+        </p:txBody>
+      </p:sp>
+      <p:cxnSp>
+        <p:nvCxnSpPr>
+          <p:cNvPr id="6" name="Gerade Verbindung mit Pfeil 14">
+            <a:extLst>
+              <a:ext uri="{FF2B5EF4-FFF2-40B4-BE49-F238E27FC236}">
+                <a16:creationId xmlns:a16="http://schemas.microsoft.com/office/drawing/2014/main" id="{AAE55571-DE08-45F4-8F0A-63DFA00412F9}"/>
+              </a:ext>
+            </a:extLst>
+          </p:cNvPr>
+          <p:cNvCxnSpPr>
+            <a:cxnSpLocks/>
+          </p:cNvCxnSpPr>
+          <p:nvPr/>
+        </p:nvCxnSpPr>
+        <p:spPr>
+          <a:xfrm>
+            <a:off x="1910545" y="3032918"/>
+            <a:ext cx="430795" cy="0"/>
+          </a:xfrm>
+          <a:prstGeom prst="straightConnector1">
+            <a:avLst/>
+          </a:prstGeom>
+          <a:ln>
+            <a:tailEnd type="triangle" w="med" len="med"/>
+          </a:ln>
+        </p:spPr>
+        <p:style>
+          <a:lnRef idx="1">
+            <a:schemeClr val="accent1"/>
+          </a:lnRef>
+          <a:fillRef idx="0">
+            <a:schemeClr val="accent1"/>
+          </a:fillRef>
+          <a:effectRef idx="0">
+            <a:schemeClr val="accent1"/>
+          </a:effectRef>
+          <a:fontRef idx="minor">
+            <a:schemeClr val="tx1"/>
+          </a:fontRef>
+        </p:style>
+      </p:cxnSp>
+      <p:cxnSp>
+        <p:nvCxnSpPr>
+          <p:cNvPr id="7" name="Gerade Verbindung mit Pfeil 14">
+            <a:extLst>
+              <a:ext uri="{FF2B5EF4-FFF2-40B4-BE49-F238E27FC236}">
+                <a16:creationId xmlns:a16="http://schemas.microsoft.com/office/drawing/2014/main" id="{E5928557-6C04-498B-B199-5A492BD5B023}"/>
+              </a:ext>
+            </a:extLst>
+          </p:cNvPr>
+          <p:cNvCxnSpPr>
+            <a:cxnSpLocks/>
+          </p:cNvCxnSpPr>
+          <p:nvPr/>
+        </p:nvCxnSpPr>
+        <p:spPr>
+          <a:xfrm>
+            <a:off x="3565302" y="3032918"/>
+            <a:ext cx="430807" cy="0"/>
+          </a:xfrm>
+          <a:prstGeom prst="straightConnector1">
+            <a:avLst/>
+          </a:prstGeom>
+          <a:ln>
+            <a:tailEnd type="triangle" w="med" len="med"/>
+          </a:ln>
+        </p:spPr>
+        <p:style>
+          <a:lnRef idx="1">
+            <a:schemeClr val="accent1"/>
+          </a:lnRef>
+          <a:fillRef idx="0">
+            <a:schemeClr val="accent1"/>
+          </a:fillRef>
+          <a:effectRef idx="0">
+            <a:schemeClr val="accent1"/>
+          </a:effectRef>
+          <a:fontRef idx="minor">
+            <a:schemeClr val="tx1"/>
+          </a:fontRef>
+        </p:style>
+      </p:cxnSp>
+      <p:sp>
+        <p:nvSpPr>
+          <p:cNvPr id="8" name="Flussdiagramm: Dokument 7">
+            <a:extLst>
+              <a:ext uri="{FF2B5EF4-FFF2-40B4-BE49-F238E27FC236}">
+                <a16:creationId xmlns:a16="http://schemas.microsoft.com/office/drawing/2014/main" id="{5C5F965D-7432-412A-95D4-0209CD5C84E1}"/>
+              </a:ext>
+            </a:extLst>
+          </p:cNvPr>
+          <p:cNvSpPr/>
+          <p:nvPr/>
+        </p:nvSpPr>
+        <p:spPr>
+          <a:xfrm>
+            <a:off x="5650878" y="1463080"/>
+            <a:ext cx="1223957" cy="792163"/>
+          </a:xfrm>
+          <a:prstGeom prst="flowChartDocument">
+            <a:avLst/>
+          </a:prstGeom>
+        </p:spPr>
+        <p:style>
+          <a:lnRef idx="1">
+            <a:schemeClr val="accent6"/>
+          </a:lnRef>
+          <a:fillRef idx="2">
+            <a:schemeClr val="accent6"/>
+          </a:fillRef>
+          <a:effectRef idx="1">
+            <a:schemeClr val="accent6"/>
+          </a:effectRef>
+          <a:fontRef idx="minor">
+            <a:schemeClr val="dk1"/>
+          </a:fontRef>
+        </p:style>
+        <p:txBody>
+          <a:bodyPr anchor="ctr"/>
+          <a:lstStyle/>
+          <a:p>
+            <a:pPr algn="ctr" eaLnBrk="0" fontAlgn="auto" hangingPunct="0">
+              <a:spcBef>
+                <a:spcPts val="0"/>
+              </a:spcBef>
+              <a:spcAft>
+                <a:spcPts val="0"/>
+              </a:spcAft>
+              <a:defRPr/>
+            </a:pPr>
+            <a:r>
+              <a:rPr lang="en-US" sz="1600" dirty="0" err="1">
+                <a:cs typeface="Arial" panose="020B0604020202020204" pitchFamily="34" charset="0"/>
+              </a:rPr>
+              <a:t>cfDNA</a:t>
+            </a:r>
+            <a:r>
+              <a:rPr lang="en-US" sz="1600" dirty="0">
+                <a:cs typeface="Arial" panose="020B0604020202020204" pitchFamily="34" charset="0"/>
+              </a:rPr>
+              <a:t> panel</a:t>
+            </a:r>
+          </a:p>
+        </p:txBody>
+      </p:sp>
+      <p:sp>
+        <p:nvSpPr>
+          <p:cNvPr id="9" name="Flussdiagramm: Dokument 8">
+            <a:extLst>
+              <a:ext uri="{FF2B5EF4-FFF2-40B4-BE49-F238E27FC236}">
+                <a16:creationId xmlns:a16="http://schemas.microsoft.com/office/drawing/2014/main" id="{389E820D-107F-49CF-B4EB-1EC8A864A7F9}"/>
+              </a:ext>
+            </a:extLst>
+          </p:cNvPr>
+          <p:cNvSpPr/>
+          <p:nvPr/>
+        </p:nvSpPr>
+        <p:spPr>
+          <a:xfrm>
+            <a:off x="3996109" y="2636837"/>
+            <a:ext cx="1223962" cy="792163"/>
+          </a:xfrm>
+          <a:prstGeom prst="flowChartDocument">
+            <a:avLst/>
+          </a:prstGeom>
+        </p:spPr>
+        <p:style>
+          <a:lnRef idx="1">
+            <a:schemeClr val="accent6"/>
+          </a:lnRef>
+          <a:fillRef idx="2">
+            <a:schemeClr val="accent6"/>
+          </a:fillRef>
+          <a:effectRef idx="1">
+            <a:schemeClr val="accent6"/>
+          </a:effectRef>
+          <a:fontRef idx="minor">
+            <a:schemeClr val="dk1"/>
+          </a:fontRef>
+        </p:style>
+        <p:txBody>
+          <a:bodyPr anchor="ctr"/>
+          <a:lstStyle/>
+          <a:p>
+            <a:pPr algn="ctr" eaLnBrk="0" fontAlgn="auto" hangingPunct="0">
+              <a:spcBef>
+                <a:spcPts val="0"/>
+              </a:spcBef>
+              <a:spcAft>
+                <a:spcPts val="0"/>
+              </a:spcAft>
+              <a:defRPr/>
+            </a:pPr>
+            <a:r>
+              <a:rPr lang="en-US" sz="1600" dirty="0">
+                <a:cs typeface="Arial" panose="020B0604020202020204" pitchFamily="34" charset="0"/>
+              </a:rPr>
+              <a:t>BAM</a:t>
+            </a:r>
+          </a:p>
+        </p:txBody>
+      </p:sp>
+      <p:sp>
+        <p:nvSpPr>
+          <p:cNvPr id="10" name="Flussdiagramm: Prozess 9">
+            <a:extLst>
+              <a:ext uri="{FF2B5EF4-FFF2-40B4-BE49-F238E27FC236}">
+                <a16:creationId xmlns:a16="http://schemas.microsoft.com/office/drawing/2014/main" id="{BD635720-DFA2-4BF8-B4A8-D546D02CABB8}"/>
+              </a:ext>
+            </a:extLst>
+          </p:cNvPr>
+          <p:cNvSpPr/>
+          <p:nvPr/>
+        </p:nvSpPr>
+        <p:spPr>
+          <a:xfrm>
+            <a:off x="5650878" y="2636837"/>
+            <a:ext cx="1223962" cy="792163"/>
+          </a:xfrm>
+          <a:prstGeom prst="flowChartProcess">
+            <a:avLst/>
+          </a:prstGeom>
+          <a:ln/>
+        </p:spPr>
+        <p:style>
+          <a:lnRef idx="1">
+            <a:schemeClr val="accent1"/>
+          </a:lnRef>
+          <a:fillRef idx="2">
+            <a:schemeClr val="accent1"/>
+          </a:fillRef>
+          <a:effectRef idx="1">
+            <a:schemeClr val="accent1"/>
+          </a:effectRef>
+          <a:fontRef idx="minor">
+            <a:schemeClr val="dk1"/>
+          </a:fontRef>
+        </p:style>
+        <p:txBody>
+          <a:bodyPr anchor="ctr"/>
+          <a:lstStyle/>
+          <a:p>
+            <a:pPr algn="ctr" eaLnBrk="0" fontAlgn="auto" hangingPunct="0">
+              <a:spcBef>
+                <a:spcPts val="0"/>
+              </a:spcBef>
+              <a:spcAft>
+                <a:spcPts val="0"/>
+              </a:spcAft>
+              <a:defRPr/>
+            </a:pPr>
+            <a:r>
+              <a:rPr lang="en-US" sz="1200" dirty="0">
+                <a:cs typeface="Arial" panose="020B0604020202020204" pitchFamily="34" charset="0"/>
+              </a:rPr>
+              <a:t>variant calling</a:t>
+            </a:r>
+            <a:br>
+              <a:rPr lang="en-US" sz="1200" dirty="0">
+                <a:cs typeface="Arial" panose="020B0604020202020204" pitchFamily="34" charset="0"/>
+              </a:rPr>
+            </a:br>
+            <a:r>
+              <a:rPr lang="en-US" sz="1200" dirty="0">
+                <a:cs typeface="Arial" panose="020B0604020202020204" pitchFamily="34" charset="0"/>
+              </a:rPr>
+              <a:t>+ annotation</a:t>
+            </a:r>
+            <a:br>
+              <a:rPr lang="en-US" sz="1200" dirty="0">
+                <a:cs typeface="Arial" panose="020B0604020202020204" pitchFamily="34" charset="0"/>
+              </a:rPr>
+            </a:br>
+            <a:r>
+              <a:rPr lang="en-US" sz="1200" dirty="0">
+                <a:cs typeface="Arial" panose="020B0604020202020204" pitchFamily="34" charset="0"/>
+              </a:rPr>
+              <a:t>(small variants)</a:t>
+            </a:r>
+          </a:p>
+        </p:txBody>
+      </p:sp>
+      <p:cxnSp>
+        <p:nvCxnSpPr>
+          <p:cNvPr id="14" name="Gerade Verbindung mit Pfeil 14">
+            <a:extLst>
+              <a:ext uri="{FF2B5EF4-FFF2-40B4-BE49-F238E27FC236}">
+                <a16:creationId xmlns:a16="http://schemas.microsoft.com/office/drawing/2014/main" id="{FCB548C6-74E5-48F0-A820-27C9F55B0318}"/>
+              </a:ext>
+            </a:extLst>
+          </p:cNvPr>
+          <p:cNvCxnSpPr>
+            <a:cxnSpLocks/>
+          </p:cNvCxnSpPr>
+          <p:nvPr/>
+        </p:nvCxnSpPr>
+        <p:spPr>
+          <a:xfrm>
+            <a:off x="5220071" y="3032918"/>
+            <a:ext cx="430807" cy="0"/>
+          </a:xfrm>
+          <a:prstGeom prst="straightConnector1">
+            <a:avLst/>
+          </a:prstGeom>
+          <a:ln>
+            <a:tailEnd type="triangle" w="med" len="med"/>
+          </a:ln>
+        </p:spPr>
+        <p:style>
+          <a:lnRef idx="1">
+            <a:schemeClr val="accent1"/>
+          </a:lnRef>
+          <a:fillRef idx="0">
+            <a:schemeClr val="accent1"/>
+          </a:fillRef>
+          <a:effectRef idx="0">
+            <a:schemeClr val="accent1"/>
+          </a:effectRef>
+          <a:fontRef idx="minor">
+            <a:schemeClr val="tx1"/>
+          </a:fontRef>
+        </p:style>
+      </p:cxnSp>
+      <p:cxnSp>
+        <p:nvCxnSpPr>
+          <p:cNvPr id="18" name="Gerade Verbindung mit Pfeil 14">
+            <a:extLst>
+              <a:ext uri="{FF2B5EF4-FFF2-40B4-BE49-F238E27FC236}">
+                <a16:creationId xmlns:a16="http://schemas.microsoft.com/office/drawing/2014/main" id="{E65DDBA4-BEBD-4E70-B9C7-9019CE4E05DA}"/>
+              </a:ext>
+            </a:extLst>
+          </p:cNvPr>
+          <p:cNvCxnSpPr>
+            <a:cxnSpLocks/>
+            <a:stCxn id="8" idx="2"/>
+            <a:endCxn id="10" idx="0"/>
+          </p:cNvCxnSpPr>
+          <p:nvPr/>
+        </p:nvCxnSpPr>
+        <p:spPr>
+          <a:xfrm>
+            <a:off x="6262857" y="2202872"/>
+            <a:ext cx="2" cy="433965"/>
+          </a:xfrm>
+          <a:prstGeom prst="straightConnector1">
+            <a:avLst/>
+          </a:prstGeom>
+          <a:ln>
+            <a:tailEnd type="triangle" w="med" len="med"/>
+          </a:ln>
+        </p:spPr>
+        <p:style>
+          <a:lnRef idx="1">
+            <a:schemeClr val="accent1"/>
+          </a:lnRef>
+          <a:fillRef idx="0">
+            <a:schemeClr val="accent1"/>
+          </a:fillRef>
+          <a:effectRef idx="0">
+            <a:schemeClr val="accent1"/>
+          </a:effectRef>
+          <a:fontRef idx="minor">
+            <a:schemeClr val="tx1"/>
+          </a:fontRef>
+        </p:style>
+      </p:cxnSp>
+      <p:sp>
+        <p:nvSpPr>
+          <p:cNvPr id="67" name="Flussdiagramm: Dokument 66">
+            <a:extLst>
+              <a:ext uri="{FF2B5EF4-FFF2-40B4-BE49-F238E27FC236}">
+                <a16:creationId xmlns:a16="http://schemas.microsoft.com/office/drawing/2014/main" id="{A88B5627-EC3B-491D-B7BA-06A6BD81F63F}"/>
+              </a:ext>
+            </a:extLst>
+          </p:cNvPr>
+          <p:cNvSpPr/>
+          <p:nvPr/>
+        </p:nvSpPr>
+        <p:spPr>
+          <a:xfrm>
+            <a:off x="7305638" y="2636837"/>
+            <a:ext cx="1223957" cy="792163"/>
+          </a:xfrm>
+          <a:prstGeom prst="flowChartDocument">
+            <a:avLst/>
+          </a:prstGeom>
+        </p:spPr>
+        <p:style>
+          <a:lnRef idx="1">
+            <a:schemeClr val="accent6"/>
+          </a:lnRef>
+          <a:fillRef idx="2">
+            <a:schemeClr val="accent6"/>
+          </a:fillRef>
+          <a:effectRef idx="1">
+            <a:schemeClr val="accent6"/>
+          </a:effectRef>
+          <a:fontRef idx="minor">
+            <a:schemeClr val="dk1"/>
+          </a:fontRef>
+        </p:style>
+        <p:txBody>
+          <a:bodyPr anchor="ctr"/>
+          <a:lstStyle/>
+          <a:p>
+            <a:pPr algn="ctr" eaLnBrk="0" fontAlgn="auto" hangingPunct="0">
+              <a:spcBef>
+                <a:spcPts val="0"/>
+              </a:spcBef>
+              <a:spcAft>
+                <a:spcPts val="0"/>
+              </a:spcAft>
+              <a:defRPr/>
+            </a:pPr>
+            <a:r>
+              <a:rPr lang="en-US" sz="1600" dirty="0">
+                <a:cs typeface="Arial" panose="020B0604020202020204" pitchFamily="34" charset="0"/>
+              </a:rPr>
+              <a:t>VCF + </a:t>
+            </a:r>
+          </a:p>
+          <a:p>
+            <a:pPr algn="ctr" eaLnBrk="0" fontAlgn="auto" hangingPunct="0">
+              <a:spcBef>
+                <a:spcPts val="0"/>
+              </a:spcBef>
+              <a:spcAft>
+                <a:spcPts val="0"/>
+              </a:spcAft>
+              <a:defRPr/>
+            </a:pPr>
+            <a:r>
+              <a:rPr lang="en-US" sz="1600" dirty="0">
+                <a:cs typeface="Arial" panose="020B0604020202020204" pitchFamily="34" charset="0"/>
+              </a:rPr>
+              <a:t>GSvar</a:t>
+            </a:r>
+          </a:p>
+        </p:txBody>
+      </p:sp>
+      <p:cxnSp>
+        <p:nvCxnSpPr>
+          <p:cNvPr id="69" name="Gerade Verbindung mit Pfeil 68">
+            <a:extLst>
+              <a:ext uri="{FF2B5EF4-FFF2-40B4-BE49-F238E27FC236}">
+                <a16:creationId xmlns:a16="http://schemas.microsoft.com/office/drawing/2014/main" id="{D606AF6F-9D20-4BE2-B19D-402228C5932B}"/>
+              </a:ext>
+            </a:extLst>
+          </p:cNvPr>
+          <p:cNvCxnSpPr>
+            <a:cxnSpLocks/>
+          </p:cNvCxnSpPr>
+          <p:nvPr/>
+        </p:nvCxnSpPr>
+        <p:spPr>
+          <a:xfrm>
+            <a:off x="6874840" y="3032918"/>
+            <a:ext cx="430798" cy="0"/>
+          </a:xfrm>
+          <a:prstGeom prst="straightConnector1">
+            <a:avLst/>
+          </a:prstGeom>
+          <a:ln>
+            <a:tailEnd type="triangle"/>
+          </a:ln>
+        </p:spPr>
+        <p:style>
+          <a:lnRef idx="1">
+            <a:schemeClr val="accent1"/>
+          </a:lnRef>
+          <a:fillRef idx="0">
+            <a:schemeClr val="accent1"/>
+          </a:fillRef>
+          <a:effectRef idx="0">
+            <a:schemeClr val="accent1"/>
+          </a:effectRef>
+          <a:fontRef idx="minor">
+            <a:schemeClr val="tx1"/>
+          </a:fontRef>
+        </p:style>
+      </p:cxnSp>
+    </p:spTree>
+    <p:extLst>
+      <p:ext uri="{BB962C8B-B14F-4D97-AF65-F5344CB8AC3E}">
+        <p14:creationId xmlns:p14="http://schemas.microsoft.com/office/powerpoint/2010/main" val="1325170806"/>
+      </p:ext>
+    </p:extLst>
+  </p:cSld>
+  <p:clrMapOvr>
+    <a:masterClrMapping/>
+  </p:clrMapOvr>
+</p:sld>
+</file>
+
+<file path=ppt/slides/slide4.xml><?xml version="1.0" encoding="utf-8"?>
+<p:sld xmlns:a="http://schemas.openxmlformats.org/drawingml/2006/main" xmlns:r="http://schemas.openxmlformats.org/officeDocument/2006/relationships" xmlns:p="http://schemas.openxmlformats.org/presentationml/2006/main">
+  <p:cSld>
+    <p:spTree>
+      <p:nvGrpSpPr>
+        <p:cNvPr id="1" name=""/>
+        <p:cNvGrpSpPr/>
+        <p:nvPr/>
+      </p:nvGrpSpPr>
+      <p:grpSpPr>
+        <a:xfrm>
+          <a:off x="0" y="0"/>
+          <a:ext cx="0" cy="0"/>
+          <a:chOff x="0" y="0"/>
+          <a:chExt cx="0" cy="0"/>
+        </a:xfrm>
+      </p:grpSpPr>
+      <p:sp>
+        <p:nvSpPr>
+          <p:cNvPr id="2" name="Titel 1">
+            <a:extLst>
+              <a:ext uri="{FF2B5EF4-FFF2-40B4-BE49-F238E27FC236}">
+                <a16:creationId xmlns:a16="http://schemas.microsoft.com/office/drawing/2014/main" id="{5BDCE5FF-F58E-4091-94F9-85AEADDEFE51}"/>
+              </a:ext>
+            </a:extLst>
+          </p:cNvPr>
+          <p:cNvSpPr>
+            <a:spLocks noGrp="1"/>
+          </p:cNvSpPr>
+          <p:nvPr>
+            <p:ph type="title"/>
+          </p:nvPr>
+        </p:nvSpPr>
+        <p:spPr/>
+        <p:txBody>
+          <a:bodyPr/>
+          <a:lstStyle/>
+          <a:p>
+            <a:r>
+              <a:rPr lang="de-DE" dirty="0"/>
+              <a:t>RNA </a:t>
+            </a:r>
+            <a:r>
+              <a:rPr lang="de-DE" dirty="0" err="1"/>
+              <a:t>pipeline</a:t>
+            </a:r>
+            <a:endParaRPr lang="de-DE" dirty="0"/>
+          </a:p>
+        </p:txBody>
+      </p:sp>
+      <p:grpSp>
+        <p:nvGrpSpPr>
+          <p:cNvPr id="62" name="Gruppieren 61">
+            <a:extLst>
+              <a:ext uri="{FF2B5EF4-FFF2-40B4-BE49-F238E27FC236}">
+                <a16:creationId xmlns:a16="http://schemas.microsoft.com/office/drawing/2014/main" id="{7BB5D6D8-79DA-4804-B1D5-D0DBF7FC298C}"/>
+              </a:ext>
+            </a:extLst>
+          </p:cNvPr>
+          <p:cNvGrpSpPr/>
+          <p:nvPr/>
+        </p:nvGrpSpPr>
+        <p:grpSpPr>
+          <a:xfrm>
+            <a:off x="179513" y="1325141"/>
+            <a:ext cx="8640960" cy="3265957"/>
+            <a:chOff x="327201" y="1325141"/>
+            <a:chExt cx="9440687" cy="3265957"/>
+          </a:xfrm>
+        </p:grpSpPr>
+        <p:sp>
+          <p:nvSpPr>
+            <p:cNvPr id="4" name="Flussdiagramm: Dokument 3">
+              <a:extLst>
+                <a:ext uri="{FF2B5EF4-FFF2-40B4-BE49-F238E27FC236}">
+                  <a16:creationId xmlns:a16="http://schemas.microsoft.com/office/drawing/2014/main" id="{5AD83F34-C5BB-41B7-8E4E-43CFF0D559EB}"/>
+                </a:ext>
+              </a:extLst>
+            </p:cNvPr>
+            <p:cNvSpPr/>
+            <p:nvPr/>
+          </p:nvSpPr>
+          <p:spPr>
+            <a:xfrm>
+              <a:off x="327201" y="2420888"/>
+              <a:ext cx="1081087" cy="792163"/>
+            </a:xfrm>
+            <a:prstGeom prst="flowChartDocument">
+              <a:avLst/>
+            </a:prstGeom>
+          </p:spPr>
+          <p:style>
+            <a:lnRef idx="1">
+              <a:schemeClr val="accent6"/>
+            </a:lnRef>
+            <a:fillRef idx="2">
+              <a:schemeClr val="accent6"/>
+            </a:fillRef>
+            <a:effectRef idx="1">
+              <a:schemeClr val="accent6"/>
+            </a:effectRef>
+            <a:fontRef idx="minor">
+              <a:schemeClr val="dk1"/>
+            </a:fontRef>
+          </p:style>
+          <p:txBody>
+            <a:bodyPr anchor="ctr"/>
+            <a:lstStyle/>
+            <a:p>
+              <a:pPr algn="ctr" eaLnBrk="0" fontAlgn="auto" hangingPunct="0">
+                <a:spcBef>
+                  <a:spcPts val="0"/>
+                </a:spcBef>
+                <a:spcAft>
+                  <a:spcPts val="0"/>
+                </a:spcAft>
+                <a:defRPr/>
+              </a:pPr>
+              <a:r>
+                <a:rPr lang="en-US" sz="1600" dirty="0">
+                  <a:cs typeface="Arial" panose="020B0604020202020204" pitchFamily="34" charset="0"/>
+                </a:rPr>
+                <a:t>FASTQ</a:t>
+              </a:r>
+            </a:p>
+          </p:txBody>
+        </p:sp>
+        <p:sp>
+          <p:nvSpPr>
+            <p:cNvPr id="5" name="Flussdiagramm: Prozess 4">
+              <a:extLst>
+                <a:ext uri="{FF2B5EF4-FFF2-40B4-BE49-F238E27FC236}">
+                  <a16:creationId xmlns:a16="http://schemas.microsoft.com/office/drawing/2014/main" id="{C2863AA6-23D2-448E-B7BB-B8E9667179C9}"/>
+                </a:ext>
+              </a:extLst>
+            </p:cNvPr>
+            <p:cNvSpPr/>
+            <p:nvPr/>
+          </p:nvSpPr>
+          <p:spPr>
+            <a:xfrm>
+              <a:off x="1910533" y="2420888"/>
+              <a:ext cx="1223962" cy="792163"/>
+            </a:xfrm>
+            <a:prstGeom prst="flowChartProcess">
+              <a:avLst/>
+            </a:prstGeom>
+            <a:ln/>
+          </p:spPr>
+          <p:style>
+            <a:lnRef idx="1">
+              <a:schemeClr val="accent1"/>
+            </a:lnRef>
+            <a:fillRef idx="2">
+              <a:schemeClr val="accent1"/>
+            </a:fillRef>
+            <a:effectRef idx="1">
+              <a:schemeClr val="accent1"/>
+            </a:effectRef>
+            <a:fontRef idx="minor">
+              <a:schemeClr val="dk1"/>
+            </a:fontRef>
+          </p:style>
+          <p:txBody>
+            <a:bodyPr anchor="ctr"/>
+            <a:lstStyle/>
+            <a:p>
+              <a:pPr algn="ctr" eaLnBrk="0" fontAlgn="auto" hangingPunct="0">
+                <a:spcBef>
+                  <a:spcPts val="0"/>
+                </a:spcBef>
+                <a:spcAft>
+                  <a:spcPts val="0"/>
+                </a:spcAft>
+                <a:defRPr/>
+              </a:pPr>
+              <a:r>
+                <a:rPr lang="en-US" sz="1600" dirty="0">
+                  <a:cs typeface="Arial" panose="020B0604020202020204" pitchFamily="34" charset="0"/>
+                </a:rPr>
+                <a:t>mapping</a:t>
+              </a:r>
+            </a:p>
+          </p:txBody>
+        </p:sp>
+        <p:cxnSp>
+          <p:nvCxnSpPr>
+            <p:cNvPr id="6" name="Gerade Verbindung mit Pfeil 14">
+              <a:extLst>
+                <a:ext uri="{FF2B5EF4-FFF2-40B4-BE49-F238E27FC236}">
+                  <a16:creationId xmlns:a16="http://schemas.microsoft.com/office/drawing/2014/main" id="{718F3D3F-AA64-4384-A745-F820C3D6C524}"/>
+                </a:ext>
+              </a:extLst>
+            </p:cNvPr>
+            <p:cNvCxnSpPr>
+              <a:stCxn id="4" idx="3"/>
+              <a:endCxn id="5" idx="1"/>
+            </p:cNvCxnSpPr>
+            <p:nvPr/>
+          </p:nvCxnSpPr>
+          <p:spPr>
+            <a:xfrm>
+              <a:off x="1408288" y="2816970"/>
+              <a:ext cx="502245" cy="0"/>
+            </a:xfrm>
+            <a:prstGeom prst="straightConnector1">
+              <a:avLst/>
+            </a:prstGeom>
+            <a:ln>
+              <a:tailEnd type="triangle" w="med" len="med"/>
+            </a:ln>
+          </p:spPr>
+          <p:style>
+            <a:lnRef idx="1">
+              <a:schemeClr val="accent1"/>
+            </a:lnRef>
+            <a:fillRef idx="0">
+              <a:schemeClr val="accent1"/>
+            </a:fillRef>
+            <a:effectRef idx="0">
+              <a:schemeClr val="accent1"/>
+            </a:effectRef>
+            <a:fontRef idx="minor">
+              <a:schemeClr val="tx1"/>
+            </a:fontRef>
+          </p:style>
+        </p:cxnSp>
+        <p:cxnSp>
+          <p:nvCxnSpPr>
+            <p:cNvPr id="7" name="Gerade Verbindung mit Pfeil 14">
+              <a:extLst>
+                <a:ext uri="{FF2B5EF4-FFF2-40B4-BE49-F238E27FC236}">
+                  <a16:creationId xmlns:a16="http://schemas.microsoft.com/office/drawing/2014/main" id="{6C49D2DF-406A-4685-8460-5834BB2E06AA}"/>
+                </a:ext>
+              </a:extLst>
+            </p:cNvPr>
+            <p:cNvCxnSpPr>
+              <a:cxnSpLocks/>
+              <a:stCxn id="5" idx="3"/>
+              <a:endCxn id="9" idx="1"/>
+            </p:cNvCxnSpPr>
+            <p:nvPr/>
+          </p:nvCxnSpPr>
+          <p:spPr>
+            <a:xfrm>
+              <a:off x="3134495" y="2816970"/>
+              <a:ext cx="502245" cy="1"/>
+            </a:xfrm>
+            <a:prstGeom prst="straightConnector1">
+              <a:avLst/>
+            </a:prstGeom>
+            <a:ln>
+              <a:tailEnd type="triangle" w="med" len="med"/>
+            </a:ln>
+          </p:spPr>
+          <p:style>
+            <a:lnRef idx="1">
+              <a:schemeClr val="accent1"/>
+            </a:lnRef>
+            <a:fillRef idx="0">
+              <a:schemeClr val="accent1"/>
+            </a:fillRef>
+            <a:effectRef idx="0">
+              <a:schemeClr val="accent1"/>
+            </a:effectRef>
+            <a:fontRef idx="minor">
+              <a:schemeClr val="tx1"/>
+            </a:fontRef>
+          </p:style>
+        </p:cxnSp>
+        <p:sp>
+          <p:nvSpPr>
+            <p:cNvPr id="9" name="Flussdiagramm: Dokument 8">
+              <a:extLst>
+                <a:ext uri="{FF2B5EF4-FFF2-40B4-BE49-F238E27FC236}">
+                  <a16:creationId xmlns:a16="http://schemas.microsoft.com/office/drawing/2014/main" id="{D8BE1202-11E2-49C2-A2CA-35502BD05191}"/>
+                </a:ext>
+              </a:extLst>
+            </p:cNvPr>
+            <p:cNvSpPr/>
+            <p:nvPr/>
+          </p:nvSpPr>
+          <p:spPr>
+            <a:xfrm>
+              <a:off x="3636740" y="2420889"/>
+              <a:ext cx="1081087" cy="792163"/>
+            </a:xfrm>
+            <a:prstGeom prst="flowChartDocument">
+              <a:avLst/>
+            </a:prstGeom>
+          </p:spPr>
+          <p:style>
+            <a:lnRef idx="1">
+              <a:schemeClr val="accent6"/>
+            </a:lnRef>
+            <a:fillRef idx="2">
+              <a:schemeClr val="accent6"/>
+            </a:fillRef>
+            <a:effectRef idx="1">
+              <a:schemeClr val="accent6"/>
+            </a:effectRef>
+            <a:fontRef idx="minor">
+              <a:schemeClr val="dk1"/>
+            </a:fontRef>
+          </p:style>
+          <p:txBody>
+            <a:bodyPr anchor="ctr"/>
+            <a:lstStyle/>
+            <a:p>
+              <a:pPr algn="ctr" eaLnBrk="0" fontAlgn="auto" hangingPunct="0">
+                <a:spcBef>
+                  <a:spcPts val="0"/>
+                </a:spcBef>
+                <a:spcAft>
+                  <a:spcPts val="0"/>
+                </a:spcAft>
+                <a:defRPr/>
+              </a:pPr>
+              <a:r>
+                <a:rPr lang="en-US" sz="1600" dirty="0">
+                  <a:cs typeface="Arial" panose="020B0604020202020204" pitchFamily="34" charset="0"/>
+                </a:rPr>
+                <a:t>BAM</a:t>
+              </a:r>
+            </a:p>
+          </p:txBody>
+        </p:sp>
+        <p:sp>
+          <p:nvSpPr>
+            <p:cNvPr id="11" name="Flussdiagramm: Dokument 10">
+              <a:extLst>
+                <a:ext uri="{FF2B5EF4-FFF2-40B4-BE49-F238E27FC236}">
+                  <a16:creationId xmlns:a16="http://schemas.microsoft.com/office/drawing/2014/main" id="{475FAC8E-0BEC-40AA-AF5C-CEE9F9C84F06}"/>
+                </a:ext>
+              </a:extLst>
+            </p:cNvPr>
+            <p:cNvSpPr/>
+            <p:nvPr/>
+          </p:nvSpPr>
+          <p:spPr>
+            <a:xfrm>
+              <a:off x="8670457" y="2420888"/>
+              <a:ext cx="1081088" cy="792163"/>
+            </a:xfrm>
+            <a:prstGeom prst="flowChartDocument">
+              <a:avLst/>
+            </a:prstGeom>
+          </p:spPr>
+          <p:style>
+            <a:lnRef idx="1">
+              <a:schemeClr val="accent6"/>
+            </a:lnRef>
+            <a:fillRef idx="2">
+              <a:schemeClr val="accent6"/>
+            </a:fillRef>
+            <a:effectRef idx="1">
+              <a:schemeClr val="accent6"/>
+            </a:effectRef>
+            <a:fontRef idx="minor">
+              <a:schemeClr val="dk1"/>
+            </a:fontRef>
+          </p:style>
+          <p:txBody>
+            <a:bodyPr anchor="ctr"/>
+            <a:lstStyle/>
+            <a:p>
+              <a:pPr algn="ctr" eaLnBrk="0" fontAlgn="auto" hangingPunct="0">
+                <a:spcBef>
+                  <a:spcPts val="0"/>
+                </a:spcBef>
+                <a:spcAft>
+                  <a:spcPts val="0"/>
+                </a:spcAft>
+                <a:defRPr/>
+              </a:pPr>
+              <a:r>
+                <a:rPr lang="en-US" sz="1600" dirty="0">
+                  <a:cs typeface="Arial" panose="020B0604020202020204" pitchFamily="34" charset="0"/>
+                </a:rPr>
+                <a:t>TSV</a:t>
+              </a:r>
+            </a:p>
+          </p:txBody>
+        </p:sp>
+        <p:sp>
+          <p:nvSpPr>
+            <p:cNvPr id="12" name="Flussdiagramm: Prozess 11">
+              <a:extLst>
+                <a:ext uri="{FF2B5EF4-FFF2-40B4-BE49-F238E27FC236}">
+                  <a16:creationId xmlns:a16="http://schemas.microsoft.com/office/drawing/2014/main" id="{C372A0B6-458F-4EB5-88F8-855D4D1AAD06}"/>
+                </a:ext>
+              </a:extLst>
+            </p:cNvPr>
+            <p:cNvSpPr/>
+            <p:nvPr/>
+          </p:nvSpPr>
+          <p:spPr>
+            <a:xfrm>
+              <a:off x="5220072" y="2420888"/>
+              <a:ext cx="1223962" cy="792163"/>
+            </a:xfrm>
+            <a:prstGeom prst="flowChartProcess">
+              <a:avLst/>
+            </a:prstGeom>
+            <a:ln/>
+          </p:spPr>
+          <p:style>
+            <a:lnRef idx="1">
+              <a:schemeClr val="accent1"/>
+            </a:lnRef>
+            <a:fillRef idx="2">
+              <a:schemeClr val="accent1"/>
+            </a:fillRef>
+            <a:effectRef idx="1">
+              <a:schemeClr val="accent1"/>
+            </a:effectRef>
+            <a:fontRef idx="minor">
+              <a:schemeClr val="dk1"/>
+            </a:fontRef>
+          </p:style>
+          <p:txBody>
+            <a:bodyPr anchor="ctr"/>
+            <a:lstStyle/>
+            <a:p>
+              <a:pPr algn="ctr" eaLnBrk="0" fontAlgn="auto" hangingPunct="0">
+                <a:spcBef>
+                  <a:spcPts val="0"/>
+                </a:spcBef>
+                <a:spcAft>
+                  <a:spcPts val="0"/>
+                </a:spcAft>
+                <a:defRPr/>
+              </a:pPr>
+              <a:r>
+                <a:rPr lang="en-US" sz="1400" dirty="0">
+                  <a:cs typeface="Arial" panose="020B0604020202020204" pitchFamily="34" charset="0"/>
+                </a:rPr>
+                <a:t>read counting</a:t>
+              </a:r>
+            </a:p>
+          </p:txBody>
+        </p:sp>
+        <p:sp>
+          <p:nvSpPr>
+            <p:cNvPr id="13" name="Flussdiagramm: Dokument 12">
+              <a:extLst>
+                <a:ext uri="{FF2B5EF4-FFF2-40B4-BE49-F238E27FC236}">
+                  <a16:creationId xmlns:a16="http://schemas.microsoft.com/office/drawing/2014/main" id="{AA25C15A-136B-40B1-A236-EA5F53D2A8E0}"/>
+                </a:ext>
+              </a:extLst>
+            </p:cNvPr>
+            <p:cNvSpPr/>
+            <p:nvPr/>
+          </p:nvSpPr>
+          <p:spPr>
+            <a:xfrm>
+              <a:off x="8670457" y="1325141"/>
+              <a:ext cx="1081088" cy="792163"/>
+            </a:xfrm>
+            <a:prstGeom prst="flowChartDocument">
+              <a:avLst/>
+            </a:prstGeom>
+          </p:spPr>
+          <p:style>
+            <a:lnRef idx="1">
+              <a:schemeClr val="accent6"/>
+            </a:lnRef>
+            <a:fillRef idx="2">
+              <a:schemeClr val="accent6"/>
+            </a:fillRef>
+            <a:effectRef idx="1">
+              <a:schemeClr val="accent6"/>
+            </a:effectRef>
+            <a:fontRef idx="minor">
+              <a:schemeClr val="dk1"/>
+            </a:fontRef>
+          </p:style>
+          <p:txBody>
+            <a:bodyPr anchor="ctr"/>
+            <a:lstStyle/>
+            <a:p>
+              <a:pPr algn="ctr" eaLnBrk="0" fontAlgn="auto" hangingPunct="0">
+                <a:spcBef>
+                  <a:spcPts val="0"/>
+                </a:spcBef>
+                <a:spcAft>
+                  <a:spcPts val="0"/>
+                </a:spcAft>
+                <a:defRPr/>
+              </a:pPr>
+              <a:r>
+                <a:rPr lang="en-US" sz="1600" dirty="0">
+                  <a:cs typeface="Arial" panose="020B0604020202020204" pitchFamily="34" charset="0"/>
+                </a:rPr>
+                <a:t>PNG</a:t>
+              </a:r>
+            </a:p>
+          </p:txBody>
+        </p:sp>
+        <p:cxnSp>
+          <p:nvCxnSpPr>
+            <p:cNvPr id="15" name="Gerade Verbindung mit Pfeil 14">
+              <a:extLst>
+                <a:ext uri="{FF2B5EF4-FFF2-40B4-BE49-F238E27FC236}">
+                  <a16:creationId xmlns:a16="http://schemas.microsoft.com/office/drawing/2014/main" id="{A7AF11B6-21FA-487E-9290-D93B7B7BF67A}"/>
+                </a:ext>
+              </a:extLst>
+            </p:cNvPr>
+            <p:cNvCxnSpPr>
+              <a:cxnSpLocks/>
+              <a:stCxn id="9" idx="3"/>
+              <a:endCxn id="12" idx="1"/>
+            </p:cNvCxnSpPr>
+            <p:nvPr/>
+          </p:nvCxnSpPr>
+          <p:spPr>
+            <a:xfrm flipV="1">
+              <a:off x="4717827" y="2816970"/>
+              <a:ext cx="502245" cy="1"/>
+            </a:xfrm>
+            <a:prstGeom prst="straightConnector1">
+              <a:avLst/>
+            </a:prstGeom>
+            <a:ln>
+              <a:tailEnd type="triangle" w="med" len="med"/>
+            </a:ln>
+          </p:spPr>
+          <p:style>
+            <a:lnRef idx="1">
+              <a:schemeClr val="accent1"/>
+            </a:lnRef>
+            <a:fillRef idx="0">
+              <a:schemeClr val="accent1"/>
+            </a:fillRef>
+            <a:effectRef idx="0">
+              <a:schemeClr val="accent1"/>
+            </a:effectRef>
+            <a:fontRef idx="minor">
+              <a:schemeClr val="tx1"/>
+            </a:fontRef>
+          </p:style>
+        </p:cxnSp>
+        <p:sp>
+          <p:nvSpPr>
+            <p:cNvPr id="17" name="Flussdiagramm: Prozess 16">
+              <a:extLst>
+                <a:ext uri="{FF2B5EF4-FFF2-40B4-BE49-F238E27FC236}">
+                  <a16:creationId xmlns:a16="http://schemas.microsoft.com/office/drawing/2014/main" id="{1BB39392-62BD-4824-9244-B9B665DF758E}"/>
+                </a:ext>
+              </a:extLst>
+            </p:cNvPr>
+            <p:cNvSpPr/>
+            <p:nvPr/>
+          </p:nvSpPr>
+          <p:spPr>
+            <a:xfrm>
+              <a:off x="6946279" y="2420888"/>
+              <a:ext cx="1223962" cy="792163"/>
+            </a:xfrm>
+            <a:prstGeom prst="flowChartProcess">
+              <a:avLst/>
+            </a:prstGeom>
+            <a:ln/>
+          </p:spPr>
+          <p:style>
+            <a:lnRef idx="1">
+              <a:schemeClr val="accent1"/>
+            </a:lnRef>
+            <a:fillRef idx="2">
+              <a:schemeClr val="accent1"/>
+            </a:fillRef>
+            <a:effectRef idx="1">
+              <a:schemeClr val="accent1"/>
+            </a:effectRef>
+            <a:fontRef idx="minor">
+              <a:schemeClr val="dk1"/>
+            </a:fontRef>
+          </p:style>
+          <p:txBody>
+            <a:bodyPr anchor="ctr"/>
+            <a:lstStyle/>
+            <a:p>
+              <a:pPr algn="ctr" eaLnBrk="0" fontAlgn="auto" hangingPunct="0">
+                <a:spcBef>
+                  <a:spcPts val="0"/>
+                </a:spcBef>
+                <a:spcAft>
+                  <a:spcPts val="0"/>
+                </a:spcAft>
+                <a:defRPr/>
+              </a:pPr>
+              <a:r>
+                <a:rPr lang="en-US" sz="1400" dirty="0">
+                  <a:cs typeface="Arial" panose="020B0604020202020204" pitchFamily="34" charset="0"/>
+                </a:rPr>
+                <a:t>annotation</a:t>
+              </a:r>
+            </a:p>
+          </p:txBody>
+        </p:sp>
+        <p:cxnSp>
+          <p:nvCxnSpPr>
+            <p:cNvPr id="19" name="Gerade Verbindung mit Pfeil 14">
+              <a:extLst>
+                <a:ext uri="{FF2B5EF4-FFF2-40B4-BE49-F238E27FC236}">
+                  <a16:creationId xmlns:a16="http://schemas.microsoft.com/office/drawing/2014/main" id="{5DAAACBE-D2C3-4F5B-B2CC-A9825912F9C1}"/>
+                </a:ext>
+              </a:extLst>
+            </p:cNvPr>
+            <p:cNvCxnSpPr>
+              <a:cxnSpLocks/>
+              <a:stCxn id="12" idx="3"/>
+              <a:endCxn id="17" idx="1"/>
+            </p:cNvCxnSpPr>
+            <p:nvPr/>
+          </p:nvCxnSpPr>
+          <p:spPr>
+            <a:xfrm>
+              <a:off x="6444034" y="2816970"/>
+              <a:ext cx="502245" cy="0"/>
+            </a:xfrm>
+            <a:prstGeom prst="straightConnector1">
+              <a:avLst/>
+            </a:prstGeom>
+            <a:ln>
+              <a:tailEnd type="triangle" w="med" len="med"/>
+            </a:ln>
+          </p:spPr>
+          <p:style>
+            <a:lnRef idx="1">
+              <a:schemeClr val="accent1"/>
+            </a:lnRef>
+            <a:fillRef idx="0">
+              <a:schemeClr val="accent1"/>
+            </a:fillRef>
+            <a:effectRef idx="0">
+              <a:schemeClr val="accent1"/>
+            </a:effectRef>
+            <a:fontRef idx="minor">
+              <a:schemeClr val="tx1"/>
+            </a:fontRef>
+          </p:style>
+        </p:cxnSp>
+        <p:cxnSp>
+          <p:nvCxnSpPr>
+            <p:cNvPr id="20" name="Gerade Verbindung mit Pfeil 14">
+              <a:extLst>
+                <a:ext uri="{FF2B5EF4-FFF2-40B4-BE49-F238E27FC236}">
+                  <a16:creationId xmlns:a16="http://schemas.microsoft.com/office/drawing/2014/main" id="{A159FB08-80CF-4876-8BA2-728E1A708FE7}"/>
+                </a:ext>
+              </a:extLst>
+            </p:cNvPr>
+            <p:cNvCxnSpPr>
+              <a:cxnSpLocks/>
+              <a:stCxn id="17" idx="3"/>
+              <a:endCxn id="11" idx="1"/>
+            </p:cNvCxnSpPr>
+            <p:nvPr/>
+          </p:nvCxnSpPr>
+          <p:spPr>
+            <a:xfrm>
+              <a:off x="8170241" y="2816970"/>
+              <a:ext cx="500216" cy="0"/>
+            </a:xfrm>
+            <a:prstGeom prst="straightConnector1">
+              <a:avLst/>
+            </a:prstGeom>
+            <a:ln>
+              <a:tailEnd type="triangle" w="med" len="med"/>
+            </a:ln>
+          </p:spPr>
+          <p:style>
+            <a:lnRef idx="1">
+              <a:schemeClr val="accent1"/>
+            </a:lnRef>
+            <a:fillRef idx="0">
+              <a:schemeClr val="accent1"/>
+            </a:fillRef>
+            <a:effectRef idx="0">
+              <a:schemeClr val="accent1"/>
+            </a:effectRef>
+            <a:fontRef idx="minor">
+              <a:schemeClr val="tx1"/>
+            </a:fontRef>
+          </p:style>
+        </p:cxnSp>
+        <p:sp>
+          <p:nvSpPr>
+            <p:cNvPr id="21" name="Sprechblase: rechteckig 20">
+              <a:extLst>
+                <a:ext uri="{FF2B5EF4-FFF2-40B4-BE49-F238E27FC236}">
+                  <a16:creationId xmlns:a16="http://schemas.microsoft.com/office/drawing/2014/main" id="{A004B3F9-60BB-4600-8080-634AD182ED56}"/>
+                </a:ext>
+              </a:extLst>
+            </p:cNvPr>
+            <p:cNvSpPr/>
+            <p:nvPr/>
+          </p:nvSpPr>
+          <p:spPr>
+            <a:xfrm>
+              <a:off x="610099" y="3754485"/>
+              <a:ext cx="1081087" cy="836613"/>
+            </a:xfrm>
+            <a:prstGeom prst="wedgeRectCallout">
+              <a:avLst>
+                <a:gd name="adj1" fmla="val -41391"/>
+                <a:gd name="adj2" fmla="val -128772"/>
+              </a:avLst>
+            </a:prstGeom>
+          </p:spPr>
+          <p:style>
+            <a:lnRef idx="0">
+              <a:schemeClr val="accent3"/>
+            </a:lnRef>
+            <a:fillRef idx="3">
+              <a:schemeClr val="accent3"/>
+            </a:fillRef>
+            <a:effectRef idx="3">
+              <a:schemeClr val="accent3"/>
+            </a:effectRef>
+            <a:fontRef idx="minor">
+              <a:schemeClr val="lt1"/>
+            </a:fontRef>
+          </p:style>
+          <p:txBody>
+            <a:bodyPr rtlCol="0" anchor="ctr"/>
+            <a:lstStyle/>
+            <a:p>
+              <a:pPr algn="ctr"/>
+              <a:r>
+                <a:rPr lang="en-US" sz="1050">
+                  <a:solidFill>
+                    <a:schemeClr val="tx1"/>
+                  </a:solidFill>
+                </a:rPr>
+                <a:t>Raw reads: bases and base qualities</a:t>
+              </a:r>
+            </a:p>
+          </p:txBody>
+        </p:sp>
+        <p:sp>
+          <p:nvSpPr>
+            <p:cNvPr id="22" name="Sprechblase: rechteckig 21">
+              <a:extLst>
+                <a:ext uri="{FF2B5EF4-FFF2-40B4-BE49-F238E27FC236}">
+                  <a16:creationId xmlns:a16="http://schemas.microsoft.com/office/drawing/2014/main" id="{811B38E3-EDC1-4588-AC0A-FC22F9ECA195}"/>
+                </a:ext>
+              </a:extLst>
+            </p:cNvPr>
+            <p:cNvSpPr/>
+            <p:nvPr/>
+          </p:nvSpPr>
+          <p:spPr>
+            <a:xfrm>
+              <a:off x="3529211" y="3754485"/>
+              <a:ext cx="1296144" cy="836613"/>
+            </a:xfrm>
+            <a:prstGeom prst="wedgeRectCallout">
+              <a:avLst>
+                <a:gd name="adj1" fmla="val 2794"/>
+                <a:gd name="adj2" fmla="val -134085"/>
+              </a:avLst>
+            </a:prstGeom>
+          </p:spPr>
+          <p:style>
+            <a:lnRef idx="0">
+              <a:schemeClr val="accent3"/>
+            </a:lnRef>
+            <a:fillRef idx="3">
+              <a:schemeClr val="accent3"/>
+            </a:fillRef>
+            <a:effectRef idx="3">
+              <a:schemeClr val="accent3"/>
+            </a:effectRef>
+            <a:fontRef idx="minor">
+              <a:schemeClr val="lt1"/>
+            </a:fontRef>
+          </p:style>
+          <p:txBody>
+            <a:bodyPr rtlCol="0" anchor="ctr"/>
+            <a:lstStyle/>
+            <a:p>
+              <a:pPr algn="ctr"/>
+              <a:r>
+                <a:rPr lang="en-US" sz="1050">
+                  <a:solidFill>
+                    <a:schemeClr val="tx1"/>
+                  </a:solidFill>
+                </a:rPr>
+                <a:t>Mapped reads: reads, base qualities and alignment to genome</a:t>
+              </a:r>
+            </a:p>
+          </p:txBody>
+        </p:sp>
+        <p:sp>
+          <p:nvSpPr>
+            <p:cNvPr id="29" name="Flussdiagramm: Prozess 28">
+              <a:extLst>
+                <a:ext uri="{FF2B5EF4-FFF2-40B4-BE49-F238E27FC236}">
+                  <a16:creationId xmlns:a16="http://schemas.microsoft.com/office/drawing/2014/main" id="{5DDA1A7C-4D1F-4868-9FB0-F0F971D37D3B}"/>
+                </a:ext>
+              </a:extLst>
+            </p:cNvPr>
+            <p:cNvSpPr/>
+            <p:nvPr/>
+          </p:nvSpPr>
+          <p:spPr>
+            <a:xfrm>
+              <a:off x="6946279" y="1325141"/>
+              <a:ext cx="1223962" cy="792163"/>
+            </a:xfrm>
+            <a:prstGeom prst="flowChartProcess">
+              <a:avLst/>
+            </a:prstGeom>
+            <a:ln/>
+          </p:spPr>
+          <p:style>
+            <a:lnRef idx="1">
+              <a:schemeClr val="accent1"/>
+            </a:lnRef>
+            <a:fillRef idx="2">
+              <a:schemeClr val="accent1"/>
+            </a:fillRef>
+            <a:effectRef idx="1">
+              <a:schemeClr val="accent1"/>
+            </a:effectRef>
+            <a:fontRef idx="minor">
+              <a:schemeClr val="dk1"/>
+            </a:fontRef>
+          </p:style>
+          <p:txBody>
+            <a:bodyPr anchor="ctr"/>
+            <a:lstStyle/>
+            <a:p>
+              <a:pPr algn="ctr" eaLnBrk="0" fontAlgn="auto" hangingPunct="0">
+                <a:spcBef>
+                  <a:spcPts val="0"/>
+                </a:spcBef>
+                <a:spcAft>
+                  <a:spcPts val="0"/>
+                </a:spcAft>
+                <a:defRPr/>
+              </a:pPr>
+              <a:r>
+                <a:rPr lang="en-US" sz="1400" dirty="0">
+                  <a:cs typeface="Arial" panose="020B0604020202020204" pitchFamily="34" charset="0"/>
+                </a:rPr>
+                <a:t>plot generation</a:t>
+              </a:r>
+            </a:p>
+          </p:txBody>
+        </p:sp>
+        <p:cxnSp>
+          <p:nvCxnSpPr>
+            <p:cNvPr id="31" name="Gerade Verbindung mit Pfeil 30">
+              <a:extLst>
+                <a:ext uri="{FF2B5EF4-FFF2-40B4-BE49-F238E27FC236}">
+                  <a16:creationId xmlns:a16="http://schemas.microsoft.com/office/drawing/2014/main" id="{BA5F3FBB-368A-40C3-A4E4-86F5386F9D3F}"/>
+                </a:ext>
+              </a:extLst>
+            </p:cNvPr>
+            <p:cNvCxnSpPr>
+              <a:cxnSpLocks/>
+              <a:stCxn id="12" idx="3"/>
+              <a:endCxn id="29" idx="1"/>
+            </p:cNvCxnSpPr>
+            <p:nvPr/>
+          </p:nvCxnSpPr>
+          <p:spPr>
+            <a:xfrm flipV="1">
+              <a:off x="6444034" y="1721223"/>
+              <a:ext cx="502245" cy="1095747"/>
+            </a:xfrm>
+            <a:prstGeom prst="straightConnector1">
+              <a:avLst/>
+            </a:prstGeom>
+            <a:ln>
+              <a:tailEnd type="triangle"/>
+            </a:ln>
+          </p:spPr>
+          <p:style>
+            <a:lnRef idx="1">
+              <a:schemeClr val="accent1"/>
+            </a:lnRef>
+            <a:fillRef idx="0">
+              <a:schemeClr val="accent1"/>
+            </a:fillRef>
+            <a:effectRef idx="0">
+              <a:schemeClr val="accent1"/>
+            </a:effectRef>
+            <a:fontRef idx="minor">
+              <a:schemeClr val="tx1"/>
+            </a:fontRef>
+          </p:style>
+        </p:cxnSp>
+        <p:cxnSp>
+          <p:nvCxnSpPr>
+            <p:cNvPr id="46" name="Gerade Verbindung mit Pfeil 45">
+              <a:extLst>
+                <a:ext uri="{FF2B5EF4-FFF2-40B4-BE49-F238E27FC236}">
+                  <a16:creationId xmlns:a16="http://schemas.microsoft.com/office/drawing/2014/main" id="{E1105B36-F003-4339-AAC7-3EC5E4CB4E74}"/>
+                </a:ext>
+              </a:extLst>
+            </p:cNvPr>
+            <p:cNvCxnSpPr>
+              <a:cxnSpLocks/>
+              <a:stCxn id="29" idx="3"/>
+              <a:endCxn id="13" idx="1"/>
+            </p:cNvCxnSpPr>
+            <p:nvPr/>
+          </p:nvCxnSpPr>
+          <p:spPr>
+            <a:xfrm>
+              <a:off x="8170241" y="1721223"/>
+              <a:ext cx="500216" cy="0"/>
+            </a:xfrm>
+            <a:prstGeom prst="straightConnector1">
+              <a:avLst/>
+            </a:prstGeom>
+            <a:ln>
+              <a:tailEnd type="triangle"/>
+            </a:ln>
+          </p:spPr>
+          <p:style>
+            <a:lnRef idx="1">
+              <a:schemeClr val="accent1"/>
+            </a:lnRef>
+            <a:fillRef idx="0">
+              <a:schemeClr val="accent1"/>
+            </a:fillRef>
+            <a:effectRef idx="0">
+              <a:schemeClr val="accent1"/>
+            </a:effectRef>
+            <a:fontRef idx="minor">
+              <a:schemeClr val="tx1"/>
+            </a:fontRef>
+          </p:style>
+        </p:cxnSp>
+        <p:sp>
+          <p:nvSpPr>
+            <p:cNvPr id="49" name="Flussdiagramm: Prozess 48">
+              <a:extLst>
+                <a:ext uri="{FF2B5EF4-FFF2-40B4-BE49-F238E27FC236}">
+                  <a16:creationId xmlns:a16="http://schemas.microsoft.com/office/drawing/2014/main" id="{BC603525-80E5-41C4-A07B-54E1C28EEBB3}"/>
+                </a:ext>
+              </a:extLst>
+            </p:cNvPr>
+            <p:cNvSpPr/>
+            <p:nvPr/>
+          </p:nvSpPr>
+          <p:spPr>
+            <a:xfrm>
+              <a:off x="5220072" y="3517465"/>
+              <a:ext cx="1223962" cy="792163"/>
+            </a:xfrm>
+            <a:prstGeom prst="flowChartProcess">
+              <a:avLst/>
+            </a:prstGeom>
+            <a:ln/>
+          </p:spPr>
+          <p:style>
+            <a:lnRef idx="1">
+              <a:schemeClr val="accent1"/>
+            </a:lnRef>
+            <a:fillRef idx="2">
+              <a:schemeClr val="accent1"/>
+            </a:fillRef>
+            <a:effectRef idx="1">
+              <a:schemeClr val="accent1"/>
+            </a:effectRef>
+            <a:fontRef idx="minor">
+              <a:schemeClr val="dk1"/>
+            </a:fontRef>
+          </p:style>
+          <p:txBody>
+            <a:bodyPr anchor="ctr"/>
+            <a:lstStyle/>
+            <a:p>
+              <a:pPr algn="ctr" eaLnBrk="0" fontAlgn="auto" hangingPunct="0">
+                <a:spcBef>
+                  <a:spcPts val="0"/>
+                </a:spcBef>
+                <a:spcAft>
+                  <a:spcPts val="0"/>
+                </a:spcAft>
+                <a:defRPr/>
+              </a:pPr>
+              <a:r>
+                <a:rPr lang="en-US" sz="1400" dirty="0">
+                  <a:cs typeface="Arial" panose="020B0604020202020204" pitchFamily="34" charset="0"/>
+                </a:rPr>
+                <a:t>fusion detection</a:t>
+              </a:r>
+            </a:p>
+          </p:txBody>
+        </p:sp>
+        <p:cxnSp>
+          <p:nvCxnSpPr>
+            <p:cNvPr id="51" name="Gerade Verbindung mit Pfeil 50">
+              <a:extLst>
+                <a:ext uri="{FF2B5EF4-FFF2-40B4-BE49-F238E27FC236}">
+                  <a16:creationId xmlns:a16="http://schemas.microsoft.com/office/drawing/2014/main" id="{6D0369F3-549A-4F64-8B0B-D8B4563C88F2}"/>
+                </a:ext>
+              </a:extLst>
+            </p:cNvPr>
+            <p:cNvCxnSpPr>
+              <a:cxnSpLocks/>
+              <a:stCxn id="9" idx="3"/>
+              <a:endCxn id="49" idx="1"/>
+            </p:cNvCxnSpPr>
+            <p:nvPr/>
+          </p:nvCxnSpPr>
+          <p:spPr>
+            <a:xfrm>
+              <a:off x="4717827" y="2816971"/>
+              <a:ext cx="502245" cy="1096576"/>
+            </a:xfrm>
+            <a:prstGeom prst="straightConnector1">
+              <a:avLst/>
+            </a:prstGeom>
+            <a:ln>
+              <a:tailEnd type="triangle"/>
+            </a:ln>
+          </p:spPr>
+          <p:style>
+            <a:lnRef idx="1">
+              <a:schemeClr val="accent1"/>
+            </a:lnRef>
+            <a:fillRef idx="0">
+              <a:schemeClr val="accent1"/>
+            </a:fillRef>
+            <a:effectRef idx="0">
+              <a:schemeClr val="accent1"/>
+            </a:effectRef>
+            <a:fontRef idx="minor">
+              <a:schemeClr val="tx1"/>
+            </a:fontRef>
+          </p:style>
+        </p:cxnSp>
+        <p:sp>
+          <p:nvSpPr>
+            <p:cNvPr id="53" name="Flussdiagramm: Dokument 52">
+              <a:extLst>
+                <a:ext uri="{FF2B5EF4-FFF2-40B4-BE49-F238E27FC236}">
+                  <a16:creationId xmlns:a16="http://schemas.microsoft.com/office/drawing/2014/main" id="{B373CE87-0181-4884-A2D2-57D2B4DE2FAC}"/>
+                </a:ext>
+              </a:extLst>
+            </p:cNvPr>
+            <p:cNvSpPr/>
+            <p:nvPr/>
+          </p:nvSpPr>
+          <p:spPr>
+            <a:xfrm>
+              <a:off x="8686800" y="3516633"/>
+              <a:ext cx="1081088" cy="792163"/>
+            </a:xfrm>
+            <a:prstGeom prst="flowChartDocument">
+              <a:avLst/>
+            </a:prstGeom>
+          </p:spPr>
+          <p:style>
+            <a:lnRef idx="1">
+              <a:schemeClr val="accent6"/>
+            </a:lnRef>
+            <a:fillRef idx="2">
+              <a:schemeClr val="accent6"/>
+            </a:fillRef>
+            <a:effectRef idx="1">
+              <a:schemeClr val="accent6"/>
+            </a:effectRef>
+            <a:fontRef idx="minor">
+              <a:schemeClr val="dk1"/>
+            </a:fontRef>
+          </p:style>
+          <p:txBody>
+            <a:bodyPr anchor="ctr"/>
+            <a:lstStyle/>
+            <a:p>
+              <a:pPr algn="ctr" eaLnBrk="0" fontAlgn="auto" hangingPunct="0">
+                <a:spcBef>
+                  <a:spcPts val="0"/>
+                </a:spcBef>
+                <a:spcAft>
+                  <a:spcPts val="0"/>
+                </a:spcAft>
+                <a:defRPr/>
+              </a:pPr>
+              <a:r>
+                <a:rPr lang="en-US" sz="1600" dirty="0">
+                  <a:cs typeface="Arial" panose="020B0604020202020204" pitchFamily="34" charset="0"/>
+                </a:rPr>
+                <a:t>TSV</a:t>
+              </a:r>
+            </a:p>
+            <a:p>
+              <a:pPr algn="ctr" eaLnBrk="0" fontAlgn="auto" hangingPunct="0">
+                <a:spcBef>
+                  <a:spcPts val="0"/>
+                </a:spcBef>
+                <a:spcAft>
+                  <a:spcPts val="0"/>
+                </a:spcAft>
+                <a:defRPr/>
+              </a:pPr>
+              <a:r>
+                <a:rPr lang="en-US" sz="1200" dirty="0">
+                  <a:cs typeface="Arial" panose="020B0604020202020204" pitchFamily="34" charset="0"/>
+                </a:rPr>
+                <a:t>(+ PDF)</a:t>
+              </a:r>
+            </a:p>
+          </p:txBody>
+        </p:sp>
+        <p:cxnSp>
+          <p:nvCxnSpPr>
+            <p:cNvPr id="58" name="Gerade Verbindung mit Pfeil 57">
+              <a:extLst>
+                <a:ext uri="{FF2B5EF4-FFF2-40B4-BE49-F238E27FC236}">
+                  <a16:creationId xmlns:a16="http://schemas.microsoft.com/office/drawing/2014/main" id="{CA86C469-C103-48A2-8072-5BAA92CA2C32}"/>
+                </a:ext>
+              </a:extLst>
+            </p:cNvPr>
+            <p:cNvCxnSpPr>
+              <a:cxnSpLocks/>
+              <a:stCxn id="49" idx="3"/>
+              <a:endCxn id="53" idx="1"/>
+            </p:cNvCxnSpPr>
+            <p:nvPr/>
+          </p:nvCxnSpPr>
+          <p:spPr>
+            <a:xfrm flipV="1">
+              <a:off x="6444034" y="3912715"/>
+              <a:ext cx="2242766" cy="832"/>
+            </a:xfrm>
+            <a:prstGeom prst="straightConnector1">
+              <a:avLst/>
+            </a:prstGeom>
+            <a:ln>
+              <a:tailEnd type="triangle"/>
+            </a:ln>
+          </p:spPr>
+          <p:style>
+            <a:lnRef idx="1">
+              <a:schemeClr val="accent1"/>
+            </a:lnRef>
+            <a:fillRef idx="0">
+              <a:schemeClr val="accent1"/>
+            </a:fillRef>
+            <a:effectRef idx="0">
+              <a:schemeClr val="accent1"/>
+            </a:effectRef>
+            <a:fontRef idx="minor">
+              <a:schemeClr val="tx1"/>
+            </a:fontRef>
+          </p:style>
+        </p:cxnSp>
+      </p:grpSp>
+    </p:spTree>
+    <p:extLst>
+      <p:ext uri="{BB962C8B-B14F-4D97-AF65-F5344CB8AC3E}">
+        <p14:creationId xmlns:p14="http://schemas.microsoft.com/office/powerpoint/2010/main" val="1147628445"/>
       </p:ext>
     </p:extLst>
   </p:cSld>

</xml_diff>

<commit_message>
update somatic pipeline docu
</commit_message>
<xml_diff>
--- a/doc/GSvar/pipelines.pptx
+++ b/doc/GSvar/pipelines.pptx
@@ -5,13 +5,15 @@
     <p:sldMasterId id="2147483651" r:id="rId1"/>
   </p:sldMasterIdLst>
   <p:notesMasterIdLst>
-    <p:notesMasterId r:id="rId6"/>
+    <p:notesMasterId r:id="rId8"/>
   </p:notesMasterIdLst>
   <p:sldIdLst>
     <p:sldId id="265" r:id="rId2"/>
     <p:sldId id="266" r:id="rId3"/>
     <p:sldId id="267" r:id="rId4"/>
     <p:sldId id="268" r:id="rId5"/>
+    <p:sldId id="269" r:id="rId6"/>
+    <p:sldId id="270" r:id="rId7"/>
   </p:sldIdLst>
   <p:sldSz cx="9144000" cy="6858000" type="screen4x3"/>
   <p:notesSz cx="6858000" cy="9144000"/>
@@ -641,7 +643,7 @@
               <a:pPr>
                 <a:defRPr/>
               </a:pPr>
-              <a:t>‹Nr.›</a:t>
+              <a:t>‹#›</a:t>
             </a:fld>
             <a:endParaRPr lang="de-DE" altLang="de-DE"/>
           </a:p>
@@ -1004,7 +1006,7 @@
               <a:pPr>
                 <a:defRPr/>
               </a:pPr>
-              <a:t>‹Nr.›</a:t>
+              <a:t>‹#›</a:t>
             </a:fld>
             <a:endParaRPr lang="de-DE" altLang="de-DE"/>
           </a:p>
@@ -1230,7 +1232,7 @@
               <a:pPr>
                 <a:defRPr/>
               </a:pPr>
-              <a:t>‹Nr.›</a:t>
+              <a:t>‹#›</a:t>
             </a:fld>
             <a:endParaRPr lang="de-DE" altLang="de-DE"/>
           </a:p>
@@ -1461,7 +1463,7 @@
               <a:pPr>
                 <a:defRPr/>
               </a:pPr>
-              <a:t>‹Nr.›</a:t>
+              <a:t>‹#›</a:t>
             </a:fld>
             <a:endParaRPr lang="de-DE" altLang="de-DE"/>
           </a:p>
@@ -1820,7 +1822,7 @@
               <a:pPr>
                 <a:defRPr/>
               </a:pPr>
-              <a:t>‹Nr.›</a:t>
+              <a:t>‹#›</a:t>
             </a:fld>
             <a:endParaRPr lang="de-DE" altLang="de-DE"/>
           </a:p>
@@ -1998,7 +2000,7 @@
       </p:sp>
       <p:sp>
         <p:nvSpPr>
-          <p:cNvPr id="5" name="Rectangle 4"/>
+          <p:cNvPr id="5" name="Date Placeholder 4"/>
           <p:cNvSpPr>
             <a:spLocks noGrp="1" noChangeArrowheads="1"/>
           </p:cNvSpPr>
@@ -2034,7 +2036,7 @@
       </p:sp>
       <p:sp>
         <p:nvSpPr>
-          <p:cNvPr id="6" name="Rectangle 5"/>
+          <p:cNvPr id="6" name="Footer Placeholder 5"/>
           <p:cNvSpPr>
             <a:spLocks noGrp="1" noChangeArrowheads="1"/>
           </p:cNvSpPr>
@@ -2070,7 +2072,7 @@
       </p:sp>
       <p:sp>
         <p:nvSpPr>
-          <p:cNvPr id="7" name="Rectangle 6"/>
+          <p:cNvPr id="7" name="Slide Number Placeholder 6"/>
           <p:cNvSpPr>
             <a:spLocks noGrp="1" noChangeArrowheads="1"/>
           </p:cNvSpPr>
@@ -2105,7 +2107,7 @@
               <a:pPr>
                 <a:defRPr/>
               </a:pPr>
-              <a:t>‹Nr.›</a:t>
+              <a:t>‹#›</a:t>
             </a:fld>
             <a:endParaRPr lang="de-DE" altLang="de-DE"/>
           </a:p>
@@ -2531,7 +2533,7 @@
               <a:pPr>
                 <a:defRPr/>
               </a:pPr>
-              <a:t>‹Nr.›</a:t>
+              <a:t>‹#›</a:t>
             </a:fld>
             <a:endParaRPr lang="de-DE" altLang="de-DE"/>
           </a:p>
@@ -2698,7 +2700,7 @@
               <a:pPr>
                 <a:defRPr/>
               </a:pPr>
-              <a:t>‹Nr.›</a:t>
+              <a:t>‹#›</a:t>
             </a:fld>
             <a:endParaRPr lang="de-DE" altLang="de-DE"/>
           </a:p>
@@ -2843,7 +2845,7 @@
               <a:pPr>
                 <a:defRPr/>
               </a:pPr>
-              <a:t>‹Nr.›</a:t>
+              <a:t>‹#›</a:t>
             </a:fld>
             <a:endParaRPr lang="de-DE" altLang="de-DE"/>
           </a:p>
@@ -3067,7 +3069,7 @@
       </p:sp>
       <p:sp>
         <p:nvSpPr>
-          <p:cNvPr id="5" name="Rectangle 4"/>
+          <p:cNvPr id="5" name="Date Placeholder 4"/>
           <p:cNvSpPr>
             <a:spLocks noGrp="1" noChangeArrowheads="1"/>
           </p:cNvSpPr>
@@ -3103,7 +3105,7 @@
       </p:sp>
       <p:sp>
         <p:nvSpPr>
-          <p:cNvPr id="6" name="Rectangle 5"/>
+          <p:cNvPr id="6" name="Footer Placeholder 5"/>
           <p:cNvSpPr>
             <a:spLocks noGrp="1" noChangeArrowheads="1"/>
           </p:cNvSpPr>
@@ -3139,7 +3141,7 @@
       </p:sp>
       <p:sp>
         <p:nvSpPr>
-          <p:cNvPr id="7" name="Rectangle 6"/>
+          <p:cNvPr id="7" name="Slide Number Placeholder 6"/>
           <p:cNvSpPr>
             <a:spLocks noGrp="1" noChangeArrowheads="1"/>
           </p:cNvSpPr>
@@ -3174,7 +3176,7 @@
               <a:pPr>
                 <a:defRPr/>
               </a:pPr>
-              <a:t>‹Nr.›</a:t>
+              <a:t>‹#›</a:t>
             </a:fld>
             <a:endParaRPr lang="de-DE" altLang="de-DE"/>
           </a:p>
@@ -3376,7 +3378,7 @@
       </p:sp>
       <p:sp>
         <p:nvSpPr>
-          <p:cNvPr id="5" name="Rectangle 4"/>
+          <p:cNvPr id="5" name="Date Placeholder 4"/>
           <p:cNvSpPr>
             <a:spLocks noGrp="1" noChangeArrowheads="1"/>
           </p:cNvSpPr>
@@ -3412,7 +3414,7 @@
       </p:sp>
       <p:sp>
         <p:nvSpPr>
-          <p:cNvPr id="6" name="Rectangle 5"/>
+          <p:cNvPr id="6" name="Footer Placeholder 5"/>
           <p:cNvSpPr>
             <a:spLocks noGrp="1" noChangeArrowheads="1"/>
           </p:cNvSpPr>
@@ -3448,7 +3450,7 @@
       </p:sp>
       <p:sp>
         <p:nvSpPr>
-          <p:cNvPr id="7" name="Rectangle 6"/>
+          <p:cNvPr id="7" name="Slide Number Placeholder 6"/>
           <p:cNvSpPr>
             <a:spLocks noGrp="1" noChangeArrowheads="1"/>
           </p:cNvSpPr>
@@ -3483,7 +3485,7 @@
               <a:pPr>
                 <a:defRPr/>
               </a:pPr>
-              <a:t>‹Nr.›</a:t>
+              <a:t>‹#›</a:t>
             </a:fld>
             <a:endParaRPr lang="de-DE" altLang="de-DE"/>
           </a:p>
@@ -7995,7 +7997,7 @@
             <a:p>
               <a:pPr algn="ctr"/>
               <a:r>
-                <a:rPr lang="en-US" sz="1050">
+                <a:rPr lang="en-US" sz="1050" dirty="0">
                   <a:solidFill>
                     <a:schemeClr val="tx1"/>
                   </a:solidFill>
@@ -8426,6 +8428,3531 @@
     <p:extLst>
       <p:ext uri="{BB962C8B-B14F-4D97-AF65-F5344CB8AC3E}">
         <p14:creationId xmlns:p14="http://schemas.microsoft.com/office/powerpoint/2010/main" val="1147628445"/>
+      </p:ext>
+    </p:extLst>
+  </p:cSld>
+  <p:clrMapOvr>
+    <a:masterClrMapping/>
+  </p:clrMapOvr>
+</p:sld>
+</file>
+
+<file path=ppt/slides/slide5.xml><?xml version="1.0" encoding="utf-8"?>
+<p:sld xmlns:a="http://schemas.openxmlformats.org/drawingml/2006/main" xmlns:r="http://schemas.openxmlformats.org/officeDocument/2006/relationships" xmlns:p="http://schemas.openxmlformats.org/presentationml/2006/main">
+  <p:cSld>
+    <p:bg>
+      <p:bgPr>
+        <a:gradFill flip="none" rotWithShape="1">
+          <a:gsLst>
+            <a:gs pos="0">
+              <a:schemeClr val="accent3">
+                <a:lumMod val="5000"/>
+                <a:lumOff val="95000"/>
+              </a:schemeClr>
+            </a:gs>
+            <a:gs pos="74000">
+              <a:schemeClr val="accent3">
+                <a:lumMod val="45000"/>
+                <a:lumOff val="55000"/>
+              </a:schemeClr>
+            </a:gs>
+            <a:gs pos="83000">
+              <a:schemeClr val="accent3">
+                <a:lumMod val="45000"/>
+                <a:lumOff val="55000"/>
+              </a:schemeClr>
+            </a:gs>
+            <a:gs pos="100000">
+              <a:schemeClr val="accent3">
+                <a:lumMod val="30000"/>
+                <a:lumOff val="70000"/>
+              </a:schemeClr>
+            </a:gs>
+          </a:gsLst>
+          <a:lin ang="2700000" scaled="1"/>
+          <a:tileRect/>
+        </a:gradFill>
+        <a:effectLst/>
+      </p:bgPr>
+    </p:bg>
+    <p:spTree>
+      <p:nvGrpSpPr>
+        <p:cNvPr id="1" name=""/>
+        <p:cNvGrpSpPr/>
+        <p:nvPr/>
+      </p:nvGrpSpPr>
+      <p:grpSpPr>
+        <a:xfrm>
+          <a:off x="0" y="0"/>
+          <a:ext cx="0" cy="0"/>
+          <a:chOff x="0" y="0"/>
+          <a:chExt cx="0" cy="0"/>
+        </a:xfrm>
+      </p:grpSpPr>
+      <p:sp>
+        <p:nvSpPr>
+          <p:cNvPr id="22530" name="Titel 1"/>
+          <p:cNvSpPr>
+            <a:spLocks noGrp="1"/>
+          </p:cNvSpPr>
+          <p:nvPr>
+            <p:ph type="title"/>
+          </p:nvPr>
+        </p:nvSpPr>
+        <p:spPr>
+          <a:xfrm>
+            <a:off x="107950" y="0"/>
+            <a:ext cx="9036050" cy="836613"/>
+          </a:xfrm>
+        </p:spPr>
+        <p:txBody>
+          <a:bodyPr/>
+          <a:lstStyle/>
+          <a:p>
+            <a:pPr eaLnBrk="1" hangingPunct="1"/>
+            <a:r>
+              <a:rPr lang="en-US" altLang="en-US" dirty="0"/>
+              <a:t>Somatic analysis pipeline</a:t>
+            </a:r>
+          </a:p>
+        </p:txBody>
+      </p:sp>
+      <p:sp>
+        <p:nvSpPr>
+          <p:cNvPr id="22" name="Flussdiagramm: Dokument 21">
+            <a:extLst>
+              <a:ext uri="{FF2B5EF4-FFF2-40B4-BE49-F238E27FC236}">
+                <a16:creationId xmlns:a16="http://schemas.microsoft.com/office/drawing/2014/main" id="{C59025AC-DCBF-4461-B4FC-BEA4FB4639D2}"/>
+              </a:ext>
+            </a:extLst>
+          </p:cNvPr>
+          <p:cNvSpPr/>
+          <p:nvPr/>
+        </p:nvSpPr>
+        <p:spPr>
+          <a:xfrm>
+            <a:off x="1307325" y="1556717"/>
+            <a:ext cx="1081087" cy="792163"/>
+          </a:xfrm>
+          <a:prstGeom prst="flowChartDocument">
+            <a:avLst/>
+          </a:prstGeom>
+        </p:spPr>
+        <p:style>
+          <a:lnRef idx="1">
+            <a:schemeClr val="accent6"/>
+          </a:lnRef>
+          <a:fillRef idx="2">
+            <a:schemeClr val="accent6"/>
+          </a:fillRef>
+          <a:effectRef idx="1">
+            <a:schemeClr val="accent6"/>
+          </a:effectRef>
+          <a:fontRef idx="minor">
+            <a:schemeClr val="dk1"/>
+          </a:fontRef>
+        </p:style>
+        <p:txBody>
+          <a:bodyPr anchor="ctr"/>
+          <a:lstStyle/>
+          <a:p>
+            <a:pPr algn="ctr" eaLnBrk="0" fontAlgn="auto" hangingPunct="0">
+              <a:spcBef>
+                <a:spcPts val="0"/>
+              </a:spcBef>
+              <a:spcAft>
+                <a:spcPts val="0"/>
+              </a:spcAft>
+              <a:defRPr/>
+            </a:pPr>
+            <a:r>
+              <a:rPr lang="de-DE" sz="1600" dirty="0">
+                <a:cs typeface="Arial" panose="020B0604020202020204" pitchFamily="34" charset="0"/>
+              </a:rPr>
+              <a:t>Normal</a:t>
+            </a:r>
+          </a:p>
+          <a:p>
+            <a:pPr algn="ctr" eaLnBrk="0" fontAlgn="auto" hangingPunct="0">
+              <a:spcBef>
+                <a:spcPts val="0"/>
+              </a:spcBef>
+              <a:spcAft>
+                <a:spcPts val="0"/>
+              </a:spcAft>
+              <a:defRPr/>
+            </a:pPr>
+            <a:r>
+              <a:rPr lang="de-DE" sz="1600" dirty="0">
+                <a:cs typeface="Arial" panose="020B0604020202020204" pitchFamily="34" charset="0"/>
+              </a:rPr>
+              <a:t>BAM</a:t>
+            </a:r>
+            <a:endParaRPr lang="en-US" sz="1600" dirty="0">
+              <a:cs typeface="Arial" panose="020B0604020202020204" pitchFamily="34" charset="0"/>
+            </a:endParaRPr>
+          </a:p>
+        </p:txBody>
+      </p:sp>
+      <p:sp>
+        <p:nvSpPr>
+          <p:cNvPr id="33" name="Flussdiagramm: Prozess 32">
+            <a:extLst>
+              <a:ext uri="{FF2B5EF4-FFF2-40B4-BE49-F238E27FC236}">
+                <a16:creationId xmlns:a16="http://schemas.microsoft.com/office/drawing/2014/main" id="{749883A7-7FD9-493D-B374-E7712411DF99}"/>
+              </a:ext>
+            </a:extLst>
+          </p:cNvPr>
+          <p:cNvSpPr/>
+          <p:nvPr/>
+        </p:nvSpPr>
+        <p:spPr>
+          <a:xfrm>
+            <a:off x="2915816" y="1484786"/>
+            <a:ext cx="1223962" cy="786100"/>
+          </a:xfrm>
+          <a:prstGeom prst="flowChartProcess">
+            <a:avLst/>
+          </a:prstGeom>
+          <a:ln/>
+        </p:spPr>
+        <p:style>
+          <a:lnRef idx="1">
+            <a:schemeClr val="accent1"/>
+          </a:lnRef>
+          <a:fillRef idx="2">
+            <a:schemeClr val="accent1"/>
+          </a:fillRef>
+          <a:effectRef idx="1">
+            <a:schemeClr val="accent1"/>
+          </a:effectRef>
+          <a:fontRef idx="minor">
+            <a:schemeClr val="dk1"/>
+          </a:fontRef>
+        </p:style>
+        <p:txBody>
+          <a:bodyPr anchor="ctr"/>
+          <a:lstStyle/>
+          <a:p>
+            <a:pPr algn="ctr" eaLnBrk="0" fontAlgn="auto" hangingPunct="0">
+              <a:spcBef>
+                <a:spcPts val="0"/>
+              </a:spcBef>
+              <a:spcAft>
+                <a:spcPts val="0"/>
+              </a:spcAft>
+              <a:defRPr/>
+            </a:pPr>
+            <a:r>
+              <a:rPr lang="en-US" sz="1200" dirty="0">
+                <a:cs typeface="Arial" panose="020B0604020202020204" pitchFamily="34" charset="0"/>
+              </a:rPr>
+              <a:t>variant calling</a:t>
+            </a:r>
+          </a:p>
+          <a:p>
+            <a:pPr algn="ctr" eaLnBrk="0" fontAlgn="auto" hangingPunct="0">
+              <a:spcBef>
+                <a:spcPts val="0"/>
+              </a:spcBef>
+              <a:spcAft>
+                <a:spcPts val="0"/>
+              </a:spcAft>
+              <a:defRPr/>
+            </a:pPr>
+            <a:r>
+              <a:rPr lang="de-DE" sz="1200" dirty="0">
+                <a:cs typeface="Arial" panose="020B0604020202020204" pitchFamily="34" charset="0"/>
+              </a:rPr>
+              <a:t>+</a:t>
+            </a:r>
+            <a:r>
+              <a:rPr lang="en-US" sz="1200" dirty="0">
+                <a:cs typeface="Arial" panose="020B0604020202020204" pitchFamily="34" charset="0"/>
+              </a:rPr>
+              <a:t> annotation</a:t>
+            </a:r>
+          </a:p>
+          <a:p>
+            <a:pPr algn="ctr" eaLnBrk="0" fontAlgn="auto" hangingPunct="0">
+              <a:spcBef>
+                <a:spcPts val="0"/>
+              </a:spcBef>
+              <a:spcAft>
+                <a:spcPts val="0"/>
+              </a:spcAft>
+              <a:defRPr/>
+            </a:pPr>
+            <a:r>
+              <a:rPr lang="en-US" sz="1200" dirty="0">
+                <a:cs typeface="Arial" panose="020B0604020202020204" pitchFamily="34" charset="0"/>
+              </a:rPr>
+              <a:t>(SNVs + SVs)</a:t>
+            </a:r>
+          </a:p>
+        </p:txBody>
+      </p:sp>
+      <p:sp>
+        <p:nvSpPr>
+          <p:cNvPr id="37" name="Flussdiagramm: Dokument 36">
+            <a:extLst>
+              <a:ext uri="{FF2B5EF4-FFF2-40B4-BE49-F238E27FC236}">
+                <a16:creationId xmlns:a16="http://schemas.microsoft.com/office/drawing/2014/main" id="{BB305E95-18EA-47C5-8F0A-5285F70FE75F}"/>
+              </a:ext>
+            </a:extLst>
+          </p:cNvPr>
+          <p:cNvSpPr/>
+          <p:nvPr/>
+        </p:nvSpPr>
+        <p:spPr>
+          <a:xfrm>
+            <a:off x="4430622" y="3003483"/>
+            <a:ext cx="1081088" cy="792163"/>
+          </a:xfrm>
+          <a:prstGeom prst="flowChartDocument">
+            <a:avLst/>
+          </a:prstGeom>
+        </p:spPr>
+        <p:style>
+          <a:lnRef idx="1">
+            <a:schemeClr val="accent6"/>
+          </a:lnRef>
+          <a:fillRef idx="2">
+            <a:schemeClr val="accent6"/>
+          </a:fillRef>
+          <a:effectRef idx="1">
+            <a:schemeClr val="accent6"/>
+          </a:effectRef>
+          <a:fontRef idx="minor">
+            <a:schemeClr val="dk1"/>
+          </a:fontRef>
+        </p:style>
+        <p:txBody>
+          <a:bodyPr anchor="ctr"/>
+          <a:lstStyle/>
+          <a:p>
+            <a:pPr algn="ctr" eaLnBrk="0" fontAlgn="auto" hangingPunct="0">
+              <a:spcBef>
+                <a:spcPts val="0"/>
+              </a:spcBef>
+              <a:spcAft>
+                <a:spcPts val="0"/>
+              </a:spcAft>
+              <a:defRPr/>
+            </a:pPr>
+            <a:r>
+              <a:rPr lang="en-US" sz="1600" dirty="0">
+                <a:cs typeface="Arial" panose="020B0604020202020204" pitchFamily="34" charset="0"/>
+              </a:rPr>
+              <a:t>TSV</a:t>
+            </a:r>
+          </a:p>
+        </p:txBody>
+      </p:sp>
+      <p:sp>
+        <p:nvSpPr>
+          <p:cNvPr id="38" name="Flussdiagramm: Prozess 37">
+            <a:extLst>
+              <a:ext uri="{FF2B5EF4-FFF2-40B4-BE49-F238E27FC236}">
+                <a16:creationId xmlns:a16="http://schemas.microsoft.com/office/drawing/2014/main" id="{B0A1DCC4-DED8-4D19-AADF-B2643F7F0267}"/>
+              </a:ext>
+            </a:extLst>
+          </p:cNvPr>
+          <p:cNvSpPr/>
+          <p:nvPr/>
+        </p:nvSpPr>
+        <p:spPr>
+          <a:xfrm>
+            <a:off x="2915816" y="3006020"/>
+            <a:ext cx="1223962" cy="792163"/>
+          </a:xfrm>
+          <a:prstGeom prst="flowChartProcess">
+            <a:avLst/>
+          </a:prstGeom>
+          <a:ln/>
+        </p:spPr>
+        <p:style>
+          <a:lnRef idx="1">
+            <a:schemeClr val="accent1"/>
+          </a:lnRef>
+          <a:fillRef idx="2">
+            <a:schemeClr val="accent1"/>
+          </a:fillRef>
+          <a:effectRef idx="1">
+            <a:schemeClr val="accent1"/>
+          </a:effectRef>
+          <a:fontRef idx="minor">
+            <a:schemeClr val="dk1"/>
+          </a:fontRef>
+        </p:style>
+        <p:txBody>
+          <a:bodyPr anchor="ctr"/>
+          <a:lstStyle/>
+          <a:p>
+            <a:pPr algn="ctr" eaLnBrk="0" fontAlgn="auto" hangingPunct="0">
+              <a:spcBef>
+                <a:spcPts val="0"/>
+              </a:spcBef>
+              <a:spcAft>
+                <a:spcPts val="0"/>
+              </a:spcAft>
+              <a:defRPr/>
+            </a:pPr>
+            <a:r>
+              <a:rPr lang="de-DE" sz="1200" dirty="0">
+                <a:cs typeface="Arial" panose="020B0604020202020204" pitchFamily="34" charset="0"/>
+              </a:rPr>
+              <a:t>Copy </a:t>
+            </a:r>
+            <a:r>
+              <a:rPr lang="de-DE" sz="1200" dirty="0" err="1">
+                <a:cs typeface="Arial" panose="020B0604020202020204" pitchFamily="34" charset="0"/>
+              </a:rPr>
+              <a:t>number</a:t>
+            </a:r>
+            <a:r>
+              <a:rPr lang="de-DE" sz="1200" dirty="0">
+                <a:cs typeface="Arial" panose="020B0604020202020204" pitchFamily="34" charset="0"/>
+              </a:rPr>
+              <a:t> </a:t>
+            </a:r>
+            <a:r>
+              <a:rPr lang="de-DE" sz="1200" dirty="0" err="1">
+                <a:cs typeface="Arial" panose="020B0604020202020204" pitchFamily="34" charset="0"/>
+              </a:rPr>
+              <a:t>analysis</a:t>
+            </a:r>
+            <a:endParaRPr lang="en-US" sz="1200" dirty="0">
+              <a:cs typeface="Arial" panose="020B0604020202020204" pitchFamily="34" charset="0"/>
+            </a:endParaRPr>
+          </a:p>
+          <a:p>
+            <a:pPr algn="ctr" eaLnBrk="0" fontAlgn="auto" hangingPunct="0">
+              <a:spcBef>
+                <a:spcPts val="0"/>
+              </a:spcBef>
+              <a:spcAft>
+                <a:spcPts val="0"/>
+              </a:spcAft>
+              <a:defRPr/>
+            </a:pPr>
+            <a:r>
+              <a:rPr lang="en-US" sz="1200" dirty="0">
+                <a:cs typeface="Arial" panose="020B0604020202020204" pitchFamily="34" charset="0"/>
+              </a:rPr>
+              <a:t>(CNVs)</a:t>
+            </a:r>
+          </a:p>
+        </p:txBody>
+      </p:sp>
+      <p:cxnSp>
+        <p:nvCxnSpPr>
+          <p:cNvPr id="43" name="Gerade Verbindung mit Pfeil 14">
+            <a:extLst>
+              <a:ext uri="{FF2B5EF4-FFF2-40B4-BE49-F238E27FC236}">
+                <a16:creationId xmlns:a16="http://schemas.microsoft.com/office/drawing/2014/main" id="{B12E3641-AD6F-4EAA-80D3-A999BE31CA13}"/>
+              </a:ext>
+            </a:extLst>
+          </p:cNvPr>
+          <p:cNvCxnSpPr>
+            <a:cxnSpLocks/>
+            <a:stCxn id="22" idx="3"/>
+            <a:endCxn id="33" idx="1"/>
+          </p:cNvCxnSpPr>
+          <p:nvPr/>
+        </p:nvCxnSpPr>
+        <p:spPr>
+          <a:xfrm flipV="1">
+            <a:off x="2388412" y="1877836"/>
+            <a:ext cx="527404" cy="74963"/>
+          </a:xfrm>
+          <a:prstGeom prst="straightConnector1">
+            <a:avLst/>
+          </a:prstGeom>
+          <a:ln>
+            <a:tailEnd type="triangle" w="med" len="med"/>
+          </a:ln>
+        </p:spPr>
+        <p:style>
+          <a:lnRef idx="1">
+            <a:schemeClr val="accent1"/>
+          </a:lnRef>
+          <a:fillRef idx="0">
+            <a:schemeClr val="accent1"/>
+          </a:fillRef>
+          <a:effectRef idx="0">
+            <a:schemeClr val="accent1"/>
+          </a:effectRef>
+          <a:fontRef idx="minor">
+            <a:schemeClr val="tx1"/>
+          </a:fontRef>
+        </p:style>
+      </p:cxnSp>
+      <p:cxnSp>
+        <p:nvCxnSpPr>
+          <p:cNvPr id="44" name="Gerade Verbindung mit Pfeil 14">
+            <a:extLst>
+              <a:ext uri="{FF2B5EF4-FFF2-40B4-BE49-F238E27FC236}">
+                <a16:creationId xmlns:a16="http://schemas.microsoft.com/office/drawing/2014/main" id="{A10CC1CC-60B8-4368-B2DE-A4EC90C758D9}"/>
+              </a:ext>
+            </a:extLst>
+          </p:cNvPr>
+          <p:cNvCxnSpPr>
+            <a:cxnSpLocks/>
+            <a:stCxn id="22" idx="3"/>
+            <a:endCxn id="38" idx="1"/>
+          </p:cNvCxnSpPr>
+          <p:nvPr/>
+        </p:nvCxnSpPr>
+        <p:spPr>
+          <a:xfrm>
+            <a:off x="2388412" y="1952799"/>
+            <a:ext cx="527404" cy="1449303"/>
+          </a:xfrm>
+          <a:prstGeom prst="straightConnector1">
+            <a:avLst/>
+          </a:prstGeom>
+          <a:ln>
+            <a:tailEnd type="triangle" w="med" len="med"/>
+          </a:ln>
+        </p:spPr>
+        <p:style>
+          <a:lnRef idx="1">
+            <a:schemeClr val="accent1"/>
+          </a:lnRef>
+          <a:fillRef idx="0">
+            <a:schemeClr val="accent1"/>
+          </a:fillRef>
+          <a:effectRef idx="0">
+            <a:schemeClr val="accent1"/>
+          </a:effectRef>
+          <a:fontRef idx="minor">
+            <a:schemeClr val="tx1"/>
+          </a:fontRef>
+        </p:style>
+      </p:cxnSp>
+      <p:sp>
+        <p:nvSpPr>
+          <p:cNvPr id="48" name="Flussdiagramm: Prozess 47">
+            <a:extLst>
+              <a:ext uri="{FF2B5EF4-FFF2-40B4-BE49-F238E27FC236}">
+                <a16:creationId xmlns:a16="http://schemas.microsoft.com/office/drawing/2014/main" id="{708977C8-A61E-4334-BE41-CD7398D64F2C}"/>
+              </a:ext>
+            </a:extLst>
+          </p:cNvPr>
+          <p:cNvSpPr/>
+          <p:nvPr/>
+        </p:nvSpPr>
+        <p:spPr>
+          <a:xfrm>
+            <a:off x="2918470" y="3936938"/>
+            <a:ext cx="1223962" cy="792163"/>
+          </a:xfrm>
+          <a:prstGeom prst="flowChartProcess">
+            <a:avLst/>
+          </a:prstGeom>
+          <a:ln/>
+        </p:spPr>
+        <p:style>
+          <a:lnRef idx="1">
+            <a:schemeClr val="accent1"/>
+          </a:lnRef>
+          <a:fillRef idx="2">
+            <a:schemeClr val="accent1"/>
+          </a:fillRef>
+          <a:effectRef idx="1">
+            <a:schemeClr val="accent1"/>
+          </a:effectRef>
+          <a:fontRef idx="minor">
+            <a:schemeClr val="dk1"/>
+          </a:fontRef>
+        </p:style>
+        <p:txBody>
+          <a:bodyPr anchor="ctr"/>
+          <a:lstStyle/>
+          <a:p>
+            <a:pPr algn="ctr" eaLnBrk="0" fontAlgn="auto" hangingPunct="0">
+              <a:spcBef>
+                <a:spcPts val="0"/>
+              </a:spcBef>
+              <a:spcAft>
+                <a:spcPts val="0"/>
+              </a:spcAft>
+              <a:defRPr/>
+            </a:pPr>
+            <a:r>
+              <a:rPr lang="de-DE" sz="1200" dirty="0">
+                <a:cs typeface="Arial" panose="020B0604020202020204" pitchFamily="34" charset="0"/>
+              </a:rPr>
+              <a:t>Virus </a:t>
+            </a:r>
+            <a:r>
+              <a:rPr lang="de-DE" sz="1200" dirty="0" err="1">
+                <a:cs typeface="Arial" panose="020B0604020202020204" pitchFamily="34" charset="0"/>
+              </a:rPr>
+              <a:t>detection</a:t>
+            </a:r>
+            <a:endParaRPr lang="en-US" sz="1200" dirty="0">
+              <a:cs typeface="Arial" panose="020B0604020202020204" pitchFamily="34" charset="0"/>
+            </a:endParaRPr>
+          </a:p>
+        </p:txBody>
+      </p:sp>
+      <p:cxnSp>
+        <p:nvCxnSpPr>
+          <p:cNvPr id="55" name="Gerade Verbindung mit Pfeil 14">
+            <a:extLst>
+              <a:ext uri="{FF2B5EF4-FFF2-40B4-BE49-F238E27FC236}">
+                <a16:creationId xmlns:a16="http://schemas.microsoft.com/office/drawing/2014/main" id="{D6E1A31B-6E3D-455A-9820-BF78DE7C1765}"/>
+              </a:ext>
+            </a:extLst>
+          </p:cNvPr>
+          <p:cNvCxnSpPr>
+            <a:cxnSpLocks/>
+            <a:stCxn id="33" idx="3"/>
+            <a:endCxn id="50" idx="1"/>
+          </p:cNvCxnSpPr>
+          <p:nvPr/>
+        </p:nvCxnSpPr>
+        <p:spPr>
+          <a:xfrm flipV="1">
+            <a:off x="4139778" y="1519850"/>
+            <a:ext cx="290888" cy="357986"/>
+          </a:xfrm>
+          <a:prstGeom prst="straightConnector1">
+            <a:avLst/>
+          </a:prstGeom>
+          <a:ln>
+            <a:tailEnd type="triangle" w="med" len="med"/>
+          </a:ln>
+        </p:spPr>
+        <p:style>
+          <a:lnRef idx="1">
+            <a:schemeClr val="accent1"/>
+          </a:lnRef>
+          <a:fillRef idx="0">
+            <a:schemeClr val="accent1"/>
+          </a:fillRef>
+          <a:effectRef idx="0">
+            <a:schemeClr val="accent1"/>
+          </a:effectRef>
+          <a:fontRef idx="minor">
+            <a:schemeClr val="tx1"/>
+          </a:fontRef>
+        </p:style>
+      </p:cxnSp>
+      <p:cxnSp>
+        <p:nvCxnSpPr>
+          <p:cNvPr id="59" name="Gerade Verbindung mit Pfeil 14">
+            <a:extLst>
+              <a:ext uri="{FF2B5EF4-FFF2-40B4-BE49-F238E27FC236}">
+                <a16:creationId xmlns:a16="http://schemas.microsoft.com/office/drawing/2014/main" id="{BEC96846-0FB0-492F-9070-988A6073AC62}"/>
+              </a:ext>
+            </a:extLst>
+          </p:cNvPr>
+          <p:cNvCxnSpPr>
+            <a:cxnSpLocks/>
+            <a:stCxn id="38" idx="3"/>
+            <a:endCxn id="37" idx="1"/>
+          </p:cNvCxnSpPr>
+          <p:nvPr/>
+        </p:nvCxnSpPr>
+        <p:spPr>
+          <a:xfrm flipV="1">
+            <a:off x="4139778" y="3399565"/>
+            <a:ext cx="290844" cy="2537"/>
+          </a:xfrm>
+          <a:prstGeom prst="straightConnector1">
+            <a:avLst/>
+          </a:prstGeom>
+          <a:ln>
+            <a:tailEnd type="triangle" w="med" len="med"/>
+          </a:ln>
+        </p:spPr>
+        <p:style>
+          <a:lnRef idx="1">
+            <a:schemeClr val="accent1"/>
+          </a:lnRef>
+          <a:fillRef idx="0">
+            <a:schemeClr val="accent1"/>
+          </a:fillRef>
+          <a:effectRef idx="0">
+            <a:schemeClr val="accent1"/>
+          </a:effectRef>
+          <a:fontRef idx="minor">
+            <a:schemeClr val="tx1"/>
+          </a:fontRef>
+        </p:style>
+      </p:cxnSp>
+      <p:cxnSp>
+        <p:nvCxnSpPr>
+          <p:cNvPr id="64" name="Gerade Verbindung mit Pfeil 14">
+            <a:extLst>
+              <a:ext uri="{FF2B5EF4-FFF2-40B4-BE49-F238E27FC236}">
+                <a16:creationId xmlns:a16="http://schemas.microsoft.com/office/drawing/2014/main" id="{E6682C72-2B1F-4781-9D26-E684DD9AE1FB}"/>
+              </a:ext>
+            </a:extLst>
+          </p:cNvPr>
+          <p:cNvCxnSpPr>
+            <a:cxnSpLocks/>
+            <a:stCxn id="48" idx="3"/>
+            <a:endCxn id="34" idx="1"/>
+          </p:cNvCxnSpPr>
+          <p:nvPr/>
+        </p:nvCxnSpPr>
+        <p:spPr>
+          <a:xfrm>
+            <a:off x="4142432" y="4333020"/>
+            <a:ext cx="285552" cy="1304"/>
+          </a:xfrm>
+          <a:prstGeom prst="straightConnector1">
+            <a:avLst/>
+          </a:prstGeom>
+          <a:ln>
+            <a:tailEnd type="triangle" w="med" len="med"/>
+          </a:ln>
+        </p:spPr>
+        <p:style>
+          <a:lnRef idx="1">
+            <a:schemeClr val="accent1"/>
+          </a:lnRef>
+          <a:fillRef idx="0">
+            <a:schemeClr val="accent1"/>
+          </a:fillRef>
+          <a:effectRef idx="0">
+            <a:schemeClr val="accent1"/>
+          </a:effectRef>
+          <a:fontRef idx="minor">
+            <a:schemeClr val="tx1"/>
+          </a:fontRef>
+        </p:style>
+      </p:cxnSp>
+      <p:sp>
+        <p:nvSpPr>
+          <p:cNvPr id="29" name="Flussdiagramm: Dokument 28">
+            <a:extLst>
+              <a:ext uri="{FF2B5EF4-FFF2-40B4-BE49-F238E27FC236}">
+                <a16:creationId xmlns:a16="http://schemas.microsoft.com/office/drawing/2014/main" id="{347BA2A7-346E-45AB-B447-44C458E39776}"/>
+              </a:ext>
+            </a:extLst>
+          </p:cNvPr>
+          <p:cNvSpPr/>
+          <p:nvPr/>
+        </p:nvSpPr>
+        <p:spPr>
+          <a:xfrm>
+            <a:off x="1332850" y="3004323"/>
+            <a:ext cx="1081087" cy="792163"/>
+          </a:xfrm>
+          <a:prstGeom prst="flowChartDocument">
+            <a:avLst/>
+          </a:prstGeom>
+        </p:spPr>
+        <p:style>
+          <a:lnRef idx="1">
+            <a:schemeClr val="accent6"/>
+          </a:lnRef>
+          <a:fillRef idx="2">
+            <a:schemeClr val="accent6"/>
+          </a:fillRef>
+          <a:effectRef idx="1">
+            <a:schemeClr val="accent6"/>
+          </a:effectRef>
+          <a:fontRef idx="minor">
+            <a:schemeClr val="dk1"/>
+          </a:fontRef>
+        </p:style>
+        <p:txBody>
+          <a:bodyPr anchor="ctr"/>
+          <a:lstStyle/>
+          <a:p>
+            <a:pPr algn="ctr" eaLnBrk="0" fontAlgn="auto" hangingPunct="0">
+              <a:spcBef>
+                <a:spcPts val="0"/>
+              </a:spcBef>
+              <a:spcAft>
+                <a:spcPts val="0"/>
+              </a:spcAft>
+              <a:defRPr/>
+            </a:pPr>
+            <a:r>
+              <a:rPr lang="de-DE" sz="1600" dirty="0">
+                <a:cs typeface="Arial" panose="020B0604020202020204" pitchFamily="34" charset="0"/>
+              </a:rPr>
+              <a:t>Tumor</a:t>
+            </a:r>
+            <a:endParaRPr lang="en-US" sz="1600" dirty="0">
+              <a:cs typeface="Arial" panose="020B0604020202020204" pitchFamily="34" charset="0"/>
+            </a:endParaRPr>
+          </a:p>
+          <a:p>
+            <a:pPr algn="ctr" eaLnBrk="0" fontAlgn="auto" hangingPunct="0">
+              <a:spcBef>
+                <a:spcPts val="0"/>
+              </a:spcBef>
+              <a:spcAft>
+                <a:spcPts val="0"/>
+              </a:spcAft>
+              <a:defRPr/>
+            </a:pPr>
+            <a:r>
+              <a:rPr lang="en-US" sz="1600" dirty="0">
+                <a:cs typeface="Arial" panose="020B0604020202020204" pitchFamily="34" charset="0"/>
+              </a:rPr>
+              <a:t>BAM</a:t>
+            </a:r>
+          </a:p>
+        </p:txBody>
+      </p:sp>
+      <p:cxnSp>
+        <p:nvCxnSpPr>
+          <p:cNvPr id="30" name="Gerade Verbindung mit Pfeil 14">
+            <a:extLst>
+              <a:ext uri="{FF2B5EF4-FFF2-40B4-BE49-F238E27FC236}">
+                <a16:creationId xmlns:a16="http://schemas.microsoft.com/office/drawing/2014/main" id="{17D2936E-0F1A-4A52-8BBF-FDA8B0DECC82}"/>
+              </a:ext>
+            </a:extLst>
+          </p:cNvPr>
+          <p:cNvCxnSpPr>
+            <a:cxnSpLocks/>
+            <a:stCxn id="29" idx="3"/>
+            <a:endCxn id="33" idx="1"/>
+          </p:cNvCxnSpPr>
+          <p:nvPr/>
+        </p:nvCxnSpPr>
+        <p:spPr>
+          <a:xfrm flipV="1">
+            <a:off x="2413937" y="1877836"/>
+            <a:ext cx="501879" cy="1522569"/>
+          </a:xfrm>
+          <a:prstGeom prst="straightConnector1">
+            <a:avLst/>
+          </a:prstGeom>
+          <a:ln>
+            <a:tailEnd type="triangle" w="med" len="med"/>
+          </a:ln>
+        </p:spPr>
+        <p:style>
+          <a:lnRef idx="1">
+            <a:schemeClr val="accent1"/>
+          </a:lnRef>
+          <a:fillRef idx="0">
+            <a:schemeClr val="accent1"/>
+          </a:fillRef>
+          <a:effectRef idx="0">
+            <a:schemeClr val="accent1"/>
+          </a:effectRef>
+          <a:fontRef idx="minor">
+            <a:schemeClr val="tx1"/>
+          </a:fontRef>
+        </p:style>
+      </p:cxnSp>
+      <p:cxnSp>
+        <p:nvCxnSpPr>
+          <p:cNvPr id="31" name="Gerade Verbindung mit Pfeil 14">
+            <a:extLst>
+              <a:ext uri="{FF2B5EF4-FFF2-40B4-BE49-F238E27FC236}">
+                <a16:creationId xmlns:a16="http://schemas.microsoft.com/office/drawing/2014/main" id="{B7B5BCBA-82AF-4981-9DAC-536B0805A0B0}"/>
+              </a:ext>
+            </a:extLst>
+          </p:cNvPr>
+          <p:cNvCxnSpPr>
+            <a:cxnSpLocks/>
+            <a:stCxn id="29" idx="3"/>
+            <a:endCxn id="38" idx="1"/>
+          </p:cNvCxnSpPr>
+          <p:nvPr/>
+        </p:nvCxnSpPr>
+        <p:spPr>
+          <a:xfrm>
+            <a:off x="2413937" y="3400405"/>
+            <a:ext cx="501879" cy="1697"/>
+          </a:xfrm>
+          <a:prstGeom prst="straightConnector1">
+            <a:avLst/>
+          </a:prstGeom>
+          <a:ln>
+            <a:tailEnd type="triangle" w="med" len="med"/>
+          </a:ln>
+        </p:spPr>
+        <p:style>
+          <a:lnRef idx="1">
+            <a:schemeClr val="accent1"/>
+          </a:lnRef>
+          <a:fillRef idx="0">
+            <a:schemeClr val="accent1"/>
+          </a:fillRef>
+          <a:effectRef idx="0">
+            <a:schemeClr val="accent1"/>
+          </a:effectRef>
+          <a:fontRef idx="minor">
+            <a:schemeClr val="tx1"/>
+          </a:fontRef>
+        </p:style>
+      </p:cxnSp>
+      <p:cxnSp>
+        <p:nvCxnSpPr>
+          <p:cNvPr id="32" name="Gerade Verbindung mit Pfeil 14">
+            <a:extLst>
+              <a:ext uri="{FF2B5EF4-FFF2-40B4-BE49-F238E27FC236}">
+                <a16:creationId xmlns:a16="http://schemas.microsoft.com/office/drawing/2014/main" id="{1B6E3F16-DAB2-4EA8-9670-35284D8FE661}"/>
+              </a:ext>
+            </a:extLst>
+          </p:cNvPr>
+          <p:cNvCxnSpPr>
+            <a:cxnSpLocks/>
+            <a:stCxn id="29" idx="3"/>
+            <a:endCxn id="48" idx="1"/>
+          </p:cNvCxnSpPr>
+          <p:nvPr/>
+        </p:nvCxnSpPr>
+        <p:spPr>
+          <a:xfrm>
+            <a:off x="2413937" y="3400405"/>
+            <a:ext cx="504533" cy="932615"/>
+          </a:xfrm>
+          <a:prstGeom prst="straightConnector1">
+            <a:avLst/>
+          </a:prstGeom>
+          <a:ln>
+            <a:tailEnd type="triangle" w="med" len="med"/>
+          </a:ln>
+        </p:spPr>
+        <p:style>
+          <a:lnRef idx="1">
+            <a:schemeClr val="accent1"/>
+          </a:lnRef>
+          <a:fillRef idx="0">
+            <a:schemeClr val="accent1"/>
+          </a:fillRef>
+          <a:effectRef idx="0">
+            <a:schemeClr val="accent1"/>
+          </a:effectRef>
+          <a:fontRef idx="minor">
+            <a:schemeClr val="tx1"/>
+          </a:fontRef>
+        </p:style>
+      </p:cxnSp>
+      <p:sp>
+        <p:nvSpPr>
+          <p:cNvPr id="21" name="Flussdiagramm: Prozess 47">
+            <a:extLst>
+              <a:ext uri="{FF2B5EF4-FFF2-40B4-BE49-F238E27FC236}">
+                <a16:creationId xmlns:a16="http://schemas.microsoft.com/office/drawing/2014/main" id="{23A6E427-3198-4D1C-8668-1FA7E02DAE13}"/>
+              </a:ext>
+            </a:extLst>
+          </p:cNvPr>
+          <p:cNvSpPr/>
+          <p:nvPr/>
+        </p:nvSpPr>
+        <p:spPr>
+          <a:xfrm>
+            <a:off x="2915816" y="4856023"/>
+            <a:ext cx="1223962" cy="792163"/>
+          </a:xfrm>
+          <a:prstGeom prst="flowChartProcess">
+            <a:avLst/>
+          </a:prstGeom>
+          <a:ln/>
+        </p:spPr>
+        <p:style>
+          <a:lnRef idx="1">
+            <a:schemeClr val="accent1"/>
+          </a:lnRef>
+          <a:fillRef idx="2">
+            <a:schemeClr val="accent1"/>
+          </a:fillRef>
+          <a:effectRef idx="1">
+            <a:schemeClr val="accent1"/>
+          </a:effectRef>
+          <a:fontRef idx="minor">
+            <a:schemeClr val="dk1"/>
+          </a:fontRef>
+        </p:style>
+        <p:txBody>
+          <a:bodyPr anchor="ctr"/>
+          <a:lstStyle/>
+          <a:p>
+            <a:pPr algn="ctr" eaLnBrk="0" fontAlgn="auto" hangingPunct="0">
+              <a:spcBef>
+                <a:spcPts val="0"/>
+              </a:spcBef>
+              <a:spcAft>
+                <a:spcPts val="0"/>
+              </a:spcAft>
+              <a:defRPr/>
+            </a:pPr>
+            <a:r>
+              <a:rPr lang="de-DE" sz="1200" dirty="0" err="1">
+                <a:cs typeface="Arial" panose="020B0604020202020204" pitchFamily="34" charset="0"/>
+              </a:rPr>
+              <a:t>Microsatellite</a:t>
+            </a:r>
+            <a:r>
+              <a:rPr lang="de-DE" sz="1200" dirty="0">
+                <a:cs typeface="Arial" panose="020B0604020202020204" pitchFamily="34" charset="0"/>
+              </a:rPr>
+              <a:t> </a:t>
+            </a:r>
+            <a:r>
+              <a:rPr lang="de-DE" sz="1200" dirty="0" err="1">
+                <a:cs typeface="Arial" panose="020B0604020202020204" pitchFamily="34" charset="0"/>
+              </a:rPr>
+              <a:t>analysis</a:t>
+            </a:r>
+            <a:endParaRPr lang="en-US" sz="1200" dirty="0">
+              <a:cs typeface="Arial" panose="020B0604020202020204" pitchFamily="34" charset="0"/>
+            </a:endParaRPr>
+          </a:p>
+        </p:txBody>
+      </p:sp>
+      <p:sp>
+        <p:nvSpPr>
+          <p:cNvPr id="23" name="Sprechblase: rechteckig 21">
+            <a:extLst>
+              <a:ext uri="{FF2B5EF4-FFF2-40B4-BE49-F238E27FC236}">
+                <a16:creationId xmlns:a16="http://schemas.microsoft.com/office/drawing/2014/main" id="{7EA7F104-CD8A-4FF5-8C22-13C98D1C676B}"/>
+              </a:ext>
+            </a:extLst>
+          </p:cNvPr>
+          <p:cNvSpPr/>
+          <p:nvPr/>
+        </p:nvSpPr>
+        <p:spPr>
+          <a:xfrm>
+            <a:off x="251520" y="1668771"/>
+            <a:ext cx="902179" cy="568054"/>
+          </a:xfrm>
+          <a:prstGeom prst="wedgeRectCallout">
+            <a:avLst>
+              <a:gd name="adj1" fmla="val 92565"/>
+              <a:gd name="adj2" fmla="val -4159"/>
+            </a:avLst>
+          </a:prstGeom>
+        </p:spPr>
+        <p:style>
+          <a:lnRef idx="0">
+            <a:schemeClr val="accent3"/>
+          </a:lnRef>
+          <a:fillRef idx="3">
+            <a:schemeClr val="accent3"/>
+          </a:fillRef>
+          <a:effectRef idx="3">
+            <a:schemeClr val="accent3"/>
+          </a:effectRef>
+          <a:fontRef idx="minor">
+            <a:schemeClr val="lt1"/>
+          </a:fontRef>
+        </p:style>
+        <p:txBody>
+          <a:bodyPr rtlCol="0" anchor="ctr"/>
+          <a:lstStyle/>
+          <a:p>
+            <a:pPr algn="ctr"/>
+            <a:r>
+              <a:rPr lang="en-US" sz="1050" dirty="0">
+                <a:solidFill>
+                  <a:schemeClr val="tx1"/>
+                </a:solidFill>
+              </a:rPr>
+              <a:t>If available</a:t>
+            </a:r>
+          </a:p>
+        </p:txBody>
+      </p:sp>
+      <p:cxnSp>
+        <p:nvCxnSpPr>
+          <p:cNvPr id="24" name="Gerade Verbindung mit Pfeil 14">
+            <a:extLst>
+              <a:ext uri="{FF2B5EF4-FFF2-40B4-BE49-F238E27FC236}">
+                <a16:creationId xmlns:a16="http://schemas.microsoft.com/office/drawing/2014/main" id="{0887A318-5403-4FBF-82AC-9CC506C2C231}"/>
+              </a:ext>
+            </a:extLst>
+          </p:cNvPr>
+          <p:cNvCxnSpPr>
+            <a:cxnSpLocks/>
+            <a:stCxn id="29" idx="3"/>
+            <a:endCxn id="21" idx="1"/>
+          </p:cNvCxnSpPr>
+          <p:nvPr/>
+        </p:nvCxnSpPr>
+        <p:spPr>
+          <a:xfrm>
+            <a:off x="2413937" y="3400405"/>
+            <a:ext cx="501879" cy="1851700"/>
+          </a:xfrm>
+          <a:prstGeom prst="straightConnector1">
+            <a:avLst/>
+          </a:prstGeom>
+          <a:ln>
+            <a:tailEnd type="triangle" w="med" len="med"/>
+          </a:ln>
+        </p:spPr>
+        <p:style>
+          <a:lnRef idx="1">
+            <a:schemeClr val="accent1"/>
+          </a:lnRef>
+          <a:fillRef idx="0">
+            <a:schemeClr val="accent1"/>
+          </a:fillRef>
+          <a:effectRef idx="0">
+            <a:schemeClr val="accent1"/>
+          </a:effectRef>
+          <a:fontRef idx="minor">
+            <a:schemeClr val="tx1"/>
+          </a:fontRef>
+        </p:style>
+      </p:cxnSp>
+      <p:sp>
+        <p:nvSpPr>
+          <p:cNvPr id="34" name="Flussdiagramm: Dokument 36">
+            <a:extLst>
+              <a:ext uri="{FF2B5EF4-FFF2-40B4-BE49-F238E27FC236}">
+                <a16:creationId xmlns:a16="http://schemas.microsoft.com/office/drawing/2014/main" id="{A6E233CA-54F9-4B46-A86E-5ED071B35E83}"/>
+              </a:ext>
+            </a:extLst>
+          </p:cNvPr>
+          <p:cNvSpPr/>
+          <p:nvPr/>
+        </p:nvSpPr>
+        <p:spPr>
+          <a:xfrm>
+            <a:off x="4427984" y="3938242"/>
+            <a:ext cx="1081088" cy="792163"/>
+          </a:xfrm>
+          <a:prstGeom prst="flowChartDocument">
+            <a:avLst/>
+          </a:prstGeom>
+        </p:spPr>
+        <p:style>
+          <a:lnRef idx="1">
+            <a:schemeClr val="accent6"/>
+          </a:lnRef>
+          <a:fillRef idx="2">
+            <a:schemeClr val="accent6"/>
+          </a:fillRef>
+          <a:effectRef idx="1">
+            <a:schemeClr val="accent6"/>
+          </a:effectRef>
+          <a:fontRef idx="minor">
+            <a:schemeClr val="dk1"/>
+          </a:fontRef>
+        </p:style>
+        <p:txBody>
+          <a:bodyPr anchor="ctr"/>
+          <a:lstStyle/>
+          <a:p>
+            <a:pPr algn="ctr" eaLnBrk="0" fontAlgn="auto" hangingPunct="0">
+              <a:spcBef>
+                <a:spcPts val="0"/>
+              </a:spcBef>
+              <a:spcAft>
+                <a:spcPts val="0"/>
+              </a:spcAft>
+              <a:defRPr/>
+            </a:pPr>
+            <a:r>
+              <a:rPr lang="en-US" sz="1600" dirty="0">
+                <a:cs typeface="Arial" panose="020B0604020202020204" pitchFamily="34" charset="0"/>
+              </a:rPr>
+              <a:t>TSV</a:t>
+            </a:r>
+          </a:p>
+        </p:txBody>
+      </p:sp>
+      <p:sp>
+        <p:nvSpPr>
+          <p:cNvPr id="35" name="Flussdiagramm: Prozess 32">
+            <a:extLst>
+              <a:ext uri="{FF2B5EF4-FFF2-40B4-BE49-F238E27FC236}">
+                <a16:creationId xmlns:a16="http://schemas.microsoft.com/office/drawing/2014/main" id="{581D5B5D-8EA3-4A13-919A-4BDE8A15BEF1}"/>
+              </a:ext>
+            </a:extLst>
+          </p:cNvPr>
+          <p:cNvSpPr/>
+          <p:nvPr/>
+        </p:nvSpPr>
+        <p:spPr>
+          <a:xfrm>
+            <a:off x="6083201" y="1143792"/>
+            <a:ext cx="1008112" cy="752115"/>
+          </a:xfrm>
+          <a:prstGeom prst="flowChartProcess">
+            <a:avLst/>
+          </a:prstGeom>
+          <a:ln/>
+        </p:spPr>
+        <p:style>
+          <a:lnRef idx="1">
+            <a:schemeClr val="accent1"/>
+          </a:lnRef>
+          <a:fillRef idx="2">
+            <a:schemeClr val="accent1"/>
+          </a:fillRef>
+          <a:effectRef idx="1">
+            <a:schemeClr val="accent1"/>
+          </a:effectRef>
+          <a:fontRef idx="minor">
+            <a:schemeClr val="dk1"/>
+          </a:fontRef>
+        </p:style>
+        <p:txBody>
+          <a:bodyPr anchor="ctr"/>
+          <a:lstStyle/>
+          <a:p>
+            <a:pPr algn="ctr" eaLnBrk="0" fontAlgn="auto" hangingPunct="0">
+              <a:spcBef>
+                <a:spcPts val="0"/>
+              </a:spcBef>
+              <a:spcAft>
+                <a:spcPts val="0"/>
+              </a:spcAft>
+              <a:defRPr/>
+            </a:pPr>
+            <a:r>
+              <a:rPr lang="de-DE" sz="1200" dirty="0">
+                <a:cs typeface="Arial" panose="020B0604020202020204" pitchFamily="34" charset="0"/>
+              </a:rPr>
+              <a:t>Annotation + </a:t>
+            </a:r>
+            <a:r>
+              <a:rPr lang="de-DE" sz="1200" dirty="0" err="1">
+                <a:cs typeface="Arial" panose="020B0604020202020204" pitchFamily="34" charset="0"/>
+              </a:rPr>
+              <a:t>annotate</a:t>
+            </a:r>
+            <a:r>
+              <a:rPr lang="de-DE" sz="1200" dirty="0">
+                <a:cs typeface="Arial" panose="020B0604020202020204" pitchFamily="34" charset="0"/>
+              </a:rPr>
+              <a:t> RNA </a:t>
+            </a:r>
+            <a:r>
+              <a:rPr lang="de-DE" sz="1200" dirty="0" err="1">
+                <a:cs typeface="Arial" panose="020B0604020202020204" pitchFamily="34" charset="0"/>
+              </a:rPr>
+              <a:t>data</a:t>
+            </a:r>
+            <a:endParaRPr lang="en-US" sz="1200" dirty="0">
+              <a:cs typeface="Arial" panose="020B0604020202020204" pitchFamily="34" charset="0"/>
+            </a:endParaRPr>
+          </a:p>
+        </p:txBody>
+      </p:sp>
+      <p:cxnSp>
+        <p:nvCxnSpPr>
+          <p:cNvPr id="36" name="Gerade Verbindung mit Pfeil 14">
+            <a:extLst>
+              <a:ext uri="{FF2B5EF4-FFF2-40B4-BE49-F238E27FC236}">
+                <a16:creationId xmlns:a16="http://schemas.microsoft.com/office/drawing/2014/main" id="{F7B157E7-FB70-4E18-937B-D3AA4483D41D}"/>
+              </a:ext>
+            </a:extLst>
+          </p:cNvPr>
+          <p:cNvCxnSpPr>
+            <a:cxnSpLocks/>
+            <a:stCxn id="50" idx="3"/>
+            <a:endCxn id="35" idx="1"/>
+          </p:cNvCxnSpPr>
+          <p:nvPr/>
+        </p:nvCxnSpPr>
+        <p:spPr>
+          <a:xfrm>
+            <a:off x="5511754" y="1519850"/>
+            <a:ext cx="571447" cy="0"/>
+          </a:xfrm>
+          <a:prstGeom prst="straightConnector1">
+            <a:avLst/>
+          </a:prstGeom>
+          <a:ln>
+            <a:tailEnd type="triangle" w="med" len="med"/>
+          </a:ln>
+        </p:spPr>
+        <p:style>
+          <a:lnRef idx="1">
+            <a:schemeClr val="accent1"/>
+          </a:lnRef>
+          <a:fillRef idx="0">
+            <a:schemeClr val="accent1"/>
+          </a:fillRef>
+          <a:effectRef idx="0">
+            <a:schemeClr val="accent1"/>
+          </a:effectRef>
+          <a:fontRef idx="minor">
+            <a:schemeClr val="tx1"/>
+          </a:fontRef>
+        </p:style>
+      </p:cxnSp>
+      <p:sp>
+        <p:nvSpPr>
+          <p:cNvPr id="39" name="Flussdiagramm: Dokument 19">
+            <a:extLst>
+              <a:ext uri="{FF2B5EF4-FFF2-40B4-BE49-F238E27FC236}">
+                <a16:creationId xmlns:a16="http://schemas.microsoft.com/office/drawing/2014/main" id="{43B168EF-8340-4970-80F9-012509A464D7}"/>
+              </a:ext>
+            </a:extLst>
+          </p:cNvPr>
+          <p:cNvSpPr/>
+          <p:nvPr/>
+        </p:nvSpPr>
+        <p:spPr>
+          <a:xfrm>
+            <a:off x="7451353" y="1124200"/>
+            <a:ext cx="1081087" cy="786101"/>
+          </a:xfrm>
+          <a:prstGeom prst="flowChartDocument">
+            <a:avLst/>
+          </a:prstGeom>
+        </p:spPr>
+        <p:style>
+          <a:lnRef idx="1">
+            <a:schemeClr val="accent6"/>
+          </a:lnRef>
+          <a:fillRef idx="2">
+            <a:schemeClr val="accent6"/>
+          </a:fillRef>
+          <a:effectRef idx="1">
+            <a:schemeClr val="accent6"/>
+          </a:effectRef>
+          <a:fontRef idx="minor">
+            <a:schemeClr val="dk1"/>
+          </a:fontRef>
+        </p:style>
+        <p:txBody>
+          <a:bodyPr anchor="ctr"/>
+          <a:lstStyle/>
+          <a:p>
+            <a:pPr algn="ctr" eaLnBrk="0" fontAlgn="auto" hangingPunct="0">
+              <a:spcBef>
+                <a:spcPts val="0"/>
+              </a:spcBef>
+              <a:spcAft>
+                <a:spcPts val="0"/>
+              </a:spcAft>
+              <a:defRPr/>
+            </a:pPr>
+            <a:r>
+              <a:rPr lang="en-US" sz="1600" dirty="0">
+                <a:cs typeface="Arial" panose="020B0604020202020204" pitchFamily="34" charset="0"/>
+              </a:rPr>
+              <a:t>VCF + </a:t>
+            </a:r>
+          </a:p>
+          <a:p>
+            <a:pPr algn="ctr" eaLnBrk="0" fontAlgn="auto" hangingPunct="0">
+              <a:spcBef>
+                <a:spcPts val="0"/>
+              </a:spcBef>
+              <a:spcAft>
+                <a:spcPts val="0"/>
+              </a:spcAft>
+              <a:defRPr/>
+            </a:pPr>
+            <a:r>
+              <a:rPr lang="en-US" sz="1600" dirty="0" err="1">
+                <a:cs typeface="Arial" panose="020B0604020202020204" pitchFamily="34" charset="0"/>
+              </a:rPr>
+              <a:t>GSvar</a:t>
+            </a:r>
+            <a:endParaRPr lang="en-US" sz="1600" dirty="0">
+              <a:cs typeface="Arial" panose="020B0604020202020204" pitchFamily="34" charset="0"/>
+            </a:endParaRPr>
+          </a:p>
+        </p:txBody>
+      </p:sp>
+      <p:cxnSp>
+        <p:nvCxnSpPr>
+          <p:cNvPr id="41" name="Gerade Verbindung mit Pfeil 14">
+            <a:extLst>
+              <a:ext uri="{FF2B5EF4-FFF2-40B4-BE49-F238E27FC236}">
+                <a16:creationId xmlns:a16="http://schemas.microsoft.com/office/drawing/2014/main" id="{EC3D387C-660A-4BC5-ACB1-BF30FDD8AAA8}"/>
+              </a:ext>
+            </a:extLst>
+          </p:cNvPr>
+          <p:cNvCxnSpPr>
+            <a:cxnSpLocks/>
+            <a:stCxn id="35" idx="3"/>
+            <a:endCxn id="39" idx="1"/>
+          </p:cNvCxnSpPr>
+          <p:nvPr/>
+        </p:nvCxnSpPr>
+        <p:spPr>
+          <a:xfrm flipV="1">
+            <a:off x="7091313" y="1517251"/>
+            <a:ext cx="360040" cy="2599"/>
+          </a:xfrm>
+          <a:prstGeom prst="straightConnector1">
+            <a:avLst/>
+          </a:prstGeom>
+          <a:ln>
+            <a:tailEnd type="triangle" w="med" len="med"/>
+          </a:ln>
+        </p:spPr>
+        <p:style>
+          <a:lnRef idx="1">
+            <a:schemeClr val="accent1"/>
+          </a:lnRef>
+          <a:fillRef idx="0">
+            <a:schemeClr val="accent1"/>
+          </a:fillRef>
+          <a:effectRef idx="0">
+            <a:schemeClr val="accent1"/>
+          </a:effectRef>
+          <a:fontRef idx="minor">
+            <a:schemeClr val="tx1"/>
+          </a:fontRef>
+        </p:style>
+      </p:cxnSp>
+      <p:sp>
+        <p:nvSpPr>
+          <p:cNvPr id="47" name="Flussdiagramm: Dokument 36">
+            <a:extLst>
+              <a:ext uri="{FF2B5EF4-FFF2-40B4-BE49-F238E27FC236}">
+                <a16:creationId xmlns:a16="http://schemas.microsoft.com/office/drawing/2014/main" id="{21951D11-82CD-4001-9CBA-B9BC89FF0C9F}"/>
+              </a:ext>
+            </a:extLst>
+          </p:cNvPr>
+          <p:cNvSpPr/>
+          <p:nvPr/>
+        </p:nvSpPr>
+        <p:spPr>
+          <a:xfrm>
+            <a:off x="4430666" y="2018952"/>
+            <a:ext cx="1081088" cy="752115"/>
+          </a:xfrm>
+          <a:prstGeom prst="flowChartDocument">
+            <a:avLst/>
+          </a:prstGeom>
+        </p:spPr>
+        <p:style>
+          <a:lnRef idx="1">
+            <a:schemeClr val="accent6"/>
+          </a:lnRef>
+          <a:fillRef idx="2">
+            <a:schemeClr val="accent6"/>
+          </a:fillRef>
+          <a:effectRef idx="1">
+            <a:schemeClr val="accent6"/>
+          </a:effectRef>
+          <a:fontRef idx="minor">
+            <a:schemeClr val="dk1"/>
+          </a:fontRef>
+        </p:style>
+        <p:txBody>
+          <a:bodyPr anchor="ctr"/>
+          <a:lstStyle/>
+          <a:p>
+            <a:pPr algn="ctr" eaLnBrk="0" fontAlgn="auto" hangingPunct="0">
+              <a:spcBef>
+                <a:spcPts val="0"/>
+              </a:spcBef>
+              <a:spcAft>
+                <a:spcPts val="0"/>
+              </a:spcAft>
+              <a:defRPr/>
+            </a:pPr>
+            <a:r>
+              <a:rPr lang="en-US" sz="1600" dirty="0">
+                <a:cs typeface="Arial" panose="020B0604020202020204" pitchFamily="34" charset="0"/>
+              </a:rPr>
+              <a:t>BEDPE</a:t>
+            </a:r>
+          </a:p>
+        </p:txBody>
+      </p:sp>
+      <p:sp>
+        <p:nvSpPr>
+          <p:cNvPr id="50" name="Flussdiagramm: Dokument 36">
+            <a:extLst>
+              <a:ext uri="{FF2B5EF4-FFF2-40B4-BE49-F238E27FC236}">
+                <a16:creationId xmlns:a16="http://schemas.microsoft.com/office/drawing/2014/main" id="{BC269557-129A-4EBF-B60B-5B0400B14BEB}"/>
+              </a:ext>
+            </a:extLst>
+          </p:cNvPr>
+          <p:cNvSpPr/>
+          <p:nvPr/>
+        </p:nvSpPr>
+        <p:spPr>
+          <a:xfrm>
+            <a:off x="4430666" y="1143792"/>
+            <a:ext cx="1081088" cy="752115"/>
+          </a:xfrm>
+          <a:prstGeom prst="flowChartDocument">
+            <a:avLst/>
+          </a:prstGeom>
+        </p:spPr>
+        <p:style>
+          <a:lnRef idx="1">
+            <a:schemeClr val="accent6"/>
+          </a:lnRef>
+          <a:fillRef idx="2">
+            <a:schemeClr val="accent6"/>
+          </a:fillRef>
+          <a:effectRef idx="1">
+            <a:schemeClr val="accent6"/>
+          </a:effectRef>
+          <a:fontRef idx="minor">
+            <a:schemeClr val="dk1"/>
+          </a:fontRef>
+        </p:style>
+        <p:txBody>
+          <a:bodyPr anchor="ctr"/>
+          <a:lstStyle/>
+          <a:p>
+            <a:pPr algn="ctr" eaLnBrk="0" fontAlgn="auto" hangingPunct="0">
+              <a:spcBef>
+                <a:spcPts val="0"/>
+              </a:spcBef>
+              <a:spcAft>
+                <a:spcPts val="0"/>
+              </a:spcAft>
+              <a:defRPr/>
+            </a:pPr>
+            <a:r>
+              <a:rPr lang="en-US" sz="1600" dirty="0">
+                <a:cs typeface="Arial" panose="020B0604020202020204" pitchFamily="34" charset="0"/>
+              </a:rPr>
+              <a:t>VCF</a:t>
+            </a:r>
+          </a:p>
+        </p:txBody>
+      </p:sp>
+      <p:cxnSp>
+        <p:nvCxnSpPr>
+          <p:cNvPr id="58" name="Gerade Verbindung mit Pfeil 14">
+            <a:extLst>
+              <a:ext uri="{FF2B5EF4-FFF2-40B4-BE49-F238E27FC236}">
+                <a16:creationId xmlns:a16="http://schemas.microsoft.com/office/drawing/2014/main" id="{9A01AE68-565D-4356-AD28-2E5417BC5D0F}"/>
+              </a:ext>
+            </a:extLst>
+          </p:cNvPr>
+          <p:cNvCxnSpPr>
+            <a:cxnSpLocks/>
+            <a:stCxn id="33" idx="3"/>
+            <a:endCxn id="47" idx="1"/>
+          </p:cNvCxnSpPr>
+          <p:nvPr/>
+        </p:nvCxnSpPr>
+        <p:spPr>
+          <a:xfrm>
+            <a:off x="4139778" y="1877836"/>
+            <a:ext cx="290888" cy="517174"/>
+          </a:xfrm>
+          <a:prstGeom prst="straightConnector1">
+            <a:avLst/>
+          </a:prstGeom>
+          <a:ln>
+            <a:tailEnd type="triangle" w="med" len="med"/>
+          </a:ln>
+        </p:spPr>
+        <p:style>
+          <a:lnRef idx="1">
+            <a:schemeClr val="accent1"/>
+          </a:lnRef>
+          <a:fillRef idx="0">
+            <a:schemeClr val="accent1"/>
+          </a:fillRef>
+          <a:effectRef idx="0">
+            <a:schemeClr val="accent1"/>
+          </a:effectRef>
+          <a:fontRef idx="minor">
+            <a:schemeClr val="tx1"/>
+          </a:fontRef>
+        </p:style>
+      </p:cxnSp>
+      <p:cxnSp>
+        <p:nvCxnSpPr>
+          <p:cNvPr id="61" name="Gerade Verbindung mit Pfeil 14">
+            <a:extLst>
+              <a:ext uri="{FF2B5EF4-FFF2-40B4-BE49-F238E27FC236}">
+                <a16:creationId xmlns:a16="http://schemas.microsoft.com/office/drawing/2014/main" id="{FC5E7231-F9AC-4CDD-8C45-110542155094}"/>
+              </a:ext>
+            </a:extLst>
+          </p:cNvPr>
+          <p:cNvCxnSpPr>
+            <a:cxnSpLocks/>
+            <a:stCxn id="21" idx="3"/>
+            <a:endCxn id="62" idx="1"/>
+          </p:cNvCxnSpPr>
+          <p:nvPr/>
+        </p:nvCxnSpPr>
+        <p:spPr>
+          <a:xfrm>
+            <a:off x="4139778" y="5252105"/>
+            <a:ext cx="285228" cy="0"/>
+          </a:xfrm>
+          <a:prstGeom prst="straightConnector1">
+            <a:avLst/>
+          </a:prstGeom>
+          <a:ln>
+            <a:tailEnd type="triangle" w="med" len="med"/>
+          </a:ln>
+        </p:spPr>
+        <p:style>
+          <a:lnRef idx="1">
+            <a:schemeClr val="accent1"/>
+          </a:lnRef>
+          <a:fillRef idx="0">
+            <a:schemeClr val="accent1"/>
+          </a:fillRef>
+          <a:effectRef idx="0">
+            <a:schemeClr val="accent1"/>
+          </a:effectRef>
+          <a:fontRef idx="minor">
+            <a:schemeClr val="tx1"/>
+          </a:fontRef>
+        </p:style>
+      </p:cxnSp>
+      <p:sp>
+        <p:nvSpPr>
+          <p:cNvPr id="62" name="Flussdiagramm: Dokument 36">
+            <a:extLst>
+              <a:ext uri="{FF2B5EF4-FFF2-40B4-BE49-F238E27FC236}">
+                <a16:creationId xmlns:a16="http://schemas.microsoft.com/office/drawing/2014/main" id="{8971CE34-AEEB-4EA6-867D-F012E7550657}"/>
+              </a:ext>
+            </a:extLst>
+          </p:cNvPr>
+          <p:cNvSpPr/>
+          <p:nvPr/>
+        </p:nvSpPr>
+        <p:spPr>
+          <a:xfrm>
+            <a:off x="4425006" y="4856023"/>
+            <a:ext cx="1081088" cy="792163"/>
+          </a:xfrm>
+          <a:prstGeom prst="flowChartDocument">
+            <a:avLst/>
+          </a:prstGeom>
+        </p:spPr>
+        <p:style>
+          <a:lnRef idx="1">
+            <a:schemeClr val="accent6"/>
+          </a:lnRef>
+          <a:fillRef idx="2">
+            <a:schemeClr val="accent6"/>
+          </a:fillRef>
+          <a:effectRef idx="1">
+            <a:schemeClr val="accent6"/>
+          </a:effectRef>
+          <a:fontRef idx="minor">
+            <a:schemeClr val="dk1"/>
+          </a:fontRef>
+        </p:style>
+        <p:txBody>
+          <a:bodyPr anchor="ctr"/>
+          <a:lstStyle/>
+          <a:p>
+            <a:pPr algn="ctr" eaLnBrk="0" fontAlgn="auto" hangingPunct="0">
+              <a:spcBef>
+                <a:spcPts val="0"/>
+              </a:spcBef>
+              <a:spcAft>
+                <a:spcPts val="0"/>
+              </a:spcAft>
+              <a:defRPr/>
+            </a:pPr>
+            <a:r>
+              <a:rPr lang="en-US" sz="1600" dirty="0">
+                <a:cs typeface="Arial" panose="020B0604020202020204" pitchFamily="34" charset="0"/>
+              </a:rPr>
+              <a:t>TSV</a:t>
+            </a:r>
+          </a:p>
+        </p:txBody>
+      </p:sp>
+      <p:sp>
+        <p:nvSpPr>
+          <p:cNvPr id="87" name="Flussdiagramm: Dokument 21">
+            <a:extLst>
+              <a:ext uri="{FF2B5EF4-FFF2-40B4-BE49-F238E27FC236}">
+                <a16:creationId xmlns:a16="http://schemas.microsoft.com/office/drawing/2014/main" id="{8F902EF1-5861-459E-9F5C-00DFFD50FBFB}"/>
+              </a:ext>
+            </a:extLst>
+          </p:cNvPr>
+          <p:cNvSpPr/>
+          <p:nvPr/>
+        </p:nvSpPr>
+        <p:spPr>
+          <a:xfrm>
+            <a:off x="6050379" y="2211320"/>
+            <a:ext cx="1081087" cy="792163"/>
+          </a:xfrm>
+          <a:prstGeom prst="flowChartDocument">
+            <a:avLst/>
+          </a:prstGeom>
+        </p:spPr>
+        <p:style>
+          <a:lnRef idx="1">
+            <a:schemeClr val="accent6"/>
+          </a:lnRef>
+          <a:fillRef idx="2">
+            <a:schemeClr val="accent6"/>
+          </a:fillRef>
+          <a:effectRef idx="1">
+            <a:schemeClr val="accent6"/>
+          </a:effectRef>
+          <a:fontRef idx="minor">
+            <a:schemeClr val="dk1"/>
+          </a:fontRef>
+        </p:style>
+        <p:txBody>
+          <a:bodyPr anchor="ctr"/>
+          <a:lstStyle/>
+          <a:p>
+            <a:pPr algn="ctr" eaLnBrk="0" fontAlgn="auto" hangingPunct="0">
+              <a:spcBef>
+                <a:spcPts val="0"/>
+              </a:spcBef>
+              <a:spcAft>
+                <a:spcPts val="0"/>
+              </a:spcAft>
+              <a:defRPr/>
+            </a:pPr>
+            <a:r>
+              <a:rPr lang="de-DE" sz="1600" dirty="0">
+                <a:cs typeface="Arial" panose="020B0604020202020204" pitchFamily="34" charset="0"/>
+              </a:rPr>
+              <a:t>RNA</a:t>
+            </a:r>
+          </a:p>
+          <a:p>
+            <a:pPr algn="ctr" eaLnBrk="0" fontAlgn="auto" hangingPunct="0">
+              <a:spcBef>
+                <a:spcPts val="0"/>
+              </a:spcBef>
+              <a:spcAft>
+                <a:spcPts val="0"/>
+              </a:spcAft>
+              <a:defRPr/>
+            </a:pPr>
+            <a:r>
+              <a:rPr lang="de-DE" sz="1600" dirty="0">
+                <a:cs typeface="Arial" panose="020B0604020202020204" pitchFamily="34" charset="0"/>
+              </a:rPr>
+              <a:t>BAM</a:t>
+            </a:r>
+            <a:endParaRPr lang="en-US" sz="1600" dirty="0">
+              <a:cs typeface="Arial" panose="020B0604020202020204" pitchFamily="34" charset="0"/>
+            </a:endParaRPr>
+          </a:p>
+        </p:txBody>
+      </p:sp>
+      <p:cxnSp>
+        <p:nvCxnSpPr>
+          <p:cNvPr id="88" name="Gerade Verbindung mit Pfeil 14">
+            <a:extLst>
+              <a:ext uri="{FF2B5EF4-FFF2-40B4-BE49-F238E27FC236}">
+                <a16:creationId xmlns:a16="http://schemas.microsoft.com/office/drawing/2014/main" id="{CC97B0A0-B4AA-4CF8-A9AB-D0767E51E504}"/>
+              </a:ext>
+            </a:extLst>
+          </p:cNvPr>
+          <p:cNvCxnSpPr>
+            <a:cxnSpLocks/>
+            <a:stCxn id="87" idx="0"/>
+            <a:endCxn id="35" idx="2"/>
+          </p:cNvCxnSpPr>
+          <p:nvPr/>
+        </p:nvCxnSpPr>
+        <p:spPr>
+          <a:xfrm flipH="1" flipV="1">
+            <a:off x="6587257" y="1895907"/>
+            <a:ext cx="3666" cy="315413"/>
+          </a:xfrm>
+          <a:prstGeom prst="straightConnector1">
+            <a:avLst/>
+          </a:prstGeom>
+          <a:ln>
+            <a:tailEnd type="triangle" w="med" len="med"/>
+          </a:ln>
+        </p:spPr>
+        <p:style>
+          <a:lnRef idx="1">
+            <a:schemeClr val="accent1"/>
+          </a:lnRef>
+          <a:fillRef idx="0">
+            <a:schemeClr val="accent1"/>
+          </a:fillRef>
+          <a:effectRef idx="0">
+            <a:schemeClr val="accent1"/>
+          </a:effectRef>
+          <a:fontRef idx="minor">
+            <a:schemeClr val="tx1"/>
+          </a:fontRef>
+        </p:style>
+      </p:cxnSp>
+      <p:sp>
+        <p:nvSpPr>
+          <p:cNvPr id="91" name="Sprechblase: rechteckig 21">
+            <a:extLst>
+              <a:ext uri="{FF2B5EF4-FFF2-40B4-BE49-F238E27FC236}">
+                <a16:creationId xmlns:a16="http://schemas.microsoft.com/office/drawing/2014/main" id="{ACC56605-82C7-443D-8BCE-09D94F0908AC}"/>
+              </a:ext>
+            </a:extLst>
+          </p:cNvPr>
+          <p:cNvSpPr/>
+          <p:nvPr/>
+        </p:nvSpPr>
+        <p:spPr>
+          <a:xfrm>
+            <a:off x="7383988" y="2303352"/>
+            <a:ext cx="902179" cy="568054"/>
+          </a:xfrm>
+          <a:prstGeom prst="wedgeRectCallout">
+            <a:avLst>
+              <a:gd name="adj1" fmla="val -93493"/>
+              <a:gd name="adj2" fmla="val -13357"/>
+            </a:avLst>
+          </a:prstGeom>
+        </p:spPr>
+        <p:style>
+          <a:lnRef idx="0">
+            <a:schemeClr val="accent3"/>
+          </a:lnRef>
+          <a:fillRef idx="3">
+            <a:schemeClr val="accent3"/>
+          </a:fillRef>
+          <a:effectRef idx="3">
+            <a:schemeClr val="accent3"/>
+          </a:effectRef>
+          <a:fontRef idx="minor">
+            <a:schemeClr val="lt1"/>
+          </a:fontRef>
+        </p:style>
+        <p:txBody>
+          <a:bodyPr rtlCol="0" anchor="ctr"/>
+          <a:lstStyle/>
+          <a:p>
+            <a:pPr algn="ctr"/>
+            <a:r>
+              <a:rPr lang="en-US" sz="1050" dirty="0">
+                <a:solidFill>
+                  <a:schemeClr val="tx1"/>
+                </a:solidFill>
+              </a:rPr>
+              <a:t>If available</a:t>
+            </a:r>
+          </a:p>
+        </p:txBody>
+      </p:sp>
+    </p:spTree>
+    <p:extLst>
+      <p:ext uri="{BB962C8B-B14F-4D97-AF65-F5344CB8AC3E}">
+        <p14:creationId xmlns:p14="http://schemas.microsoft.com/office/powerpoint/2010/main" val="937720064"/>
+      </p:ext>
+    </p:extLst>
+  </p:cSld>
+  <p:clrMapOvr>
+    <a:masterClrMapping/>
+  </p:clrMapOvr>
+</p:sld>
+</file>
+
+<file path=ppt/slides/slide6.xml><?xml version="1.0" encoding="utf-8"?>
+<p:sld xmlns:a="http://schemas.openxmlformats.org/drawingml/2006/main" xmlns:r="http://schemas.openxmlformats.org/officeDocument/2006/relationships" xmlns:p="http://schemas.openxmlformats.org/presentationml/2006/main">
+  <p:cSld>
+    <p:spTree>
+      <p:nvGrpSpPr>
+        <p:cNvPr id="1" name=""/>
+        <p:cNvGrpSpPr/>
+        <p:nvPr/>
+      </p:nvGrpSpPr>
+      <p:grpSpPr>
+        <a:xfrm>
+          <a:off x="0" y="0"/>
+          <a:ext cx="0" cy="0"/>
+          <a:chOff x="0" y="0"/>
+          <a:chExt cx="0" cy="0"/>
+        </a:xfrm>
+      </p:grpSpPr>
+      <p:sp>
+        <p:nvSpPr>
+          <p:cNvPr id="22530" name="Titel 1"/>
+          <p:cNvSpPr>
+            <a:spLocks noGrp="1"/>
+          </p:cNvSpPr>
+          <p:nvPr>
+            <p:ph type="title"/>
+          </p:nvPr>
+        </p:nvSpPr>
+        <p:spPr>
+          <a:xfrm>
+            <a:off x="107950" y="0"/>
+            <a:ext cx="9036050" cy="836613"/>
+          </a:xfrm>
+        </p:spPr>
+        <p:txBody>
+          <a:bodyPr/>
+          <a:lstStyle/>
+          <a:p>
+            <a:pPr eaLnBrk="1" hangingPunct="1"/>
+            <a:r>
+              <a:rPr lang="en-US" altLang="en-US" dirty="0"/>
+              <a:t>Trio/multi-sample analysis pipeline</a:t>
+            </a:r>
+          </a:p>
+        </p:txBody>
+      </p:sp>
+      <p:grpSp>
+        <p:nvGrpSpPr>
+          <p:cNvPr id="54" name="Group 53">
+            <a:extLst>
+              <a:ext uri="{FF2B5EF4-FFF2-40B4-BE49-F238E27FC236}">
+                <a16:creationId xmlns:a16="http://schemas.microsoft.com/office/drawing/2014/main" id="{A8662171-7C65-4DC2-A172-79EDA6B20A9B}"/>
+              </a:ext>
+            </a:extLst>
+          </p:cNvPr>
+          <p:cNvGrpSpPr/>
+          <p:nvPr/>
+        </p:nvGrpSpPr>
+        <p:grpSpPr>
+          <a:xfrm>
+            <a:off x="1115616" y="1268760"/>
+            <a:ext cx="5713176" cy="4502699"/>
+            <a:chOff x="587016" y="1567088"/>
+            <a:chExt cx="5713176" cy="4502699"/>
+          </a:xfrm>
+        </p:grpSpPr>
+        <p:sp>
+          <p:nvSpPr>
+            <p:cNvPr id="20" name="Flussdiagramm: Dokument 19"/>
+            <p:cNvSpPr/>
+            <p:nvPr/>
+          </p:nvSpPr>
+          <p:spPr>
+            <a:xfrm>
+              <a:off x="5219104" y="1567088"/>
+              <a:ext cx="1081088" cy="792163"/>
+            </a:xfrm>
+            <a:prstGeom prst="flowChartDocument">
+              <a:avLst/>
+            </a:prstGeom>
+          </p:spPr>
+          <p:style>
+            <a:lnRef idx="1">
+              <a:schemeClr val="accent6"/>
+            </a:lnRef>
+            <a:fillRef idx="2">
+              <a:schemeClr val="accent6"/>
+            </a:fillRef>
+            <a:effectRef idx="1">
+              <a:schemeClr val="accent6"/>
+            </a:effectRef>
+            <a:fontRef idx="minor">
+              <a:schemeClr val="dk1"/>
+            </a:fontRef>
+          </p:style>
+          <p:txBody>
+            <a:bodyPr anchor="ctr"/>
+            <a:lstStyle/>
+            <a:p>
+              <a:pPr algn="ctr" eaLnBrk="0" fontAlgn="auto" hangingPunct="0">
+                <a:spcBef>
+                  <a:spcPts val="0"/>
+                </a:spcBef>
+                <a:spcAft>
+                  <a:spcPts val="0"/>
+                </a:spcAft>
+                <a:defRPr/>
+              </a:pPr>
+              <a:r>
+                <a:rPr lang="en-US" sz="1600" dirty="0">
+                  <a:cs typeface="Arial" panose="020B0604020202020204" pitchFamily="34" charset="0"/>
+                </a:rPr>
+                <a:t>VCF + </a:t>
+              </a:r>
+            </a:p>
+            <a:p>
+              <a:pPr algn="ctr" eaLnBrk="0" fontAlgn="auto" hangingPunct="0">
+                <a:spcBef>
+                  <a:spcPts val="0"/>
+                </a:spcBef>
+                <a:spcAft>
+                  <a:spcPts val="0"/>
+                </a:spcAft>
+                <a:defRPr/>
+              </a:pPr>
+              <a:r>
+                <a:rPr lang="en-US" sz="1600" dirty="0">
+                  <a:cs typeface="Arial" panose="020B0604020202020204" pitchFamily="34" charset="0"/>
+                </a:rPr>
+                <a:t>GSvar</a:t>
+              </a:r>
+            </a:p>
+          </p:txBody>
+        </p:sp>
+        <p:sp>
+          <p:nvSpPr>
+            <p:cNvPr id="22" name="Flussdiagramm: Dokument 21">
+              <a:extLst>
+                <a:ext uri="{FF2B5EF4-FFF2-40B4-BE49-F238E27FC236}">
+                  <a16:creationId xmlns:a16="http://schemas.microsoft.com/office/drawing/2014/main" id="{C59025AC-DCBF-4461-B4FC-BEA4FB4639D2}"/>
+                </a:ext>
+              </a:extLst>
+            </p:cNvPr>
+            <p:cNvSpPr/>
+            <p:nvPr/>
+          </p:nvSpPr>
+          <p:spPr>
+            <a:xfrm>
+              <a:off x="1668714" y="2498006"/>
+              <a:ext cx="1081087" cy="792163"/>
+            </a:xfrm>
+            <a:prstGeom prst="flowChartDocument">
+              <a:avLst/>
+            </a:prstGeom>
+          </p:spPr>
+          <p:style>
+            <a:lnRef idx="1">
+              <a:schemeClr val="accent6"/>
+            </a:lnRef>
+            <a:fillRef idx="2">
+              <a:schemeClr val="accent6"/>
+            </a:fillRef>
+            <a:effectRef idx="1">
+              <a:schemeClr val="accent6"/>
+            </a:effectRef>
+            <a:fontRef idx="minor">
+              <a:schemeClr val="dk1"/>
+            </a:fontRef>
+          </p:style>
+          <p:txBody>
+            <a:bodyPr anchor="ctr"/>
+            <a:lstStyle/>
+            <a:p>
+              <a:pPr algn="ctr" eaLnBrk="0" fontAlgn="auto" hangingPunct="0">
+                <a:spcBef>
+                  <a:spcPts val="0"/>
+                </a:spcBef>
+                <a:spcAft>
+                  <a:spcPts val="0"/>
+                </a:spcAft>
+                <a:defRPr/>
+              </a:pPr>
+              <a:r>
+                <a:rPr lang="de-DE" sz="1600" dirty="0">
+                  <a:cs typeface="Arial" panose="020B0604020202020204" pitchFamily="34" charset="0"/>
+                </a:rPr>
+                <a:t>N</a:t>
+              </a:r>
+              <a:r>
+                <a:rPr lang="en-US" sz="1600" dirty="0" err="1">
+                  <a:cs typeface="Arial" panose="020B0604020202020204" pitchFamily="34" charset="0"/>
+                </a:rPr>
+                <a:t>ormal</a:t>
+              </a:r>
+              <a:endParaRPr lang="en-US" sz="1600" dirty="0">
+                <a:cs typeface="Arial" panose="020B0604020202020204" pitchFamily="34" charset="0"/>
+              </a:endParaRPr>
+            </a:p>
+            <a:p>
+              <a:pPr algn="ctr" eaLnBrk="0" fontAlgn="auto" hangingPunct="0">
+                <a:spcBef>
+                  <a:spcPts val="0"/>
+                </a:spcBef>
+                <a:spcAft>
+                  <a:spcPts val="0"/>
+                </a:spcAft>
+                <a:defRPr/>
+              </a:pPr>
+              <a:r>
+                <a:rPr lang="de-DE" sz="1600" dirty="0">
+                  <a:cs typeface="Arial" panose="020B0604020202020204" pitchFamily="34" charset="0"/>
+                </a:rPr>
+                <a:t>B</a:t>
+              </a:r>
+              <a:r>
+                <a:rPr lang="en-US" sz="1600" dirty="0">
+                  <a:cs typeface="Arial" panose="020B0604020202020204" pitchFamily="34" charset="0"/>
+                </a:rPr>
+                <a:t>AM</a:t>
+              </a:r>
+            </a:p>
+          </p:txBody>
+        </p:sp>
+        <p:sp>
+          <p:nvSpPr>
+            <p:cNvPr id="33" name="Flussdiagramm: Prozess 32">
+              <a:extLst>
+                <a:ext uri="{FF2B5EF4-FFF2-40B4-BE49-F238E27FC236}">
+                  <a16:creationId xmlns:a16="http://schemas.microsoft.com/office/drawing/2014/main" id="{749883A7-7FD9-493D-B374-E7712411DF99}"/>
+                </a:ext>
+              </a:extLst>
+            </p:cNvPr>
+            <p:cNvSpPr/>
+            <p:nvPr/>
+          </p:nvSpPr>
+          <p:spPr>
+            <a:xfrm>
+              <a:off x="3492898" y="1567089"/>
+              <a:ext cx="1223962" cy="792163"/>
+            </a:xfrm>
+            <a:prstGeom prst="flowChartProcess">
+              <a:avLst/>
+            </a:prstGeom>
+            <a:ln/>
+          </p:spPr>
+          <p:style>
+            <a:lnRef idx="1">
+              <a:schemeClr val="accent1"/>
+            </a:lnRef>
+            <a:fillRef idx="2">
+              <a:schemeClr val="accent1"/>
+            </a:fillRef>
+            <a:effectRef idx="1">
+              <a:schemeClr val="accent1"/>
+            </a:effectRef>
+            <a:fontRef idx="minor">
+              <a:schemeClr val="dk1"/>
+            </a:fontRef>
+          </p:style>
+          <p:txBody>
+            <a:bodyPr anchor="ctr"/>
+            <a:lstStyle/>
+            <a:p>
+              <a:pPr algn="ctr" eaLnBrk="0" fontAlgn="auto" hangingPunct="0">
+                <a:spcBef>
+                  <a:spcPts val="0"/>
+                </a:spcBef>
+                <a:spcAft>
+                  <a:spcPts val="0"/>
+                </a:spcAft>
+                <a:defRPr/>
+              </a:pPr>
+              <a:r>
+                <a:rPr lang="en-US" sz="1200" dirty="0">
+                  <a:cs typeface="Arial" panose="020B0604020202020204" pitchFamily="34" charset="0"/>
+                </a:rPr>
+                <a:t>variant calling</a:t>
+              </a:r>
+            </a:p>
+            <a:p>
+              <a:pPr algn="ctr" eaLnBrk="0" fontAlgn="auto" hangingPunct="0">
+                <a:spcBef>
+                  <a:spcPts val="0"/>
+                </a:spcBef>
+                <a:spcAft>
+                  <a:spcPts val="0"/>
+                </a:spcAft>
+                <a:defRPr/>
+              </a:pPr>
+              <a:r>
+                <a:rPr lang="en-US" sz="1200" dirty="0">
+                  <a:cs typeface="Arial" panose="020B0604020202020204" pitchFamily="34" charset="0"/>
+                </a:rPr>
+                <a:t>+ annotation</a:t>
+              </a:r>
+            </a:p>
+            <a:p>
+              <a:pPr algn="ctr" eaLnBrk="0" fontAlgn="auto" hangingPunct="0">
+                <a:spcBef>
+                  <a:spcPts val="0"/>
+                </a:spcBef>
+                <a:spcAft>
+                  <a:spcPts val="0"/>
+                </a:spcAft>
+                <a:defRPr/>
+              </a:pPr>
+              <a:r>
+                <a:rPr lang="en-US" sz="1200" dirty="0">
+                  <a:cs typeface="Arial" panose="020B0604020202020204" pitchFamily="34" charset="0"/>
+                </a:rPr>
+                <a:t>(small variants)</a:t>
+              </a:r>
+            </a:p>
+          </p:txBody>
+        </p:sp>
+        <p:sp>
+          <p:nvSpPr>
+            <p:cNvPr id="37" name="Flussdiagramm: Dokument 36">
+              <a:extLst>
+                <a:ext uri="{FF2B5EF4-FFF2-40B4-BE49-F238E27FC236}">
+                  <a16:creationId xmlns:a16="http://schemas.microsoft.com/office/drawing/2014/main" id="{BB305E95-18EA-47C5-8F0A-5285F70FE75F}"/>
+                </a:ext>
+              </a:extLst>
+            </p:cNvPr>
+            <p:cNvSpPr/>
+            <p:nvPr/>
+          </p:nvSpPr>
+          <p:spPr>
+            <a:xfrm>
+              <a:off x="5219104" y="2491116"/>
+              <a:ext cx="1081088" cy="792163"/>
+            </a:xfrm>
+            <a:prstGeom prst="flowChartDocument">
+              <a:avLst/>
+            </a:prstGeom>
+          </p:spPr>
+          <p:style>
+            <a:lnRef idx="1">
+              <a:schemeClr val="accent6"/>
+            </a:lnRef>
+            <a:fillRef idx="2">
+              <a:schemeClr val="accent6"/>
+            </a:fillRef>
+            <a:effectRef idx="1">
+              <a:schemeClr val="accent6"/>
+            </a:effectRef>
+            <a:fontRef idx="minor">
+              <a:schemeClr val="dk1"/>
+            </a:fontRef>
+          </p:style>
+          <p:txBody>
+            <a:bodyPr anchor="ctr"/>
+            <a:lstStyle/>
+            <a:p>
+              <a:pPr algn="ctr" eaLnBrk="0" fontAlgn="auto" hangingPunct="0">
+                <a:spcBef>
+                  <a:spcPts val="0"/>
+                </a:spcBef>
+                <a:spcAft>
+                  <a:spcPts val="0"/>
+                </a:spcAft>
+                <a:defRPr/>
+              </a:pPr>
+              <a:r>
+                <a:rPr lang="en-US" sz="1600" dirty="0">
+                  <a:cs typeface="Arial" panose="020B0604020202020204" pitchFamily="34" charset="0"/>
+                </a:rPr>
+                <a:t>TSV</a:t>
+              </a:r>
+            </a:p>
+          </p:txBody>
+        </p:sp>
+        <p:sp>
+          <p:nvSpPr>
+            <p:cNvPr id="38" name="Flussdiagramm: Prozess 37">
+              <a:extLst>
+                <a:ext uri="{FF2B5EF4-FFF2-40B4-BE49-F238E27FC236}">
+                  <a16:creationId xmlns:a16="http://schemas.microsoft.com/office/drawing/2014/main" id="{B0A1DCC4-DED8-4D19-AADF-B2643F7F0267}"/>
+                </a:ext>
+              </a:extLst>
+            </p:cNvPr>
+            <p:cNvSpPr/>
+            <p:nvPr/>
+          </p:nvSpPr>
+          <p:spPr>
+            <a:xfrm>
+              <a:off x="3492898" y="2498007"/>
+              <a:ext cx="1223962" cy="792163"/>
+            </a:xfrm>
+            <a:prstGeom prst="flowChartProcess">
+              <a:avLst/>
+            </a:prstGeom>
+            <a:ln/>
+          </p:spPr>
+          <p:style>
+            <a:lnRef idx="1">
+              <a:schemeClr val="accent1"/>
+            </a:lnRef>
+            <a:fillRef idx="2">
+              <a:schemeClr val="accent1"/>
+            </a:fillRef>
+            <a:effectRef idx="1">
+              <a:schemeClr val="accent1"/>
+            </a:effectRef>
+            <a:fontRef idx="minor">
+              <a:schemeClr val="dk1"/>
+            </a:fontRef>
+          </p:style>
+          <p:txBody>
+            <a:bodyPr anchor="ctr"/>
+            <a:lstStyle/>
+            <a:p>
+              <a:pPr algn="ctr" eaLnBrk="0" fontAlgn="auto" hangingPunct="0">
+                <a:spcBef>
+                  <a:spcPts val="0"/>
+                </a:spcBef>
+                <a:spcAft>
+                  <a:spcPts val="0"/>
+                </a:spcAft>
+                <a:defRPr/>
+              </a:pPr>
+              <a:r>
+                <a:rPr lang="en-US" sz="1200" dirty="0">
+                  <a:cs typeface="Arial" panose="020B0604020202020204" pitchFamily="34" charset="0"/>
+                </a:rPr>
+                <a:t>variant calling + annotation</a:t>
+              </a:r>
+            </a:p>
+            <a:p>
+              <a:pPr algn="ctr" eaLnBrk="0" fontAlgn="auto" hangingPunct="0">
+                <a:spcBef>
+                  <a:spcPts val="0"/>
+                </a:spcBef>
+                <a:spcAft>
+                  <a:spcPts val="0"/>
+                </a:spcAft>
+                <a:defRPr/>
+              </a:pPr>
+              <a:r>
+                <a:rPr lang="en-US" sz="1200" dirty="0">
+                  <a:cs typeface="Arial" panose="020B0604020202020204" pitchFamily="34" charset="0"/>
+                </a:rPr>
+                <a:t>(CNVs)</a:t>
+              </a:r>
+            </a:p>
+          </p:txBody>
+        </p:sp>
+        <p:sp>
+          <p:nvSpPr>
+            <p:cNvPr id="40" name="Flussdiagramm: Dokument 39">
+              <a:extLst>
+                <a:ext uri="{FF2B5EF4-FFF2-40B4-BE49-F238E27FC236}">
+                  <a16:creationId xmlns:a16="http://schemas.microsoft.com/office/drawing/2014/main" id="{D7B00F67-1421-4DF8-BDB9-2E9A41E9FE34}"/>
+                </a:ext>
+              </a:extLst>
+            </p:cNvPr>
+            <p:cNvSpPr/>
+            <p:nvPr/>
+          </p:nvSpPr>
+          <p:spPr>
+            <a:xfrm>
+              <a:off x="5219104" y="3417093"/>
+              <a:ext cx="1081088" cy="792163"/>
+            </a:xfrm>
+            <a:prstGeom prst="flowChartDocument">
+              <a:avLst/>
+            </a:prstGeom>
+          </p:spPr>
+          <p:style>
+            <a:lnRef idx="1">
+              <a:schemeClr val="accent6"/>
+            </a:lnRef>
+            <a:fillRef idx="2">
+              <a:schemeClr val="accent6"/>
+            </a:fillRef>
+            <a:effectRef idx="1">
+              <a:schemeClr val="accent6"/>
+            </a:effectRef>
+            <a:fontRef idx="minor">
+              <a:schemeClr val="dk1"/>
+            </a:fontRef>
+          </p:style>
+          <p:txBody>
+            <a:bodyPr anchor="ctr"/>
+            <a:lstStyle/>
+            <a:p>
+              <a:pPr algn="ctr" eaLnBrk="0" fontAlgn="auto" hangingPunct="0">
+                <a:spcBef>
+                  <a:spcPts val="0"/>
+                </a:spcBef>
+                <a:spcAft>
+                  <a:spcPts val="0"/>
+                </a:spcAft>
+                <a:defRPr/>
+              </a:pPr>
+              <a:r>
+                <a:rPr lang="en-US" sz="1600" dirty="0">
+                  <a:cs typeface="Arial" panose="020B0604020202020204" pitchFamily="34" charset="0"/>
+                </a:rPr>
+                <a:t>BEDPE</a:t>
+              </a:r>
+            </a:p>
+          </p:txBody>
+        </p:sp>
+        <p:cxnSp>
+          <p:nvCxnSpPr>
+            <p:cNvPr id="43" name="Gerade Verbindung mit Pfeil 14">
+              <a:extLst>
+                <a:ext uri="{FF2B5EF4-FFF2-40B4-BE49-F238E27FC236}">
+                  <a16:creationId xmlns:a16="http://schemas.microsoft.com/office/drawing/2014/main" id="{B12E3641-AD6F-4EAA-80D3-A999BE31CA13}"/>
+                </a:ext>
+              </a:extLst>
+            </p:cNvPr>
+            <p:cNvCxnSpPr>
+              <a:cxnSpLocks/>
+              <a:stCxn id="22" idx="3"/>
+              <a:endCxn id="33" idx="1"/>
+            </p:cNvCxnSpPr>
+            <p:nvPr/>
+          </p:nvCxnSpPr>
+          <p:spPr>
+            <a:xfrm flipV="1">
+              <a:off x="2749801" y="1963171"/>
+              <a:ext cx="743097" cy="930917"/>
+            </a:xfrm>
+            <a:prstGeom prst="straightConnector1">
+              <a:avLst/>
+            </a:prstGeom>
+            <a:ln>
+              <a:tailEnd type="triangle" w="med" len="med"/>
+            </a:ln>
+          </p:spPr>
+          <p:style>
+            <a:lnRef idx="1">
+              <a:schemeClr val="accent1"/>
+            </a:lnRef>
+            <a:fillRef idx="0">
+              <a:schemeClr val="accent1"/>
+            </a:fillRef>
+            <a:effectRef idx="0">
+              <a:schemeClr val="accent1"/>
+            </a:effectRef>
+            <a:fontRef idx="minor">
+              <a:schemeClr val="tx1"/>
+            </a:fontRef>
+          </p:style>
+        </p:cxnSp>
+        <p:cxnSp>
+          <p:nvCxnSpPr>
+            <p:cNvPr id="44" name="Gerade Verbindung mit Pfeil 14">
+              <a:extLst>
+                <a:ext uri="{FF2B5EF4-FFF2-40B4-BE49-F238E27FC236}">
+                  <a16:creationId xmlns:a16="http://schemas.microsoft.com/office/drawing/2014/main" id="{A10CC1CC-60B8-4368-B2DE-A4EC90C758D9}"/>
+                </a:ext>
+              </a:extLst>
+            </p:cNvPr>
+            <p:cNvCxnSpPr>
+              <a:cxnSpLocks/>
+              <a:stCxn id="22" idx="3"/>
+              <a:endCxn id="38" idx="1"/>
+            </p:cNvCxnSpPr>
+            <p:nvPr/>
+          </p:nvCxnSpPr>
+          <p:spPr>
+            <a:xfrm>
+              <a:off x="2749801" y="2894088"/>
+              <a:ext cx="743097" cy="1"/>
+            </a:xfrm>
+            <a:prstGeom prst="straightConnector1">
+              <a:avLst/>
+            </a:prstGeom>
+            <a:ln>
+              <a:tailEnd type="triangle" w="med" len="med"/>
+            </a:ln>
+          </p:spPr>
+          <p:style>
+            <a:lnRef idx="1">
+              <a:schemeClr val="accent1"/>
+            </a:lnRef>
+            <a:fillRef idx="0">
+              <a:schemeClr val="accent1"/>
+            </a:fillRef>
+            <a:effectRef idx="0">
+              <a:schemeClr val="accent1"/>
+            </a:effectRef>
+            <a:fontRef idx="minor">
+              <a:schemeClr val="tx1"/>
+            </a:fontRef>
+          </p:style>
+        </p:cxnSp>
+        <p:cxnSp>
+          <p:nvCxnSpPr>
+            <p:cNvPr id="45" name="Gerade Verbindung mit Pfeil 14">
+              <a:extLst>
+                <a:ext uri="{FF2B5EF4-FFF2-40B4-BE49-F238E27FC236}">
+                  <a16:creationId xmlns:a16="http://schemas.microsoft.com/office/drawing/2014/main" id="{56F06D07-975F-4FDC-8980-442FA8ECA139}"/>
+                </a:ext>
+              </a:extLst>
+            </p:cNvPr>
+            <p:cNvCxnSpPr>
+              <a:cxnSpLocks/>
+              <a:stCxn id="22" idx="3"/>
+              <a:endCxn id="48" idx="1"/>
+            </p:cNvCxnSpPr>
+            <p:nvPr/>
+          </p:nvCxnSpPr>
+          <p:spPr>
+            <a:xfrm>
+              <a:off x="2749801" y="2894088"/>
+              <a:ext cx="745751" cy="930919"/>
+            </a:xfrm>
+            <a:prstGeom prst="straightConnector1">
+              <a:avLst/>
+            </a:prstGeom>
+            <a:ln>
+              <a:tailEnd type="triangle" w="med" len="med"/>
+            </a:ln>
+          </p:spPr>
+          <p:style>
+            <a:lnRef idx="1">
+              <a:schemeClr val="accent1"/>
+            </a:lnRef>
+            <a:fillRef idx="0">
+              <a:schemeClr val="accent1"/>
+            </a:fillRef>
+            <a:effectRef idx="0">
+              <a:schemeClr val="accent1"/>
+            </a:effectRef>
+            <a:fontRef idx="minor">
+              <a:schemeClr val="tx1"/>
+            </a:fontRef>
+          </p:style>
+        </p:cxnSp>
+        <p:sp>
+          <p:nvSpPr>
+            <p:cNvPr id="48" name="Flussdiagramm: Prozess 47">
+              <a:extLst>
+                <a:ext uri="{FF2B5EF4-FFF2-40B4-BE49-F238E27FC236}">
+                  <a16:creationId xmlns:a16="http://schemas.microsoft.com/office/drawing/2014/main" id="{708977C8-A61E-4334-BE41-CD7398D64F2C}"/>
+                </a:ext>
+              </a:extLst>
+            </p:cNvPr>
+            <p:cNvSpPr/>
+            <p:nvPr/>
+          </p:nvSpPr>
+          <p:spPr>
+            <a:xfrm>
+              <a:off x="3495552" y="3428925"/>
+              <a:ext cx="1223962" cy="792163"/>
+            </a:xfrm>
+            <a:prstGeom prst="flowChartProcess">
+              <a:avLst/>
+            </a:prstGeom>
+            <a:ln/>
+          </p:spPr>
+          <p:style>
+            <a:lnRef idx="1">
+              <a:schemeClr val="accent1"/>
+            </a:lnRef>
+            <a:fillRef idx="2">
+              <a:schemeClr val="accent1"/>
+            </a:fillRef>
+            <a:effectRef idx="1">
+              <a:schemeClr val="accent1"/>
+            </a:effectRef>
+            <a:fontRef idx="minor">
+              <a:schemeClr val="dk1"/>
+            </a:fontRef>
+          </p:style>
+          <p:txBody>
+            <a:bodyPr anchor="ctr"/>
+            <a:lstStyle/>
+            <a:p>
+              <a:pPr algn="ctr" eaLnBrk="0" fontAlgn="auto" hangingPunct="0">
+                <a:spcBef>
+                  <a:spcPts val="0"/>
+                </a:spcBef>
+                <a:spcAft>
+                  <a:spcPts val="0"/>
+                </a:spcAft>
+                <a:defRPr/>
+              </a:pPr>
+              <a:r>
+                <a:rPr lang="en-US" sz="1200" dirty="0">
+                  <a:cs typeface="Arial" panose="020B0604020202020204" pitchFamily="34" charset="0"/>
+                </a:rPr>
+                <a:t>variant calling + annotation</a:t>
+              </a:r>
+            </a:p>
+            <a:p>
+              <a:pPr algn="ctr" eaLnBrk="0" fontAlgn="auto" hangingPunct="0">
+                <a:spcBef>
+                  <a:spcPts val="0"/>
+                </a:spcBef>
+                <a:spcAft>
+                  <a:spcPts val="0"/>
+                </a:spcAft>
+                <a:defRPr/>
+              </a:pPr>
+              <a:r>
+                <a:rPr lang="en-US" sz="1200" dirty="0">
+                  <a:cs typeface="Arial" panose="020B0604020202020204" pitchFamily="34" charset="0"/>
+                </a:rPr>
+                <a:t>(SVs)</a:t>
+              </a:r>
+            </a:p>
+          </p:txBody>
+        </p:sp>
+        <p:cxnSp>
+          <p:nvCxnSpPr>
+            <p:cNvPr id="55" name="Gerade Verbindung mit Pfeil 14">
+              <a:extLst>
+                <a:ext uri="{FF2B5EF4-FFF2-40B4-BE49-F238E27FC236}">
+                  <a16:creationId xmlns:a16="http://schemas.microsoft.com/office/drawing/2014/main" id="{D6E1A31B-6E3D-455A-9820-BF78DE7C1765}"/>
+                </a:ext>
+              </a:extLst>
+            </p:cNvPr>
+            <p:cNvCxnSpPr>
+              <a:cxnSpLocks/>
+              <a:stCxn id="33" idx="3"/>
+              <a:endCxn id="20" idx="1"/>
+            </p:cNvCxnSpPr>
+            <p:nvPr/>
+          </p:nvCxnSpPr>
+          <p:spPr>
+            <a:xfrm flipV="1">
+              <a:off x="4716860" y="1963170"/>
+              <a:ext cx="502244" cy="1"/>
+            </a:xfrm>
+            <a:prstGeom prst="straightConnector1">
+              <a:avLst/>
+            </a:prstGeom>
+            <a:ln>
+              <a:tailEnd type="triangle" w="med" len="med"/>
+            </a:ln>
+          </p:spPr>
+          <p:style>
+            <a:lnRef idx="1">
+              <a:schemeClr val="accent1"/>
+            </a:lnRef>
+            <a:fillRef idx="0">
+              <a:schemeClr val="accent1"/>
+            </a:fillRef>
+            <a:effectRef idx="0">
+              <a:schemeClr val="accent1"/>
+            </a:effectRef>
+            <a:fontRef idx="minor">
+              <a:schemeClr val="tx1"/>
+            </a:fontRef>
+          </p:style>
+        </p:cxnSp>
+        <p:cxnSp>
+          <p:nvCxnSpPr>
+            <p:cNvPr id="59" name="Gerade Verbindung mit Pfeil 14">
+              <a:extLst>
+                <a:ext uri="{FF2B5EF4-FFF2-40B4-BE49-F238E27FC236}">
+                  <a16:creationId xmlns:a16="http://schemas.microsoft.com/office/drawing/2014/main" id="{BEC96846-0FB0-492F-9070-988A6073AC62}"/>
+                </a:ext>
+              </a:extLst>
+            </p:cNvPr>
+            <p:cNvCxnSpPr>
+              <a:cxnSpLocks/>
+              <a:stCxn id="38" idx="3"/>
+              <a:endCxn id="37" idx="1"/>
+            </p:cNvCxnSpPr>
+            <p:nvPr/>
+          </p:nvCxnSpPr>
+          <p:spPr>
+            <a:xfrm flipV="1">
+              <a:off x="4716860" y="2887198"/>
+              <a:ext cx="502244" cy="6891"/>
+            </a:xfrm>
+            <a:prstGeom prst="straightConnector1">
+              <a:avLst/>
+            </a:prstGeom>
+            <a:ln>
+              <a:tailEnd type="triangle" w="med" len="med"/>
+            </a:ln>
+          </p:spPr>
+          <p:style>
+            <a:lnRef idx="1">
+              <a:schemeClr val="accent1"/>
+            </a:lnRef>
+            <a:fillRef idx="0">
+              <a:schemeClr val="accent1"/>
+            </a:fillRef>
+            <a:effectRef idx="0">
+              <a:schemeClr val="accent1"/>
+            </a:effectRef>
+            <a:fontRef idx="minor">
+              <a:schemeClr val="tx1"/>
+            </a:fontRef>
+          </p:style>
+        </p:cxnSp>
+        <p:cxnSp>
+          <p:nvCxnSpPr>
+            <p:cNvPr id="64" name="Gerade Verbindung mit Pfeil 14">
+              <a:extLst>
+                <a:ext uri="{FF2B5EF4-FFF2-40B4-BE49-F238E27FC236}">
+                  <a16:creationId xmlns:a16="http://schemas.microsoft.com/office/drawing/2014/main" id="{E6682C72-2B1F-4781-9D26-E684DD9AE1FB}"/>
+                </a:ext>
+              </a:extLst>
+            </p:cNvPr>
+            <p:cNvCxnSpPr>
+              <a:cxnSpLocks/>
+              <a:stCxn id="48" idx="3"/>
+              <a:endCxn id="40" idx="1"/>
+            </p:cNvCxnSpPr>
+            <p:nvPr/>
+          </p:nvCxnSpPr>
+          <p:spPr>
+            <a:xfrm flipV="1">
+              <a:off x="4719514" y="3813175"/>
+              <a:ext cx="499590" cy="11832"/>
+            </a:xfrm>
+            <a:prstGeom prst="straightConnector1">
+              <a:avLst/>
+            </a:prstGeom>
+            <a:ln>
+              <a:tailEnd type="triangle" w="med" len="med"/>
+            </a:ln>
+          </p:spPr>
+          <p:style>
+            <a:lnRef idx="1">
+              <a:schemeClr val="accent1"/>
+            </a:lnRef>
+            <a:fillRef idx="0">
+              <a:schemeClr val="accent1"/>
+            </a:fillRef>
+            <a:effectRef idx="0">
+              <a:schemeClr val="accent1"/>
+            </a:effectRef>
+            <a:fontRef idx="minor">
+              <a:schemeClr val="tx1"/>
+            </a:fontRef>
+          </p:style>
+        </p:cxnSp>
+        <p:sp>
+          <p:nvSpPr>
+            <p:cNvPr id="29" name="Flussdiagramm: Dokument 28">
+              <a:extLst>
+                <a:ext uri="{FF2B5EF4-FFF2-40B4-BE49-F238E27FC236}">
+                  <a16:creationId xmlns:a16="http://schemas.microsoft.com/office/drawing/2014/main" id="{347BA2A7-346E-45AB-B447-44C458E39776}"/>
+                </a:ext>
+              </a:extLst>
+            </p:cNvPr>
+            <p:cNvSpPr/>
+            <p:nvPr/>
+          </p:nvSpPr>
+          <p:spPr>
+            <a:xfrm>
+              <a:off x="1674417" y="3428925"/>
+              <a:ext cx="1081087" cy="792163"/>
+            </a:xfrm>
+            <a:prstGeom prst="flowChartDocument">
+              <a:avLst/>
+            </a:prstGeom>
+          </p:spPr>
+          <p:style>
+            <a:lnRef idx="1">
+              <a:schemeClr val="accent6"/>
+            </a:lnRef>
+            <a:fillRef idx="2">
+              <a:schemeClr val="accent6"/>
+            </a:fillRef>
+            <a:effectRef idx="1">
+              <a:schemeClr val="accent6"/>
+            </a:effectRef>
+            <a:fontRef idx="minor">
+              <a:schemeClr val="dk1"/>
+            </a:fontRef>
+          </p:style>
+          <p:txBody>
+            <a:bodyPr anchor="ctr"/>
+            <a:lstStyle/>
+            <a:p>
+              <a:pPr algn="ctr" eaLnBrk="0" fontAlgn="auto" hangingPunct="0">
+                <a:spcBef>
+                  <a:spcPts val="0"/>
+                </a:spcBef>
+                <a:spcAft>
+                  <a:spcPts val="0"/>
+                </a:spcAft>
+                <a:defRPr/>
+              </a:pPr>
+              <a:r>
+                <a:rPr lang="de-DE" sz="1600" dirty="0">
+                  <a:cs typeface="Arial" panose="020B0604020202020204" pitchFamily="34" charset="0"/>
+                </a:rPr>
+                <a:t>Tumor</a:t>
+              </a:r>
+              <a:endParaRPr lang="en-US" sz="1600" dirty="0">
+                <a:cs typeface="Arial" panose="020B0604020202020204" pitchFamily="34" charset="0"/>
+              </a:endParaRPr>
+            </a:p>
+            <a:p>
+              <a:pPr algn="ctr" eaLnBrk="0" fontAlgn="auto" hangingPunct="0">
+                <a:spcBef>
+                  <a:spcPts val="0"/>
+                </a:spcBef>
+                <a:spcAft>
+                  <a:spcPts val="0"/>
+                </a:spcAft>
+                <a:defRPr/>
+              </a:pPr>
+              <a:r>
+                <a:rPr lang="en-US" sz="1600" dirty="0">
+                  <a:cs typeface="Arial" panose="020B0604020202020204" pitchFamily="34" charset="0"/>
+                </a:rPr>
+                <a:t>BAM</a:t>
+              </a:r>
+            </a:p>
+          </p:txBody>
+        </p:sp>
+        <p:cxnSp>
+          <p:nvCxnSpPr>
+            <p:cNvPr id="30" name="Gerade Verbindung mit Pfeil 14">
+              <a:extLst>
+                <a:ext uri="{FF2B5EF4-FFF2-40B4-BE49-F238E27FC236}">
+                  <a16:creationId xmlns:a16="http://schemas.microsoft.com/office/drawing/2014/main" id="{17D2936E-0F1A-4A52-8BBF-FDA8B0DECC82}"/>
+                </a:ext>
+              </a:extLst>
+            </p:cNvPr>
+            <p:cNvCxnSpPr>
+              <a:cxnSpLocks/>
+              <a:stCxn id="29" idx="3"/>
+              <a:endCxn id="33" idx="1"/>
+            </p:cNvCxnSpPr>
+            <p:nvPr/>
+          </p:nvCxnSpPr>
+          <p:spPr>
+            <a:xfrm flipV="1">
+              <a:off x="2755504" y="1963171"/>
+              <a:ext cx="737394" cy="1861836"/>
+            </a:xfrm>
+            <a:prstGeom prst="straightConnector1">
+              <a:avLst/>
+            </a:prstGeom>
+            <a:ln>
+              <a:tailEnd type="triangle" w="med" len="med"/>
+            </a:ln>
+          </p:spPr>
+          <p:style>
+            <a:lnRef idx="1">
+              <a:schemeClr val="accent1"/>
+            </a:lnRef>
+            <a:fillRef idx="0">
+              <a:schemeClr val="accent1"/>
+            </a:fillRef>
+            <a:effectRef idx="0">
+              <a:schemeClr val="accent1"/>
+            </a:effectRef>
+            <a:fontRef idx="minor">
+              <a:schemeClr val="tx1"/>
+            </a:fontRef>
+          </p:style>
+        </p:cxnSp>
+        <p:cxnSp>
+          <p:nvCxnSpPr>
+            <p:cNvPr id="31" name="Gerade Verbindung mit Pfeil 14">
+              <a:extLst>
+                <a:ext uri="{FF2B5EF4-FFF2-40B4-BE49-F238E27FC236}">
+                  <a16:creationId xmlns:a16="http://schemas.microsoft.com/office/drawing/2014/main" id="{B7B5BCBA-82AF-4981-9DAC-536B0805A0B0}"/>
+                </a:ext>
+              </a:extLst>
+            </p:cNvPr>
+            <p:cNvCxnSpPr>
+              <a:cxnSpLocks/>
+              <a:stCxn id="29" idx="3"/>
+              <a:endCxn id="38" idx="1"/>
+            </p:cNvCxnSpPr>
+            <p:nvPr/>
+          </p:nvCxnSpPr>
+          <p:spPr>
+            <a:xfrm flipV="1">
+              <a:off x="2755504" y="2894089"/>
+              <a:ext cx="737394" cy="930918"/>
+            </a:xfrm>
+            <a:prstGeom prst="straightConnector1">
+              <a:avLst/>
+            </a:prstGeom>
+            <a:ln>
+              <a:tailEnd type="triangle" w="med" len="med"/>
+            </a:ln>
+          </p:spPr>
+          <p:style>
+            <a:lnRef idx="1">
+              <a:schemeClr val="accent1"/>
+            </a:lnRef>
+            <a:fillRef idx="0">
+              <a:schemeClr val="accent1"/>
+            </a:fillRef>
+            <a:effectRef idx="0">
+              <a:schemeClr val="accent1"/>
+            </a:effectRef>
+            <a:fontRef idx="minor">
+              <a:schemeClr val="tx1"/>
+            </a:fontRef>
+          </p:style>
+        </p:cxnSp>
+        <p:cxnSp>
+          <p:nvCxnSpPr>
+            <p:cNvPr id="32" name="Gerade Verbindung mit Pfeil 14">
+              <a:extLst>
+                <a:ext uri="{FF2B5EF4-FFF2-40B4-BE49-F238E27FC236}">
+                  <a16:creationId xmlns:a16="http://schemas.microsoft.com/office/drawing/2014/main" id="{1B6E3F16-DAB2-4EA8-9670-35284D8FE661}"/>
+                </a:ext>
+              </a:extLst>
+            </p:cNvPr>
+            <p:cNvCxnSpPr>
+              <a:cxnSpLocks/>
+              <a:stCxn id="29" idx="3"/>
+              <a:endCxn id="48" idx="1"/>
+            </p:cNvCxnSpPr>
+            <p:nvPr/>
+          </p:nvCxnSpPr>
+          <p:spPr>
+            <a:xfrm>
+              <a:off x="2755504" y="3825007"/>
+              <a:ext cx="740048" cy="0"/>
+            </a:xfrm>
+            <a:prstGeom prst="straightConnector1">
+              <a:avLst/>
+            </a:prstGeom>
+            <a:ln>
+              <a:tailEnd type="triangle" w="med" len="med"/>
+            </a:ln>
+          </p:spPr>
+          <p:style>
+            <a:lnRef idx="1">
+              <a:schemeClr val="accent1"/>
+            </a:lnRef>
+            <a:fillRef idx="0">
+              <a:schemeClr val="accent1"/>
+            </a:fillRef>
+            <a:effectRef idx="0">
+              <a:schemeClr val="accent1"/>
+            </a:effectRef>
+            <a:fontRef idx="minor">
+              <a:schemeClr val="tx1"/>
+            </a:fontRef>
+          </p:style>
+        </p:cxnSp>
+        <p:sp>
+          <p:nvSpPr>
+            <p:cNvPr id="21" name="Flussdiagramm: Dokument 21">
+              <a:extLst>
+                <a:ext uri="{FF2B5EF4-FFF2-40B4-BE49-F238E27FC236}">
+                  <a16:creationId xmlns:a16="http://schemas.microsoft.com/office/drawing/2014/main" id="{90D11C34-1196-40BB-9282-39A5DE0AAA45}"/>
+                </a:ext>
+              </a:extLst>
+            </p:cNvPr>
+            <p:cNvSpPr/>
+            <p:nvPr/>
+          </p:nvSpPr>
+          <p:spPr>
+            <a:xfrm>
+              <a:off x="1666060" y="1567089"/>
+              <a:ext cx="1081087" cy="792163"/>
+            </a:xfrm>
+            <a:prstGeom prst="flowChartDocument">
+              <a:avLst/>
+            </a:prstGeom>
+          </p:spPr>
+          <p:style>
+            <a:lnRef idx="1">
+              <a:schemeClr val="accent6"/>
+            </a:lnRef>
+            <a:fillRef idx="2">
+              <a:schemeClr val="accent6"/>
+            </a:fillRef>
+            <a:effectRef idx="1">
+              <a:schemeClr val="accent6"/>
+            </a:effectRef>
+            <a:fontRef idx="minor">
+              <a:schemeClr val="dk1"/>
+            </a:fontRef>
+          </p:style>
+          <p:txBody>
+            <a:bodyPr anchor="ctr"/>
+            <a:lstStyle/>
+            <a:p>
+              <a:pPr algn="ctr" eaLnBrk="0" fontAlgn="auto" hangingPunct="0">
+                <a:spcBef>
+                  <a:spcPts val="0"/>
+                </a:spcBef>
+                <a:spcAft>
+                  <a:spcPts val="0"/>
+                </a:spcAft>
+                <a:defRPr/>
+              </a:pPr>
+              <a:r>
+                <a:rPr lang="de-DE" sz="1600" dirty="0">
+                  <a:cs typeface="Arial" panose="020B0604020202020204" pitchFamily="34" charset="0"/>
+                </a:rPr>
+                <a:t>RNA</a:t>
+              </a:r>
+              <a:endParaRPr lang="en-US" sz="1600" dirty="0">
+                <a:cs typeface="Arial" panose="020B0604020202020204" pitchFamily="34" charset="0"/>
+              </a:endParaRPr>
+            </a:p>
+            <a:p>
+              <a:pPr algn="ctr" eaLnBrk="0" fontAlgn="auto" hangingPunct="0">
+                <a:spcBef>
+                  <a:spcPts val="0"/>
+                </a:spcBef>
+                <a:spcAft>
+                  <a:spcPts val="0"/>
+                </a:spcAft>
+                <a:defRPr/>
+              </a:pPr>
+              <a:r>
+                <a:rPr lang="de-DE" sz="1600" dirty="0">
+                  <a:cs typeface="Arial" panose="020B0604020202020204" pitchFamily="34" charset="0"/>
+                </a:rPr>
+                <a:t>B</a:t>
+              </a:r>
+              <a:r>
+                <a:rPr lang="en-US" sz="1600" dirty="0">
+                  <a:cs typeface="Arial" panose="020B0604020202020204" pitchFamily="34" charset="0"/>
+                </a:rPr>
+                <a:t>AM</a:t>
+              </a:r>
+            </a:p>
+          </p:txBody>
+        </p:sp>
+        <p:sp>
+          <p:nvSpPr>
+            <p:cNvPr id="24" name="Sprechblase: rechteckig 21">
+              <a:extLst>
+                <a:ext uri="{FF2B5EF4-FFF2-40B4-BE49-F238E27FC236}">
+                  <a16:creationId xmlns:a16="http://schemas.microsoft.com/office/drawing/2014/main" id="{A3F6DFD5-A8BB-41CC-8535-6A2BAB1C222E}"/>
+                </a:ext>
+              </a:extLst>
+            </p:cNvPr>
+            <p:cNvSpPr/>
+            <p:nvPr/>
+          </p:nvSpPr>
+          <p:spPr>
+            <a:xfrm>
+              <a:off x="587016" y="1567088"/>
+              <a:ext cx="902179" cy="568054"/>
+            </a:xfrm>
+            <a:prstGeom prst="wedgeRectCallout">
+              <a:avLst>
+                <a:gd name="adj1" fmla="val 89669"/>
+                <a:gd name="adj2" fmla="val -20256"/>
+              </a:avLst>
+            </a:prstGeom>
+          </p:spPr>
+          <p:style>
+            <a:lnRef idx="0">
+              <a:schemeClr val="accent3"/>
+            </a:lnRef>
+            <a:fillRef idx="3">
+              <a:schemeClr val="accent3"/>
+            </a:fillRef>
+            <a:effectRef idx="3">
+              <a:schemeClr val="accent3"/>
+            </a:effectRef>
+            <a:fontRef idx="minor">
+              <a:schemeClr val="lt1"/>
+            </a:fontRef>
+          </p:style>
+          <p:txBody>
+            <a:bodyPr rtlCol="0" anchor="ctr"/>
+            <a:lstStyle/>
+            <a:p>
+              <a:pPr algn="ctr"/>
+              <a:r>
+                <a:rPr lang="en-US" sz="1050" dirty="0">
+                  <a:solidFill>
+                    <a:schemeClr val="tx1"/>
+                  </a:solidFill>
+                </a:rPr>
+                <a:t>If available</a:t>
+              </a:r>
+            </a:p>
+          </p:txBody>
+        </p:sp>
+        <p:sp>
+          <p:nvSpPr>
+            <p:cNvPr id="25" name="Sprechblase: rechteckig 21">
+              <a:extLst>
+                <a:ext uri="{FF2B5EF4-FFF2-40B4-BE49-F238E27FC236}">
+                  <a16:creationId xmlns:a16="http://schemas.microsoft.com/office/drawing/2014/main" id="{17795308-482E-437C-BFB2-9567AC817A6F}"/>
+                </a:ext>
+              </a:extLst>
+            </p:cNvPr>
+            <p:cNvSpPr/>
+            <p:nvPr/>
+          </p:nvSpPr>
+          <p:spPr>
+            <a:xfrm>
+              <a:off x="587017" y="2498006"/>
+              <a:ext cx="902179" cy="568054"/>
+            </a:xfrm>
+            <a:prstGeom prst="wedgeRectCallout">
+              <a:avLst>
+                <a:gd name="adj1" fmla="val 89669"/>
+                <a:gd name="adj2" fmla="val -20256"/>
+              </a:avLst>
+            </a:prstGeom>
+          </p:spPr>
+          <p:style>
+            <a:lnRef idx="0">
+              <a:schemeClr val="accent3"/>
+            </a:lnRef>
+            <a:fillRef idx="3">
+              <a:schemeClr val="accent3"/>
+            </a:fillRef>
+            <a:effectRef idx="3">
+              <a:schemeClr val="accent3"/>
+            </a:effectRef>
+            <a:fontRef idx="minor">
+              <a:schemeClr val="lt1"/>
+            </a:fontRef>
+          </p:style>
+          <p:txBody>
+            <a:bodyPr rtlCol="0" anchor="ctr"/>
+            <a:lstStyle/>
+            <a:p>
+              <a:pPr algn="ctr"/>
+              <a:r>
+                <a:rPr lang="en-US" sz="1050" dirty="0">
+                  <a:solidFill>
+                    <a:schemeClr val="tx1"/>
+                  </a:solidFill>
+                </a:rPr>
+                <a:t>If available</a:t>
+              </a:r>
+            </a:p>
+          </p:txBody>
+        </p:sp>
+        <p:cxnSp>
+          <p:nvCxnSpPr>
+            <p:cNvPr id="26" name="Gerade Verbindung mit Pfeil 14">
+              <a:extLst>
+                <a:ext uri="{FF2B5EF4-FFF2-40B4-BE49-F238E27FC236}">
+                  <a16:creationId xmlns:a16="http://schemas.microsoft.com/office/drawing/2014/main" id="{03C8339F-F1FF-41C8-BF27-0E0265F93649}"/>
+                </a:ext>
+              </a:extLst>
+            </p:cNvPr>
+            <p:cNvCxnSpPr>
+              <a:cxnSpLocks/>
+              <a:stCxn id="21" idx="3"/>
+              <a:endCxn id="33" idx="1"/>
+            </p:cNvCxnSpPr>
+            <p:nvPr/>
+          </p:nvCxnSpPr>
+          <p:spPr>
+            <a:xfrm>
+              <a:off x="2747147" y="1963171"/>
+              <a:ext cx="745751" cy="0"/>
+            </a:xfrm>
+            <a:prstGeom prst="straightConnector1">
+              <a:avLst/>
+            </a:prstGeom>
+            <a:ln>
+              <a:tailEnd type="triangle" w="med" len="med"/>
+            </a:ln>
+          </p:spPr>
+          <p:style>
+            <a:lnRef idx="1">
+              <a:schemeClr val="accent1"/>
+            </a:lnRef>
+            <a:fillRef idx="0">
+              <a:schemeClr val="accent1"/>
+            </a:fillRef>
+            <a:effectRef idx="0">
+              <a:schemeClr val="accent1"/>
+            </a:effectRef>
+            <a:fontRef idx="minor">
+              <a:schemeClr val="tx1"/>
+            </a:fontRef>
+          </p:style>
+        </p:cxnSp>
+        <p:sp>
+          <p:nvSpPr>
+            <p:cNvPr id="39" name="Flussdiagramm: Prozess 47">
+              <a:extLst>
+                <a:ext uri="{FF2B5EF4-FFF2-40B4-BE49-F238E27FC236}">
+                  <a16:creationId xmlns:a16="http://schemas.microsoft.com/office/drawing/2014/main" id="{1020137D-2943-48D5-9C32-EA7F5FDF3C3E}"/>
+                </a:ext>
+              </a:extLst>
+            </p:cNvPr>
+            <p:cNvSpPr/>
+            <p:nvPr/>
+          </p:nvSpPr>
+          <p:spPr>
+            <a:xfrm>
+              <a:off x="3482976" y="4358539"/>
+              <a:ext cx="1223962" cy="792163"/>
+            </a:xfrm>
+            <a:prstGeom prst="flowChartProcess">
+              <a:avLst/>
+            </a:prstGeom>
+            <a:ln/>
+          </p:spPr>
+          <p:style>
+            <a:lnRef idx="1">
+              <a:schemeClr val="accent1"/>
+            </a:lnRef>
+            <a:fillRef idx="2">
+              <a:schemeClr val="accent1"/>
+            </a:fillRef>
+            <a:effectRef idx="1">
+              <a:schemeClr val="accent1"/>
+            </a:effectRef>
+            <a:fontRef idx="minor">
+              <a:schemeClr val="dk1"/>
+            </a:fontRef>
+          </p:style>
+          <p:txBody>
+            <a:bodyPr anchor="ctr"/>
+            <a:lstStyle/>
+            <a:p>
+              <a:pPr algn="ctr" eaLnBrk="0" fontAlgn="auto" hangingPunct="0">
+                <a:spcBef>
+                  <a:spcPts val="0"/>
+                </a:spcBef>
+                <a:spcAft>
+                  <a:spcPts val="0"/>
+                </a:spcAft>
+                <a:defRPr/>
+              </a:pPr>
+              <a:r>
+                <a:rPr lang="de-DE" sz="1200" dirty="0">
+                  <a:cs typeface="Arial" panose="020B0604020202020204" pitchFamily="34" charset="0"/>
+                </a:rPr>
+                <a:t>Virus </a:t>
+              </a:r>
+              <a:r>
+                <a:rPr lang="de-DE" sz="1200" dirty="0" err="1">
+                  <a:cs typeface="Arial" panose="020B0604020202020204" pitchFamily="34" charset="0"/>
+                </a:rPr>
+                <a:t>detection</a:t>
+              </a:r>
+              <a:endParaRPr lang="en-US" sz="1200" dirty="0">
+                <a:cs typeface="Arial" panose="020B0604020202020204" pitchFamily="34" charset="0"/>
+              </a:endParaRPr>
+            </a:p>
+          </p:txBody>
+        </p:sp>
+        <p:cxnSp>
+          <p:nvCxnSpPr>
+            <p:cNvPr id="41" name="Gerade Verbindung mit Pfeil 14">
+              <a:extLst>
+                <a:ext uri="{FF2B5EF4-FFF2-40B4-BE49-F238E27FC236}">
+                  <a16:creationId xmlns:a16="http://schemas.microsoft.com/office/drawing/2014/main" id="{61BEDED7-8EEB-4147-8E74-A1C7B4F97403}"/>
+                </a:ext>
+              </a:extLst>
+            </p:cNvPr>
+            <p:cNvCxnSpPr>
+              <a:cxnSpLocks/>
+              <a:stCxn id="39" idx="3"/>
+              <a:endCxn id="46" idx="1"/>
+            </p:cNvCxnSpPr>
+            <p:nvPr/>
+          </p:nvCxnSpPr>
+          <p:spPr>
+            <a:xfrm flipV="1">
+              <a:off x="4706938" y="4742788"/>
+              <a:ext cx="512166" cy="11833"/>
+            </a:xfrm>
+            <a:prstGeom prst="straightConnector1">
+              <a:avLst/>
+            </a:prstGeom>
+            <a:ln>
+              <a:tailEnd type="triangle" w="med" len="med"/>
+            </a:ln>
+          </p:spPr>
+          <p:style>
+            <a:lnRef idx="1">
+              <a:schemeClr val="accent1"/>
+            </a:lnRef>
+            <a:fillRef idx="0">
+              <a:schemeClr val="accent1"/>
+            </a:fillRef>
+            <a:effectRef idx="0">
+              <a:schemeClr val="accent1"/>
+            </a:effectRef>
+            <a:fontRef idx="minor">
+              <a:schemeClr val="tx1"/>
+            </a:fontRef>
+          </p:style>
+        </p:cxnSp>
+        <p:sp>
+          <p:nvSpPr>
+            <p:cNvPr id="42" name="Flussdiagramm: Prozess 47">
+              <a:extLst>
+                <a:ext uri="{FF2B5EF4-FFF2-40B4-BE49-F238E27FC236}">
+                  <a16:creationId xmlns:a16="http://schemas.microsoft.com/office/drawing/2014/main" id="{542A6D09-B5C4-4DE6-AB19-7AB3C4B651F4}"/>
+                </a:ext>
+              </a:extLst>
+            </p:cNvPr>
+            <p:cNvSpPr/>
+            <p:nvPr/>
+          </p:nvSpPr>
+          <p:spPr>
+            <a:xfrm>
+              <a:off x="3480322" y="5277624"/>
+              <a:ext cx="1223962" cy="792163"/>
+            </a:xfrm>
+            <a:prstGeom prst="flowChartProcess">
+              <a:avLst/>
+            </a:prstGeom>
+            <a:ln/>
+          </p:spPr>
+          <p:style>
+            <a:lnRef idx="1">
+              <a:schemeClr val="accent1"/>
+            </a:lnRef>
+            <a:fillRef idx="2">
+              <a:schemeClr val="accent1"/>
+            </a:fillRef>
+            <a:effectRef idx="1">
+              <a:schemeClr val="accent1"/>
+            </a:effectRef>
+            <a:fontRef idx="minor">
+              <a:schemeClr val="dk1"/>
+            </a:fontRef>
+          </p:style>
+          <p:txBody>
+            <a:bodyPr anchor="ctr"/>
+            <a:lstStyle/>
+            <a:p>
+              <a:pPr algn="ctr" eaLnBrk="0" fontAlgn="auto" hangingPunct="0">
+                <a:spcBef>
+                  <a:spcPts val="0"/>
+                </a:spcBef>
+                <a:spcAft>
+                  <a:spcPts val="0"/>
+                </a:spcAft>
+                <a:defRPr/>
+              </a:pPr>
+              <a:r>
+                <a:rPr lang="de-DE" sz="1200" dirty="0" err="1">
+                  <a:cs typeface="Arial" panose="020B0604020202020204" pitchFamily="34" charset="0"/>
+                </a:rPr>
+                <a:t>Microsatellite</a:t>
+              </a:r>
+              <a:r>
+                <a:rPr lang="de-DE" sz="1200" dirty="0">
+                  <a:cs typeface="Arial" panose="020B0604020202020204" pitchFamily="34" charset="0"/>
+                </a:rPr>
+                <a:t> </a:t>
+              </a:r>
+              <a:r>
+                <a:rPr lang="de-DE" sz="1200" dirty="0" err="1">
+                  <a:cs typeface="Arial" panose="020B0604020202020204" pitchFamily="34" charset="0"/>
+                </a:rPr>
+                <a:t>analysis</a:t>
+              </a:r>
+              <a:endParaRPr lang="en-US" sz="1200" dirty="0">
+                <a:cs typeface="Arial" panose="020B0604020202020204" pitchFamily="34" charset="0"/>
+              </a:endParaRPr>
+            </a:p>
+          </p:txBody>
+        </p:sp>
+        <p:sp>
+          <p:nvSpPr>
+            <p:cNvPr id="46" name="Flussdiagramm: Dokument 36">
+              <a:extLst>
+                <a:ext uri="{FF2B5EF4-FFF2-40B4-BE49-F238E27FC236}">
+                  <a16:creationId xmlns:a16="http://schemas.microsoft.com/office/drawing/2014/main" id="{0A798BAB-9E96-48DB-AD4F-49BC171073BF}"/>
+                </a:ext>
+              </a:extLst>
+            </p:cNvPr>
+            <p:cNvSpPr/>
+            <p:nvPr/>
+          </p:nvSpPr>
+          <p:spPr>
+            <a:xfrm>
+              <a:off x="5219104" y="4346706"/>
+              <a:ext cx="1081088" cy="792163"/>
+            </a:xfrm>
+            <a:prstGeom prst="flowChartDocument">
+              <a:avLst/>
+            </a:prstGeom>
+          </p:spPr>
+          <p:style>
+            <a:lnRef idx="1">
+              <a:schemeClr val="accent6"/>
+            </a:lnRef>
+            <a:fillRef idx="2">
+              <a:schemeClr val="accent6"/>
+            </a:fillRef>
+            <a:effectRef idx="1">
+              <a:schemeClr val="accent6"/>
+            </a:effectRef>
+            <a:fontRef idx="minor">
+              <a:schemeClr val="dk1"/>
+            </a:fontRef>
+          </p:style>
+          <p:txBody>
+            <a:bodyPr anchor="ctr"/>
+            <a:lstStyle/>
+            <a:p>
+              <a:pPr algn="ctr" eaLnBrk="0" fontAlgn="auto" hangingPunct="0">
+                <a:spcBef>
+                  <a:spcPts val="0"/>
+                </a:spcBef>
+                <a:spcAft>
+                  <a:spcPts val="0"/>
+                </a:spcAft>
+                <a:defRPr/>
+              </a:pPr>
+              <a:r>
+                <a:rPr lang="en-US" sz="1600" dirty="0">
+                  <a:cs typeface="Arial" panose="020B0604020202020204" pitchFamily="34" charset="0"/>
+                </a:rPr>
+                <a:t>TSV</a:t>
+              </a:r>
+            </a:p>
+          </p:txBody>
+        </p:sp>
+        <p:cxnSp>
+          <p:nvCxnSpPr>
+            <p:cNvPr id="47" name="Gerade Verbindung mit Pfeil 14">
+              <a:extLst>
+                <a:ext uri="{FF2B5EF4-FFF2-40B4-BE49-F238E27FC236}">
+                  <a16:creationId xmlns:a16="http://schemas.microsoft.com/office/drawing/2014/main" id="{2919F1B0-2883-4155-9A31-456442FB225D}"/>
+                </a:ext>
+              </a:extLst>
+            </p:cNvPr>
+            <p:cNvCxnSpPr>
+              <a:cxnSpLocks/>
+              <a:stCxn id="42" idx="3"/>
+              <a:endCxn id="49" idx="1"/>
+            </p:cNvCxnSpPr>
+            <p:nvPr/>
+          </p:nvCxnSpPr>
+          <p:spPr>
+            <a:xfrm flipV="1">
+              <a:off x="4704284" y="5664626"/>
+              <a:ext cx="514820" cy="9080"/>
+            </a:xfrm>
+            <a:prstGeom prst="straightConnector1">
+              <a:avLst/>
+            </a:prstGeom>
+            <a:ln>
+              <a:tailEnd type="triangle" w="med" len="med"/>
+            </a:ln>
+          </p:spPr>
+          <p:style>
+            <a:lnRef idx="1">
+              <a:schemeClr val="accent1"/>
+            </a:lnRef>
+            <a:fillRef idx="0">
+              <a:schemeClr val="accent1"/>
+            </a:fillRef>
+            <a:effectRef idx="0">
+              <a:schemeClr val="accent1"/>
+            </a:effectRef>
+            <a:fontRef idx="minor">
+              <a:schemeClr val="tx1"/>
+            </a:fontRef>
+          </p:style>
+        </p:cxnSp>
+        <p:sp>
+          <p:nvSpPr>
+            <p:cNvPr id="49" name="Flussdiagramm: Dokument 36">
+              <a:extLst>
+                <a:ext uri="{FF2B5EF4-FFF2-40B4-BE49-F238E27FC236}">
+                  <a16:creationId xmlns:a16="http://schemas.microsoft.com/office/drawing/2014/main" id="{AB7218D7-1705-45C5-9236-8B052C65CEE6}"/>
+                </a:ext>
+              </a:extLst>
+            </p:cNvPr>
+            <p:cNvSpPr/>
+            <p:nvPr/>
+          </p:nvSpPr>
+          <p:spPr>
+            <a:xfrm>
+              <a:off x="5219104" y="5268544"/>
+              <a:ext cx="1081088" cy="792163"/>
+            </a:xfrm>
+            <a:prstGeom prst="flowChartDocument">
+              <a:avLst/>
+            </a:prstGeom>
+          </p:spPr>
+          <p:style>
+            <a:lnRef idx="1">
+              <a:schemeClr val="accent6"/>
+            </a:lnRef>
+            <a:fillRef idx="2">
+              <a:schemeClr val="accent6"/>
+            </a:fillRef>
+            <a:effectRef idx="1">
+              <a:schemeClr val="accent6"/>
+            </a:effectRef>
+            <a:fontRef idx="minor">
+              <a:schemeClr val="dk1"/>
+            </a:fontRef>
+          </p:style>
+          <p:txBody>
+            <a:bodyPr anchor="ctr"/>
+            <a:lstStyle/>
+            <a:p>
+              <a:pPr algn="ctr" eaLnBrk="0" fontAlgn="auto" hangingPunct="0">
+                <a:spcBef>
+                  <a:spcPts val="0"/>
+                </a:spcBef>
+                <a:spcAft>
+                  <a:spcPts val="0"/>
+                </a:spcAft>
+                <a:defRPr/>
+              </a:pPr>
+              <a:r>
+                <a:rPr lang="en-US" sz="1600" dirty="0">
+                  <a:cs typeface="Arial" panose="020B0604020202020204" pitchFamily="34" charset="0"/>
+                </a:rPr>
+                <a:t>TSV</a:t>
+              </a:r>
+            </a:p>
+          </p:txBody>
+        </p:sp>
+        <p:cxnSp>
+          <p:nvCxnSpPr>
+            <p:cNvPr id="50" name="Gerade Verbindung mit Pfeil 14">
+              <a:extLst>
+                <a:ext uri="{FF2B5EF4-FFF2-40B4-BE49-F238E27FC236}">
+                  <a16:creationId xmlns:a16="http://schemas.microsoft.com/office/drawing/2014/main" id="{03008C8D-2AB7-43E3-AF02-EB9BE1ACEAC1}"/>
+                </a:ext>
+              </a:extLst>
+            </p:cNvPr>
+            <p:cNvCxnSpPr>
+              <a:cxnSpLocks/>
+              <a:stCxn id="29" idx="3"/>
+              <a:endCxn id="39" idx="1"/>
+            </p:cNvCxnSpPr>
+            <p:nvPr/>
+          </p:nvCxnSpPr>
+          <p:spPr>
+            <a:xfrm>
+              <a:off x="2755504" y="3825007"/>
+              <a:ext cx="727472" cy="929614"/>
+            </a:xfrm>
+            <a:prstGeom prst="straightConnector1">
+              <a:avLst/>
+            </a:prstGeom>
+            <a:ln>
+              <a:tailEnd type="triangle" w="med" len="med"/>
+            </a:ln>
+          </p:spPr>
+          <p:style>
+            <a:lnRef idx="1">
+              <a:schemeClr val="accent1"/>
+            </a:lnRef>
+            <a:fillRef idx="0">
+              <a:schemeClr val="accent1"/>
+            </a:fillRef>
+            <a:effectRef idx="0">
+              <a:schemeClr val="accent1"/>
+            </a:effectRef>
+            <a:fontRef idx="minor">
+              <a:schemeClr val="tx1"/>
+            </a:fontRef>
+          </p:style>
+        </p:cxnSp>
+        <p:cxnSp>
+          <p:nvCxnSpPr>
+            <p:cNvPr id="51" name="Gerade Verbindung mit Pfeil 14">
+              <a:extLst>
+                <a:ext uri="{FF2B5EF4-FFF2-40B4-BE49-F238E27FC236}">
+                  <a16:creationId xmlns:a16="http://schemas.microsoft.com/office/drawing/2014/main" id="{E123D197-FA20-40E1-A8B3-AE963BEA2EBB}"/>
+                </a:ext>
+              </a:extLst>
+            </p:cNvPr>
+            <p:cNvCxnSpPr>
+              <a:cxnSpLocks/>
+              <a:stCxn id="29" idx="3"/>
+              <a:endCxn id="42" idx="1"/>
+            </p:cNvCxnSpPr>
+            <p:nvPr/>
+          </p:nvCxnSpPr>
+          <p:spPr>
+            <a:xfrm>
+              <a:off x="2755504" y="3825007"/>
+              <a:ext cx="724818" cy="1848699"/>
+            </a:xfrm>
+            <a:prstGeom prst="straightConnector1">
+              <a:avLst/>
+            </a:prstGeom>
+            <a:ln>
+              <a:tailEnd type="triangle" w="med" len="med"/>
+            </a:ln>
+          </p:spPr>
+          <p:style>
+            <a:lnRef idx="1">
+              <a:schemeClr val="accent1"/>
+            </a:lnRef>
+            <a:fillRef idx="0">
+              <a:schemeClr val="accent1"/>
+            </a:fillRef>
+            <a:effectRef idx="0">
+              <a:schemeClr val="accent1"/>
+            </a:effectRef>
+            <a:fontRef idx="minor">
+              <a:schemeClr val="tx1"/>
+            </a:fontRef>
+          </p:style>
+        </p:cxnSp>
+      </p:grpSp>
+    </p:spTree>
+    <p:extLst>
+      <p:ext uri="{BB962C8B-B14F-4D97-AF65-F5344CB8AC3E}">
+        <p14:creationId xmlns:p14="http://schemas.microsoft.com/office/powerpoint/2010/main" val="1864426395"/>
       </p:ext>
     </p:extLst>
   </p:cSld>

</xml_diff>